<commit_message>
Sprememba naslova & dodana tematika naloge
</commit_message>
<xml_diff>
--- a/resources/presentation.pptx
+++ b/resources/presentation.pptx
@@ -240,7 +240,7 @@
           <a:p>
             <a:fld id="{FE056746-65C8-4CF1-AD4E-5620D3AE65AC}" type="datetime1">
               <a:rPr lang="sl-SI" smtClean="0"/>
-              <a:t>29. 08. 2018</a:t>
+              <a:t>30. 08. 2018</a:t>
             </a:fld>
             <a:endParaRPr lang="en-US"/>
           </a:p>
@@ -414,7 +414,7 @@
           <a:p>
             <a:fld id="{98F1D07B-6EB1-46E7-B352-19A6B3A306B6}" type="datetime1">
               <a:rPr lang="sl-SI" smtClean="0"/>
-              <a:t>29. 08. 2018</a:t>
+              <a:t>30. 08. 2018</a:t>
             </a:fld>
             <a:endParaRPr lang="en-US"/>
           </a:p>
@@ -1301,40 +1301,16 @@
           <a:p>
             <a:r>
               <a:rPr lang="sl-SI" dirty="0" smtClean="0"/>
-              <a:t>Podatkovna baza CockroachDB </a:t>
-            </a:r>
+              <a:t>Podatkovna baza CockroachDB je ena od teh novih NewSQL podatkovnoh baz. Ustanovitelj podjetja CockroachLabs pa so bivši inžinirji zaposleni v podjetju Google. Sama idejna osnova izhaja z Googlove podatkovne baze Spanner. Kljub temu pa je podatkovna baza CockroachDB bistveno drugačna.</a:t>
+            </a:r>
+          </a:p>
+          <a:p>
+            <a:endParaRPr lang="sl-SI" dirty="0"/>
+          </a:p>
+          <a:p>
             <a:r>
               <a:rPr lang="sl-SI" dirty="0" smtClean="0"/>
-              <a:t>je </a:t>
-            </a:r>
-            <a:r>
-              <a:rPr lang="sl-SI" dirty="0" smtClean="0"/>
-              <a:t>ena od teh novih </a:t>
-            </a:r>
-            <a:r>
-              <a:rPr lang="sl-SI" dirty="0" smtClean="0"/>
-              <a:t>NewSQL </a:t>
-            </a:r>
-            <a:r>
-              <a:rPr lang="sl-SI" dirty="0" smtClean="0"/>
-              <a:t>podatkovnoh baz. Ustanovitelj podjetja CockroachLabs pa so bivši inžinirji zaposleni v podjetju Google. Sama idejna osnova izhaja z Googlove podatkovne baze Spanner. Kljub temu pa je podatkovna baza CockroachDB bistveno drugačna.</a:t>
-            </a:r>
-          </a:p>
-          <a:p>
-            <a:endParaRPr lang="sl-SI" dirty="0"/>
-          </a:p>
-          <a:p>
-            <a:r>
-              <a:rPr lang="sl-SI" dirty="0" smtClean="0"/>
-              <a:t>CockroachDB je NewSQL podatkovna baza, usmerjena predvsem v enostavnost in dostopnost. Je odprtokodna, zelo enostavna za postavitev, zaženemo pa jo lahko praktično kjer koli. Deluje na  vseh glavnih operajskih sistemih in </a:t>
-            </a:r>
-            <a:r>
-              <a:rPr lang="sl-SI" dirty="0" smtClean="0"/>
-              <a:t>j</a:t>
-            </a:r>
-            <a:r>
-              <a:rPr lang="sl-SI" dirty="0" smtClean="0"/>
-              <a:t>e primerna za oblak. </a:t>
+              <a:t>CockroachDB je NewSQL podatkovna baza, usmerjena predvsem v enostavnost in dostopnost. Je odprtokodna, zelo enostavna za postavitev, zaženemo pa jo lahko praktično kjer koli. Deluje na  vseh glavnih operajskih sistemih in je primerna za oblak. </a:t>
             </a:r>
             <a:endParaRPr lang="sl-SI" dirty="0"/>
           </a:p>
@@ -1803,9 +1779,9 @@
           <a:bodyPr/>
           <a:lstStyle/>
           <a:p>
-            <a:fld id="{365D2F80-2CE1-40D0-860D-753FB3D315F0}" type="datetime1">
+            <a:fld id="{EDD597C0-6942-4F57-B81E-534E4EC01CB4}" type="datetime1">
               <a:rPr lang="sl-SI" smtClean="0"/>
-              <a:t>29. 08. 2018</a:t>
+              <a:t>30. 08. 2018</a:t>
             </a:fld>
             <a:endParaRPr lang="en-US"/>
           </a:p>
@@ -1828,7 +1804,7 @@
           <a:p>
             <a:r>
               <a:rPr lang="en-US" smtClean="0"/>
-              <a:t>Visoko skalabilna NewSQL relacijska podatkovna baza CockroachDB</a:t>
+              <a:t>Visoko skalabilen NewSQL sistem za upravljanje s podatkovnimi bazami CockroachDB</a:t>
             </a:r>
             <a:endParaRPr lang="en-US"/>
           </a:p>
@@ -1984,9 +1960,9 @@
           <a:bodyPr/>
           <a:lstStyle/>
           <a:p>
-            <a:fld id="{AEF9A4BF-F458-43BE-9323-216D5FD5517F}" type="datetime1">
+            <a:fld id="{C9ECDC08-D79D-4F43-BDEF-60BB6F595DFC}" type="datetime1">
               <a:rPr lang="sl-SI" smtClean="0"/>
-              <a:t>29. 08. 2018</a:t>
+              <a:t>30. 08. 2018</a:t>
             </a:fld>
             <a:endParaRPr lang="en-US"/>
           </a:p>
@@ -2009,7 +1985,7 @@
           <a:p>
             <a:r>
               <a:rPr lang="en-US" smtClean="0"/>
-              <a:t>Visoko skalabilna NewSQL relacijska podatkovna baza CockroachDB</a:t>
+              <a:t>Visoko skalabilen NewSQL sistem za upravljanje s podatkovnimi bazami CockroachDB</a:t>
             </a:r>
             <a:endParaRPr lang="en-US"/>
           </a:p>
@@ -2175,9 +2151,9 @@
           <a:bodyPr/>
           <a:lstStyle/>
           <a:p>
-            <a:fld id="{2680AEC6-6B62-4EBF-B84E-134BF97CA394}" type="datetime1">
+            <a:fld id="{1537456A-3E35-43C0-8A01-0739FC546403}" type="datetime1">
               <a:rPr lang="sl-SI" smtClean="0"/>
-              <a:t>29. 08. 2018</a:t>
+              <a:t>30. 08. 2018</a:t>
             </a:fld>
             <a:endParaRPr lang="en-US"/>
           </a:p>
@@ -2200,7 +2176,7 @@
           <a:p>
             <a:r>
               <a:rPr lang="en-US" smtClean="0"/>
-              <a:t>Visoko skalabilna NewSQL relacijska podatkovna baza CockroachDB</a:t>
+              <a:t>Visoko skalabilen NewSQL sistem za upravljanje s podatkovnimi bazami CockroachDB</a:t>
             </a:r>
             <a:endParaRPr lang="en-US"/>
           </a:p>
@@ -2356,9 +2332,9 @@
           <a:bodyPr/>
           <a:lstStyle/>
           <a:p>
-            <a:fld id="{18144C24-20E4-42BE-8255-C83991AF9DB3}" type="datetime1">
+            <a:fld id="{30CDEFDC-E427-464D-9743-D63D8D8294B0}" type="datetime1">
               <a:rPr lang="sl-SI" smtClean="0"/>
-              <a:t>29. 08. 2018</a:t>
+              <a:t>30. 08. 2018</a:t>
             </a:fld>
             <a:endParaRPr lang="en-US"/>
           </a:p>
@@ -2381,7 +2357,7 @@
           <a:p>
             <a:r>
               <a:rPr lang="en-US" smtClean="0"/>
-              <a:t>Visoko skalabilna NewSQL relacijska podatkovna baza CockroachDB</a:t>
+              <a:t>Visoko skalabilen NewSQL sistem za upravljanje s podatkovnimi bazami CockroachDB</a:t>
             </a:r>
             <a:endParaRPr lang="en-US"/>
           </a:p>
@@ -2613,9 +2589,9 @@
           <a:bodyPr/>
           <a:lstStyle/>
           <a:p>
-            <a:fld id="{39C70DB0-19A5-4973-93CB-0003870D08B7}" type="datetime1">
+            <a:fld id="{BBC98DF8-C309-4A0F-9951-E965B27C4BE5}" type="datetime1">
               <a:rPr lang="sl-SI" smtClean="0"/>
-              <a:t>29. 08. 2018</a:t>
+              <a:t>30. 08. 2018</a:t>
             </a:fld>
             <a:endParaRPr lang="en-US"/>
           </a:p>
@@ -2638,7 +2614,7 @@
           <a:p>
             <a:r>
               <a:rPr lang="en-US" smtClean="0"/>
-              <a:t>Visoko skalabilna NewSQL relacijska podatkovna baza CockroachDB</a:t>
+              <a:t>Visoko skalabilen NewSQL sistem za upravljanje s podatkovnimi bazami CockroachDB</a:t>
             </a:r>
             <a:endParaRPr lang="en-US"/>
           </a:p>
@@ -2856,9 +2832,9 @@
           <a:bodyPr/>
           <a:lstStyle/>
           <a:p>
-            <a:fld id="{2393CE2F-A866-4F12-87CA-417CC673AAD6}" type="datetime1">
+            <a:fld id="{D91DC8C1-BC5C-4AA0-B4AB-17A26EB8F25F}" type="datetime1">
               <a:rPr lang="sl-SI" smtClean="0"/>
-              <a:t>29. 08. 2018</a:t>
+              <a:t>30. 08. 2018</a:t>
             </a:fld>
             <a:endParaRPr lang="en-US"/>
           </a:p>
@@ -2881,7 +2857,7 @@
           <a:p>
             <a:r>
               <a:rPr lang="en-US" smtClean="0"/>
-              <a:t>Visoko skalabilna NewSQL relacijska podatkovna baza CockroachDB</a:t>
+              <a:t>Visoko skalabilen NewSQL sistem za upravljanje s podatkovnimi bazami CockroachDB</a:t>
             </a:r>
             <a:endParaRPr lang="en-US"/>
           </a:p>
@@ -3234,9 +3210,9 @@
           <a:bodyPr/>
           <a:lstStyle/>
           <a:p>
-            <a:fld id="{B857DC86-47C9-4AE7-B47C-52A5B10578AC}" type="datetime1">
+            <a:fld id="{ADA19B66-EBBA-441A-8FEB-334074B543E4}" type="datetime1">
               <a:rPr lang="sl-SI" smtClean="0"/>
-              <a:t>29. 08. 2018</a:t>
+              <a:t>30. 08. 2018</a:t>
             </a:fld>
             <a:endParaRPr lang="en-US"/>
           </a:p>
@@ -3259,7 +3235,7 @@
           <a:p>
             <a:r>
               <a:rPr lang="en-US" smtClean="0"/>
-              <a:t>Visoko skalabilna NewSQL relacijska podatkovna baza CockroachDB</a:t>
+              <a:t>Visoko skalabilen NewSQL sistem za upravljanje s podatkovnimi bazami CockroachDB</a:t>
             </a:r>
             <a:endParaRPr lang="en-US"/>
           </a:p>
@@ -3363,9 +3339,9 @@
           <a:bodyPr/>
           <a:lstStyle/>
           <a:p>
-            <a:fld id="{8BC0CF3C-29A0-464C-A5DD-2DFC2A0094D1}" type="datetime1">
+            <a:fld id="{F4A41A22-2001-40DF-B96B-5F69EC310F4A}" type="datetime1">
               <a:rPr lang="sl-SI" smtClean="0"/>
-              <a:t>29. 08. 2018</a:t>
+              <a:t>30. 08. 2018</a:t>
             </a:fld>
             <a:endParaRPr lang="en-US"/>
           </a:p>
@@ -3388,7 +3364,7 @@
           <a:p>
             <a:r>
               <a:rPr lang="en-US" smtClean="0"/>
-              <a:t>Visoko skalabilna NewSQL relacijska podatkovna baza CockroachDB</a:t>
+              <a:t>Visoko skalabilen NewSQL sistem za upravljanje s podatkovnimi bazami CockroachDB</a:t>
             </a:r>
             <a:endParaRPr lang="en-US"/>
           </a:p>
@@ -3469,9 +3445,9 @@
           <a:bodyPr/>
           <a:lstStyle/>
           <a:p>
-            <a:fld id="{F4AC03D4-5EEA-4D9A-A2DC-7423FC552BB8}" type="datetime1">
+            <a:fld id="{C9BC64EA-EE1F-4E9E-A590-24E583B55064}" type="datetime1">
               <a:rPr lang="sl-SI" smtClean="0"/>
-              <a:t>29. 08. 2018</a:t>
+              <a:t>30. 08. 2018</a:t>
             </a:fld>
             <a:endParaRPr lang="en-US"/>
           </a:p>
@@ -3494,7 +3470,7 @@
           <a:p>
             <a:r>
               <a:rPr lang="en-US" smtClean="0"/>
-              <a:t>Visoko skalabilna NewSQL relacijska podatkovna baza CockroachDB</a:t>
+              <a:t>Visoko skalabilen NewSQL sistem za upravljanje s podatkovnimi bazami CockroachDB</a:t>
             </a:r>
             <a:endParaRPr lang="en-US"/>
           </a:p>
@@ -3750,9 +3726,9 @@
           <a:bodyPr/>
           <a:lstStyle/>
           <a:p>
-            <a:fld id="{FED41BC6-093A-4484-ACB5-57975D6E9182}" type="datetime1">
+            <a:fld id="{7768DD12-048E-42F1-A810-EDAB41383B17}" type="datetime1">
               <a:rPr lang="sl-SI" smtClean="0"/>
-              <a:t>29. 08. 2018</a:t>
+              <a:t>30. 08. 2018</a:t>
             </a:fld>
             <a:endParaRPr lang="en-US"/>
           </a:p>
@@ -3775,7 +3751,7 @@
           <a:p>
             <a:r>
               <a:rPr lang="en-US" smtClean="0"/>
-              <a:t>Visoko skalabilna NewSQL relacijska podatkovna baza CockroachDB</a:t>
+              <a:t>Visoko skalabilen NewSQL sistem za upravljanje s podatkovnimi bazami CockroachDB</a:t>
             </a:r>
             <a:endParaRPr lang="en-US"/>
           </a:p>
@@ -4018,9 +3994,9 @@
           <a:bodyPr/>
           <a:lstStyle/>
           <a:p>
-            <a:fld id="{80B002D4-541C-4522-BD17-7E4991C0FA65}" type="datetime1">
+            <a:fld id="{2B9BDAE8-6237-4395-B090-833B047B7E73}" type="datetime1">
               <a:rPr lang="sl-SI" smtClean="0"/>
-              <a:t>29. 08. 2018</a:t>
+              <a:t>30. 08. 2018</a:t>
             </a:fld>
             <a:endParaRPr lang="en-US"/>
           </a:p>
@@ -4043,7 +4019,7 @@
           <a:p>
             <a:r>
               <a:rPr lang="en-US" smtClean="0"/>
-              <a:t>Visoko skalabilna NewSQL relacijska podatkovna baza CockroachDB</a:t>
+              <a:t>Visoko skalabilen NewSQL sistem za upravljanje s podatkovnimi bazami CockroachDB</a:t>
             </a:r>
             <a:endParaRPr lang="en-US"/>
           </a:p>
@@ -4242,9 +4218,9 @@
             </a:lvl1pPr>
           </a:lstStyle>
           <a:p>
-            <a:fld id="{588E992C-7E55-478D-90B5-74B5A7B5D8B1}" type="datetime1">
+            <a:fld id="{68CF6F80-A389-4880-9824-CBBB4DF64A0F}" type="datetime1">
               <a:rPr lang="sl-SI" smtClean="0"/>
-              <a:t>29. 08. 2018</a:t>
+              <a:t>30. 08. 2018</a:t>
             </a:fld>
             <a:endParaRPr lang="en-US"/>
           </a:p>
@@ -4285,7 +4261,7 @@
           <a:p>
             <a:r>
               <a:rPr lang="en-US" smtClean="0"/>
-              <a:t>Visoko skalabilna NewSQL relacijska podatkovna baza CockroachDB</a:t>
+              <a:t>Visoko skalabilen NewSQL sistem za upravljanje s podatkovnimi bazami CockroachDB</a:t>
             </a:r>
             <a:endParaRPr lang="en-US"/>
           </a:p>
@@ -4674,15 +4650,79 @@
         <p:spPr/>
         <p:txBody>
           <a:bodyPr>
-            <a:normAutofit fontScale="90000"/>
+            <a:noAutofit/>
           </a:bodyPr>
           <a:lstStyle/>
           <a:p>
             <a:r>
-              <a:rPr lang="sl-SI" dirty="0" smtClean="0"/>
-              <a:t>Visoko skalabilna NewSQL relacijska podatkovna baza CockroachDB</a:t>
-            </a:r>
-            <a:endParaRPr lang="en-US" dirty="0"/>
+              <a:rPr lang="en-US" sz="4800" dirty="0" err="1"/>
+              <a:t>Visoko</a:t>
+            </a:r>
+            <a:r>
+              <a:rPr lang="en-US" sz="4800" dirty="0"/>
+              <a:t> </a:t>
+            </a:r>
+            <a:r>
+              <a:rPr lang="en-US" sz="4800" dirty="0" err="1"/>
+              <a:t>skalabilen</a:t>
+            </a:r>
+            <a:r>
+              <a:rPr lang="en-US" sz="4800" dirty="0"/>
+              <a:t> </a:t>
+            </a:r>
+            <a:r>
+              <a:rPr lang="en-US" sz="4800" dirty="0" err="1"/>
+              <a:t>NewSQL</a:t>
+            </a:r>
+            <a:r>
+              <a:rPr lang="en-US" sz="4800" dirty="0"/>
+              <a:t> </a:t>
+            </a:r>
+            <a:r>
+              <a:rPr lang="en-US" sz="4800" dirty="0" err="1"/>
+              <a:t>sistem</a:t>
+            </a:r>
+            <a:r>
+              <a:rPr lang="en-US" sz="4800" dirty="0"/>
+              <a:t> </a:t>
+            </a:r>
+            <a:r>
+              <a:rPr lang="en-US" sz="4800" dirty="0" err="1"/>
+              <a:t>za</a:t>
+            </a:r>
+            <a:r>
+              <a:rPr lang="en-US" sz="4800" dirty="0"/>
+              <a:t> </a:t>
+            </a:r>
+            <a:r>
+              <a:rPr lang="en-US" sz="4800" dirty="0" err="1"/>
+              <a:t>upravljanje</a:t>
+            </a:r>
+            <a:r>
+              <a:rPr lang="en-US" sz="4800" dirty="0"/>
+              <a:t> s </a:t>
+            </a:r>
+            <a:r>
+              <a:rPr lang="en-US" sz="4800" dirty="0" err="1"/>
+              <a:t>podatkovnimi</a:t>
+            </a:r>
+            <a:r>
+              <a:rPr lang="en-US" sz="4800" dirty="0"/>
+              <a:t> </a:t>
+            </a:r>
+            <a:r>
+              <a:rPr lang="en-US" sz="4800" dirty="0" err="1"/>
+              <a:t>bazami</a:t>
+            </a:r>
+            <a:r>
+              <a:rPr lang="en-US" sz="4800" dirty="0"/>
+              <a:t> </a:t>
+            </a:r>
+            <a:r>
+              <a:rPr lang="en-US" sz="4800" dirty="0" err="1"/>
+              <a:t>CockroachDB</a:t>
+            </a:r>
+            <a:endParaRPr lang="en-US" sz="4800" dirty="0"/>
           </a:p>
         </p:txBody>
       </p:sp>
@@ -4814,9 +4854,9 @@
           <a:bodyPr/>
           <a:lstStyle/>
           <a:p>
-            <a:fld id="{18144C24-20E4-42BE-8255-C83991AF9DB3}" type="datetime1">
+            <a:fld id="{651594FC-D0FF-4B68-A18A-A12B9B99322B}" type="datetime1">
               <a:rPr lang="sl-SI" smtClean="0"/>
-              <a:t>29. 08. 2018</a:t>
+              <a:t>30. 08. 2018</a:t>
             </a:fld>
             <a:endParaRPr lang="en-US"/>
           </a:p>
@@ -4839,7 +4879,7 @@
           <a:p>
             <a:r>
               <a:rPr lang="en-US" smtClean="0"/>
-              <a:t>Visoko skalabilna NewSQL relacijska podatkovna baza CockroachDB</a:t>
+              <a:t>Visoko skalabilen NewSQL sistem za upravljanje s podatkovnimi bazami CockroachDB</a:t>
             </a:r>
             <a:endParaRPr lang="en-US"/>
           </a:p>
@@ -4972,9 +5012,9 @@
           <a:bodyPr/>
           <a:lstStyle/>
           <a:p>
-            <a:fld id="{18144C24-20E4-42BE-8255-C83991AF9DB3}" type="datetime1">
+            <a:fld id="{6685FC13-DA23-4C01-9A85-09118A634212}" type="datetime1">
               <a:rPr lang="sl-SI" smtClean="0"/>
-              <a:t>29. 08. 2018</a:t>
+              <a:t>30. 08. 2018</a:t>
             </a:fld>
             <a:endParaRPr lang="en-US"/>
           </a:p>
@@ -4997,7 +5037,7 @@
           <a:p>
             <a:r>
               <a:rPr lang="en-US" smtClean="0"/>
-              <a:t>Visoko skalabilna NewSQL relacijska podatkovna baza CockroachDB</a:t>
+              <a:t>Visoko skalabilen NewSQL sistem za upravljanje s podatkovnimi bazami CockroachDB</a:t>
             </a:r>
             <a:endParaRPr lang="en-US"/>
           </a:p>
@@ -5107,9 +5147,9 @@
           <a:bodyPr/>
           <a:lstStyle/>
           <a:p>
-            <a:fld id="{8BC0CF3C-29A0-464C-A5DD-2DFC2A0094D1}" type="datetime1">
+            <a:fld id="{1B717E85-3F73-480F-80A8-84A4293D2601}" type="datetime1">
               <a:rPr lang="sl-SI" smtClean="0"/>
-              <a:t>29. 08. 2018</a:t>
+              <a:t>30. 08. 2018</a:t>
             </a:fld>
             <a:endParaRPr lang="en-US"/>
           </a:p>
@@ -5132,7 +5172,7 @@
           <a:p>
             <a:r>
               <a:rPr lang="en-US" smtClean="0"/>
-              <a:t>Visoko skalabilna NewSQL relacijska podatkovna baza CockroachDB</a:t>
+              <a:t>Visoko skalabilen NewSQL sistem za upravljanje s podatkovnimi bazami CockroachDB</a:t>
             </a:r>
             <a:endParaRPr lang="en-US"/>
           </a:p>
@@ -5423,11 +5463,11 @@
   <p:clrMapOvr>
     <a:masterClrMapping/>
   </p:clrMapOvr>
-  <mc:AlternateContent xmlns:mc="http://schemas.openxmlformats.org/markup-compatibility/2006">
-    <mc:Choice xmlns:p14="http://schemas.microsoft.com/office/powerpoint/2010/main" Requires="p14">
+  <mc:AlternateContent xmlns:mc="http://schemas.openxmlformats.org/markup-compatibility/2006" xmlns:p14="http://schemas.microsoft.com/office/powerpoint/2010/main">
+    <mc:Choice Requires="p14">
       <p:transition spd="slow" p14:dur="2000"/>
     </mc:Choice>
-    <mc:Fallback>
+    <mc:Fallback xmlns="">
       <p:transition spd="slow"/>
     </mc:Fallback>
   </mc:AlternateContent>
@@ -5694,7 +5734,6 @@
               <a:rPr lang="sl-SI" dirty="0" smtClean="0"/>
               <a:t>Rezultati in ugotovitve</a:t>
             </a:r>
-            <a:endParaRPr lang="sl-SI" dirty="0" smtClean="0"/>
           </a:p>
         </p:txBody>
       </p:sp>
@@ -5713,9 +5752,9 @@
           <a:bodyPr/>
           <a:lstStyle/>
           <a:p>
-            <a:fld id="{7BB467F8-833A-403C-A851-56C5A9254990}" type="datetime1">
+            <a:fld id="{5F266D8D-56BE-448C-A72E-F2DD44D1DB5B}" type="datetime1">
               <a:rPr lang="sl-SI" smtClean="0"/>
-              <a:t>29. 08. 2018</a:t>
+              <a:t>30. 08. 2018</a:t>
             </a:fld>
             <a:endParaRPr lang="en-US"/>
           </a:p>
@@ -5738,7 +5777,7 @@
           <a:p>
             <a:r>
               <a:rPr lang="en-US" smtClean="0"/>
-              <a:t>Visoko skalabilna NewSQL relacijska podatkovna baza CockroachDB</a:t>
+              <a:t>Visoko skalabilen NewSQL sistem za upravljanje s podatkovnimi bazami CockroachDB</a:t>
             </a:r>
             <a:endParaRPr lang="en-US"/>
           </a:p>
@@ -5870,11 +5909,7 @@
             </a:r>
             <a:r>
               <a:rPr lang="sl-SI" dirty="0" smtClean="0"/>
-              <a:t>isoka </a:t>
-            </a:r>
-            <a:r>
-              <a:rPr lang="sl-SI" dirty="0" smtClean="0"/>
-              <a:t>razpoložljivost</a:t>
+              <a:t>isoka razpoložljivost</a:t>
             </a:r>
           </a:p>
           <a:p>
@@ -5886,7 +5921,6 @@
               <a:rPr lang="sl-SI" dirty="0" smtClean="0"/>
               <a:t>orazdeljena okolja</a:t>
             </a:r>
-            <a:endParaRPr lang="sl-SI" dirty="0" smtClean="0"/>
           </a:p>
         </p:txBody>
       </p:sp>
@@ -5905,9 +5939,9 @@
           <a:bodyPr/>
           <a:lstStyle/>
           <a:p>
-            <a:fld id="{A4EB8BDE-FFE4-4D68-87B8-2A8A14D70604}" type="datetime1">
+            <a:fld id="{37C2868D-823F-4B33-BDFE-50C5EC571182}" type="datetime1">
               <a:rPr lang="sl-SI" smtClean="0"/>
-              <a:t>29. 08. 2018</a:t>
+              <a:t>30. 08. 2018</a:t>
             </a:fld>
             <a:endParaRPr lang="en-US"/>
           </a:p>
@@ -5930,7 +5964,7 @@
           <a:p>
             <a:r>
               <a:rPr lang="en-US" smtClean="0"/>
-              <a:t>Visoko skalabilna NewSQL relacijska podatkovna baza CockroachDB</a:t>
+              <a:t>Visoko skalabilen NewSQL sistem za upravljanje s podatkovnimi bazami CockroachDB</a:t>
             </a:r>
             <a:endParaRPr lang="en-US"/>
           </a:p>
@@ -6056,7 +6090,6 @@
               <a:rPr lang="sl-SI" dirty="0" smtClean="0"/>
               <a:t>močna skupnost</a:t>
             </a:r>
-            <a:endParaRPr lang="sl-SI" dirty="0" smtClean="0"/>
           </a:p>
         </p:txBody>
       </p:sp>
@@ -6075,9 +6108,9 @@
           <a:bodyPr/>
           <a:lstStyle/>
           <a:p>
-            <a:fld id="{014766A4-19E3-4910-BBBB-D885D93298D0}" type="datetime1">
+            <a:fld id="{94E42CE7-3896-4702-9533-7697A8D1B4F0}" type="datetime1">
               <a:rPr lang="sl-SI" smtClean="0"/>
-              <a:t>29. 08. 2018</a:t>
+              <a:t>30. 08. 2018</a:t>
             </a:fld>
             <a:endParaRPr lang="en-US"/>
           </a:p>
@@ -6100,7 +6133,7 @@
           <a:p>
             <a:r>
               <a:rPr lang="en-US" smtClean="0"/>
-              <a:t>Visoko skalabilna NewSQL relacijska podatkovna baza CockroachDB</a:t>
+              <a:t>Visoko skalabilen NewSQL sistem za upravljanje s podatkovnimi bazami CockroachDB</a:t>
             </a:r>
             <a:endParaRPr lang="en-US"/>
           </a:p>
@@ -6251,9 +6284,9 @@
           <a:bodyPr/>
           <a:lstStyle/>
           <a:p>
-            <a:fld id="{18144C24-20E4-42BE-8255-C83991AF9DB3}" type="datetime1">
+            <a:fld id="{C3E7F1D5-0F42-4571-ABC8-ABC7ACE2A051}" type="datetime1">
               <a:rPr lang="sl-SI" smtClean="0"/>
-              <a:t>29. 08. 2018</a:t>
+              <a:t>30. 08. 2018</a:t>
             </a:fld>
             <a:endParaRPr lang="en-US"/>
           </a:p>
@@ -6276,7 +6309,7 @@
           <a:p>
             <a:r>
               <a:rPr lang="en-US" smtClean="0"/>
-              <a:t>Visoko skalabilna NewSQL relacijska podatkovna baza CockroachDB</a:t>
+              <a:t>Visoko skalabilen NewSQL sistem za upravljanje s podatkovnimi bazami CockroachDB</a:t>
             </a:r>
             <a:endParaRPr lang="en-US"/>
           </a:p>
@@ -6399,9 +6432,9 @@
           <a:bodyPr/>
           <a:lstStyle/>
           <a:p>
-            <a:fld id="{18144C24-20E4-42BE-8255-C83991AF9DB3}" type="datetime1">
+            <a:fld id="{1426AB37-A32F-47C9-AFB3-F87C0FDE6D9B}" type="datetime1">
               <a:rPr lang="sl-SI" smtClean="0"/>
-              <a:t>29. 08. 2018</a:t>
+              <a:t>30. 08. 2018</a:t>
             </a:fld>
             <a:endParaRPr lang="en-US"/>
           </a:p>
@@ -6424,7 +6457,7 @@
           <a:p>
             <a:r>
               <a:rPr lang="en-US" smtClean="0"/>
-              <a:t>Visoko skalabilna NewSQL relacijska podatkovna baza CockroachDB</a:t>
+              <a:t>Visoko skalabilen NewSQL sistem za upravljanje s podatkovnimi bazami CockroachDB</a:t>
             </a:r>
             <a:endParaRPr lang="en-US"/>
           </a:p>
@@ -6625,9 +6658,9 @@
           <a:bodyPr/>
           <a:lstStyle/>
           <a:p>
-            <a:fld id="{7D6B1608-1541-40D2-889F-646263B8CEBF}" type="datetime1">
+            <a:fld id="{70DA23D0-970E-425F-A25C-18443AD52B68}" type="datetime1">
               <a:rPr lang="sl-SI" smtClean="0"/>
-              <a:t>29. 08. 2018</a:t>
+              <a:t>30. 08. 2018</a:t>
             </a:fld>
             <a:endParaRPr lang="en-US"/>
           </a:p>
@@ -6650,7 +6683,7 @@
           <a:p>
             <a:r>
               <a:rPr lang="en-US" smtClean="0"/>
-              <a:t>Visoko skalabilna NewSQL relacijska podatkovna baza CockroachDB</a:t>
+              <a:t>Visoko skalabilen NewSQL sistem za upravljanje s podatkovnimi bazami CockroachDB</a:t>
             </a:r>
             <a:endParaRPr lang="en-US"/>
           </a:p>
@@ -6733,11 +6766,7 @@
           <a:p>
             <a:r>
               <a:rPr lang="sl-SI" dirty="0" smtClean="0"/>
-              <a:t>Izvedba primerjalne analize </a:t>
-            </a:r>
-            <a:r>
-              <a:rPr lang="sl-SI" dirty="0" smtClean="0"/>
-              <a:t>zmogljivosti</a:t>
+              <a:t>Izvedba primerjalne analize zmogljivosti</a:t>
             </a:r>
             <a:endParaRPr lang="en-US" dirty="0"/>
           </a:p>
@@ -6820,9 +6849,9 @@
           <a:bodyPr/>
           <a:lstStyle/>
           <a:p>
-            <a:fld id="{0BB0E7F4-116F-4F4A-9C59-B69EEE8948F3}" type="datetime1">
+            <a:fld id="{7DE92977-D600-4884-8CBF-1137E8791BD5}" type="datetime1">
               <a:rPr lang="sl-SI" smtClean="0"/>
-              <a:t>29. 08. 2018</a:t>
+              <a:t>30. 08. 2018</a:t>
             </a:fld>
             <a:endParaRPr lang="en-US"/>
           </a:p>
@@ -6845,7 +6874,7 @@
           <a:p>
             <a:r>
               <a:rPr lang="en-US" smtClean="0"/>
-              <a:t>Visoko skalabilna NewSQL relacijska podatkovna baza CockroachDB</a:t>
+              <a:t>Visoko skalabilen NewSQL sistem za upravljanje s podatkovnimi bazami CockroachDB</a:t>
             </a:r>
             <a:endParaRPr lang="en-US"/>
           </a:p>
@@ -6928,11 +6957,7 @@
           <a:p>
             <a:r>
               <a:rPr lang="sl-SI" dirty="0" smtClean="0"/>
-              <a:t>Rezultati </a:t>
-            </a:r>
-            <a:r>
-              <a:rPr lang="sl-SI" dirty="0" smtClean="0"/>
-              <a:t>primerjalne analize zmogljivosti</a:t>
+              <a:t>Rezultati primerjalne analize zmogljivosti</a:t>
             </a:r>
             <a:endParaRPr lang="en-US" dirty="0"/>
           </a:p>
@@ -6972,9 +6997,9 @@
           <a:bodyPr/>
           <a:lstStyle/>
           <a:p>
-            <a:fld id="{18144C24-20E4-42BE-8255-C83991AF9DB3}" type="datetime1">
+            <a:fld id="{388357A5-7A55-4980-8B15-AF9EA0F0661A}" type="datetime1">
               <a:rPr lang="sl-SI" smtClean="0"/>
-              <a:t>29. 08. 2018</a:t>
+              <a:t>30. 08. 2018</a:t>
             </a:fld>
             <a:endParaRPr lang="en-US"/>
           </a:p>
@@ -6997,7 +7022,7 @@
           <a:p>
             <a:r>
               <a:rPr lang="en-US" smtClean="0"/>
-              <a:t>Visoko skalabilna NewSQL relacijska podatkovna baza CockroachDB</a:t>
+              <a:t>Visoko skalabilen NewSQL sistem za upravljanje s podatkovnimi bazami CockroachDB</a:t>
             </a:r>
             <a:endParaRPr lang="en-US"/>
           </a:p>
@@ -7872,6 +7897,14 @@
 </file>
 
 <file path=customXml/itemProps1.xml><?xml version="1.0" encoding="utf-8"?>
+<ds:datastoreItem xmlns:ds="http://schemas.openxmlformats.org/officeDocument/2006/customXml" ds:itemID="{53D2E1E6-31A0-4125-90BD-43C2E9298528}">
+  <ds:schemaRefs>
+    <ds:schemaRef ds:uri="http://schemas.microsoft.com/VisualStudio/2011/storyboarding/control"/>
+  </ds:schemaRefs>
+</ds:datastoreItem>
+</file>
+
+<file path=customXml/itemProps2.xml><?xml version="1.0" encoding="utf-8"?>
 <ds:datastoreItem xmlns:ds="http://schemas.openxmlformats.org/officeDocument/2006/customXml" ds:itemID="{D598BA68-142F-4018-A75B-F89F9834265D}">
   <ds:schemaRefs>
     <ds:schemaRef ds:uri="http://schemas.microsoft.com/VisualStudio/2011/storyboarding/control"/>
@@ -7879,16 +7912,8 @@
 </ds:datastoreItem>
 </file>
 
-<file path=customXml/itemProps2.xml><?xml version="1.0" encoding="utf-8"?>
-<ds:datastoreItem xmlns:ds="http://schemas.openxmlformats.org/officeDocument/2006/customXml" ds:itemID="{53D2E1E6-31A0-4125-90BD-43C2E9298528}">
-  <ds:schemaRefs>
-    <ds:schemaRef ds:uri="http://schemas.microsoft.com/VisualStudio/2011/storyboarding/control"/>
-  </ds:schemaRefs>
-</ds:datastoreItem>
-</file>
-
 <file path=customXml/itemProps3.xml><?xml version="1.0" encoding="utf-8"?>
-<ds:datastoreItem xmlns:ds="http://schemas.openxmlformats.org/officeDocument/2006/customXml" ds:itemID="{3580A32D-B035-4AA9-BB2B-EBD2B68F5179}">
+<ds:datastoreItem xmlns:ds="http://schemas.openxmlformats.org/officeDocument/2006/customXml" ds:itemID="{68A45118-7B2D-4D82-8963-44FE5675749D}">
   <ds:schemaRefs>
     <ds:schemaRef ds:uri="http://schemas.microsoft.com/VisualStudio/2011/storyboarding/control"/>
   </ds:schemaRefs>
@@ -7896,6 +7921,14 @@
 </file>
 
 <file path=customXml/itemProps4.xml><?xml version="1.0" encoding="utf-8"?>
+<ds:datastoreItem xmlns:ds="http://schemas.openxmlformats.org/officeDocument/2006/customXml" ds:itemID="{1DF5AD3E-793C-44F2-B14C-072908CAC5BD}">
+  <ds:schemaRefs>
+    <ds:schemaRef ds:uri="http://schemas.microsoft.com/VisualStudio/2011/storyboarding/control"/>
+  </ds:schemaRefs>
+</ds:datastoreItem>
+</file>
+
+<file path=customXml/itemProps5.xml><?xml version="1.0" encoding="utf-8"?>
 <ds:datastoreItem xmlns:ds="http://schemas.openxmlformats.org/officeDocument/2006/customXml" ds:itemID="{087E4252-9650-42CE-AAED-A25BFD76830A}">
   <ds:schemaRefs>
     <ds:schemaRef ds:uri="http://schemas.microsoft.com/VisualStudio/2011/storyboarding/control"/>
@@ -7903,16 +7936,8 @@
 </ds:datastoreItem>
 </file>
 
-<file path=customXml/itemProps5.xml><?xml version="1.0" encoding="utf-8"?>
-<ds:datastoreItem xmlns:ds="http://schemas.openxmlformats.org/officeDocument/2006/customXml" ds:itemID="{1DF5AD3E-793C-44F2-B14C-072908CAC5BD}">
-  <ds:schemaRefs>
-    <ds:schemaRef ds:uri="http://schemas.microsoft.com/VisualStudio/2011/storyboarding/control"/>
-  </ds:schemaRefs>
-</ds:datastoreItem>
-</file>
-
 <file path=customXml/itemProps6.xml><?xml version="1.0" encoding="utf-8"?>
-<ds:datastoreItem xmlns:ds="http://schemas.openxmlformats.org/officeDocument/2006/customXml" ds:itemID="{68A45118-7B2D-4D82-8963-44FE5675749D}">
+<ds:datastoreItem xmlns:ds="http://schemas.openxmlformats.org/officeDocument/2006/customXml" ds:itemID="{3580A32D-B035-4AA9-BB2B-EBD2B68F5179}">
   <ds:schemaRefs>
     <ds:schemaRef ds:uri="http://schemas.microsoft.com/VisualStudio/2011/storyboarding/control"/>
   </ds:schemaRefs>

</xml_diff>

<commit_message>
Dizajn predstavitve + popravek statističnega grafa
</commit_message>
<xml_diff>
--- a/resources/presentation.pptx
+++ b/resources/presentation.pptx
@@ -5,10 +5,10 @@
     <p:sldMasterId id="2147483660" r:id="rId8"/>
   </p:sldMasterIdLst>
   <p:notesMasterIdLst>
-    <p:notesMasterId r:id="rId21"/>
+    <p:notesMasterId r:id="rId24"/>
   </p:notesMasterIdLst>
   <p:handoutMasterIdLst>
-    <p:handoutMasterId r:id="rId22"/>
+    <p:handoutMasterId r:id="rId25"/>
   </p:handoutMasterIdLst>
   <p:sldIdLst>
     <p:sldId id="256" r:id="rId9"/>
@@ -20,9 +20,12 @@
     <p:sldId id="260" r:id="rId15"/>
     <p:sldId id="261" r:id="rId16"/>
     <p:sldId id="263" r:id="rId17"/>
-    <p:sldId id="262" r:id="rId18"/>
-    <p:sldId id="264" r:id="rId19"/>
-    <p:sldId id="265" r:id="rId20"/>
+    <p:sldId id="268" r:id="rId18"/>
+    <p:sldId id="269" r:id="rId19"/>
+    <p:sldId id="262" r:id="rId20"/>
+    <p:sldId id="270" r:id="rId21"/>
+    <p:sldId id="264" r:id="rId22"/>
+    <p:sldId id="265" r:id="rId23"/>
   </p:sldIdLst>
   <p:sldSz cx="12192000" cy="6858000"/>
   <p:notesSz cx="6858000" cy="9144000"/>
@@ -124,7 +127,7 @@
   <p:extLst>
     <p:ext uri="{EFAFB233-063F-42B5-8137-9DF3F51BA10A}">
       <p15:sldGuideLst xmlns:p15="http://schemas.microsoft.com/office/powerpoint/2012/main">
-        <p15:guide id="1" orient="horz" pos="2184" userDrawn="1">
+        <p15:guide id="1" orient="horz" pos="2208" userDrawn="1">
           <p15:clr>
             <a:srgbClr val="A4A3A4"/>
           </p15:clr>
@@ -240,7 +243,7 @@
           <a:p>
             <a:fld id="{FE056746-65C8-4CF1-AD4E-5620D3AE65AC}" type="datetime1">
               <a:rPr lang="sl-SI" smtClean="0"/>
-              <a:t>30. 08. 2018</a:t>
+              <a:t>31. 08. 2018</a:t>
             </a:fld>
             <a:endParaRPr lang="en-US"/>
           </a:p>
@@ -414,7 +417,7 @@
           <a:p>
             <a:fld id="{98F1D07B-6EB1-46E7-B352-19A6B3A306B6}" type="datetime1">
               <a:rPr lang="sl-SI" smtClean="0"/>
-              <a:t>30. 08. 2018</a:t>
+              <a:t>31. 08. 2018</a:t>
             </a:fld>
             <a:endParaRPr lang="en-US"/>
           </a:p>
@@ -829,7 +832,7 @@
     </p:spTree>
     <p:extLst>
       <p:ext uri="{BB962C8B-B14F-4D97-AF65-F5344CB8AC3E}">
-        <p14:creationId xmlns:p14="http://schemas.microsoft.com/office/powerpoint/2010/main" val="1603221149"/>
+        <p14:creationId xmlns:p14="http://schemas.microsoft.com/office/powerpoint/2010/main" val="773110739"/>
       </p:ext>
     </p:extLst>
   </p:cSld>
@@ -883,6 +886,189 @@
           <a:bodyPr/>
           <a:lstStyle/>
           <a:p>
+            <a:endParaRPr lang="en-US"/>
+          </a:p>
+        </p:txBody>
+      </p:sp>
+    </p:spTree>
+    <p:extLst>
+      <p:ext uri="{BB962C8B-B14F-4D97-AF65-F5344CB8AC3E}">
+        <p14:creationId xmlns:p14="http://schemas.microsoft.com/office/powerpoint/2010/main" val="540276918"/>
+      </p:ext>
+    </p:extLst>
+  </p:cSld>
+  <p:clrMapOvr>
+    <a:masterClrMapping/>
+  </p:clrMapOvr>
+</p:notes>
+</file>
+
+<file path=ppt/notesSlides/notesSlide12.xml><?xml version="1.0" encoding="utf-8"?>
+<p:notes xmlns:a="http://schemas.openxmlformats.org/drawingml/2006/main" xmlns:r="http://schemas.openxmlformats.org/officeDocument/2006/relationships" xmlns:p="http://schemas.openxmlformats.org/presentationml/2006/main">
+  <p:cSld>
+    <p:spTree>
+      <p:nvGrpSpPr>
+        <p:cNvPr id="1" name=""/>
+        <p:cNvGrpSpPr/>
+        <p:nvPr/>
+      </p:nvGrpSpPr>
+      <p:grpSpPr>
+        <a:xfrm>
+          <a:off x="0" y="0"/>
+          <a:ext cx="0" cy="0"/>
+          <a:chOff x="0" y="0"/>
+          <a:chExt cx="0" cy="0"/>
+        </a:xfrm>
+      </p:grpSpPr>
+      <p:sp>
+        <p:nvSpPr>
+          <p:cNvPr id="2" name="Slide Image Placeholder 1"/>
+          <p:cNvSpPr>
+            <a:spLocks noGrp="1" noRot="1" noChangeAspect="1"/>
+          </p:cNvSpPr>
+          <p:nvPr>
+            <p:ph type="sldImg"/>
+          </p:nvPr>
+        </p:nvSpPr>
+        <p:spPr/>
+      </p:sp>
+      <p:sp>
+        <p:nvSpPr>
+          <p:cNvPr id="3" name="Notes Placeholder 2"/>
+          <p:cNvSpPr>
+            <a:spLocks noGrp="1"/>
+          </p:cNvSpPr>
+          <p:nvPr>
+            <p:ph type="body" idx="1"/>
+          </p:nvPr>
+        </p:nvSpPr>
+        <p:spPr/>
+        <p:txBody>
+          <a:bodyPr/>
+          <a:lstStyle/>
+          <a:p>
+            <a:endParaRPr lang="en-US"/>
+          </a:p>
+        </p:txBody>
+      </p:sp>
+    </p:spTree>
+    <p:extLst>
+      <p:ext uri="{BB962C8B-B14F-4D97-AF65-F5344CB8AC3E}">
+        <p14:creationId xmlns:p14="http://schemas.microsoft.com/office/powerpoint/2010/main" val="1603221149"/>
+      </p:ext>
+    </p:extLst>
+  </p:cSld>
+  <p:clrMapOvr>
+    <a:masterClrMapping/>
+  </p:clrMapOvr>
+</p:notes>
+</file>
+
+<file path=ppt/notesSlides/notesSlide13.xml><?xml version="1.0" encoding="utf-8"?>
+<p:notes xmlns:a="http://schemas.openxmlformats.org/drawingml/2006/main" xmlns:r="http://schemas.openxmlformats.org/officeDocument/2006/relationships" xmlns:p="http://schemas.openxmlformats.org/presentationml/2006/main">
+  <p:cSld>
+    <p:spTree>
+      <p:nvGrpSpPr>
+        <p:cNvPr id="1" name=""/>
+        <p:cNvGrpSpPr/>
+        <p:nvPr/>
+      </p:nvGrpSpPr>
+      <p:grpSpPr>
+        <a:xfrm>
+          <a:off x="0" y="0"/>
+          <a:ext cx="0" cy="0"/>
+          <a:chOff x="0" y="0"/>
+          <a:chExt cx="0" cy="0"/>
+        </a:xfrm>
+      </p:grpSpPr>
+      <p:sp>
+        <p:nvSpPr>
+          <p:cNvPr id="2" name="Slide Image Placeholder 1"/>
+          <p:cNvSpPr>
+            <a:spLocks noGrp="1" noRot="1" noChangeAspect="1"/>
+          </p:cNvSpPr>
+          <p:nvPr>
+            <p:ph type="sldImg"/>
+          </p:nvPr>
+        </p:nvSpPr>
+        <p:spPr/>
+      </p:sp>
+      <p:sp>
+        <p:nvSpPr>
+          <p:cNvPr id="3" name="Notes Placeholder 2"/>
+          <p:cNvSpPr>
+            <a:spLocks noGrp="1"/>
+          </p:cNvSpPr>
+          <p:nvPr>
+            <p:ph type="body" idx="1"/>
+          </p:nvPr>
+        </p:nvSpPr>
+        <p:spPr/>
+        <p:txBody>
+          <a:bodyPr/>
+          <a:lstStyle/>
+          <a:p>
+            <a:endParaRPr lang="en-US"/>
+          </a:p>
+        </p:txBody>
+      </p:sp>
+    </p:spTree>
+    <p:extLst>
+      <p:ext uri="{BB962C8B-B14F-4D97-AF65-F5344CB8AC3E}">
+        <p14:creationId xmlns:p14="http://schemas.microsoft.com/office/powerpoint/2010/main" val="678138710"/>
+      </p:ext>
+    </p:extLst>
+  </p:cSld>
+  <p:clrMapOvr>
+    <a:masterClrMapping/>
+  </p:clrMapOvr>
+</p:notes>
+</file>
+
+<file path=ppt/notesSlides/notesSlide14.xml><?xml version="1.0" encoding="utf-8"?>
+<p:notes xmlns:a="http://schemas.openxmlformats.org/drawingml/2006/main" xmlns:r="http://schemas.openxmlformats.org/officeDocument/2006/relationships" xmlns:p="http://schemas.openxmlformats.org/presentationml/2006/main">
+  <p:cSld>
+    <p:spTree>
+      <p:nvGrpSpPr>
+        <p:cNvPr id="1" name=""/>
+        <p:cNvGrpSpPr/>
+        <p:nvPr/>
+      </p:nvGrpSpPr>
+      <p:grpSpPr>
+        <a:xfrm>
+          <a:off x="0" y="0"/>
+          <a:ext cx="0" cy="0"/>
+          <a:chOff x="0" y="0"/>
+          <a:chExt cx="0" cy="0"/>
+        </a:xfrm>
+      </p:grpSpPr>
+      <p:sp>
+        <p:nvSpPr>
+          <p:cNvPr id="2" name="Slide Image Placeholder 1"/>
+          <p:cNvSpPr>
+            <a:spLocks noGrp="1" noRot="1" noChangeAspect="1"/>
+          </p:cNvSpPr>
+          <p:nvPr>
+            <p:ph type="sldImg"/>
+          </p:nvPr>
+        </p:nvSpPr>
+        <p:spPr/>
+      </p:sp>
+      <p:sp>
+        <p:nvSpPr>
+          <p:cNvPr id="3" name="Notes Placeholder 2"/>
+          <p:cNvSpPr>
+            <a:spLocks noGrp="1"/>
+          </p:cNvSpPr>
+          <p:nvPr>
+            <p:ph type="body" idx="1"/>
+          </p:nvPr>
+        </p:nvSpPr>
+        <p:spPr/>
+        <p:txBody>
+          <a:bodyPr/>
+          <a:lstStyle/>
+          <a:p>
             <a:r>
               <a:rPr lang="sl-SI" dirty="0" smtClean="0"/>
               <a:t>Podjetja</a:t>
@@ -928,7 +1114,7 @@
 </p:notes>
 </file>
 
-<file path=ppt/notesSlides/notesSlide12.xml><?xml version="1.0" encoding="utf-8"?>
+<file path=ppt/notesSlides/notesSlide15.xml><?xml version="1.0" encoding="utf-8"?>
 <p:notes xmlns:a="http://schemas.openxmlformats.org/drawingml/2006/main" xmlns:r="http://schemas.openxmlformats.org/officeDocument/2006/relationships" xmlns:p="http://schemas.openxmlformats.org/presentationml/2006/main">
   <p:cSld>
     <p:spTree>
@@ -1651,7 +1837,7 @@
 </file>
 
 <file path=ppt/slideLayouts/slideLayout1.xml><?xml version="1.0" encoding="utf-8"?>
-<p:sldLayout xmlns:a="http://schemas.openxmlformats.org/drawingml/2006/main" xmlns:r="http://schemas.openxmlformats.org/officeDocument/2006/relationships" xmlns:p="http://schemas.openxmlformats.org/presentationml/2006/main" type="title" preserve="1">
+<p:sldLayout xmlns:a="http://schemas.openxmlformats.org/drawingml/2006/main" xmlns:r="http://schemas.openxmlformats.org/officeDocument/2006/relationships" xmlns:p="http://schemas.openxmlformats.org/presentationml/2006/main" showMasterSp="0" type="title" preserve="1">
   <p:cSld name="Title Slide">
     <p:spTree>
       <p:nvGrpSpPr>
@@ -1669,6 +1855,52 @@
       </p:grpSpPr>
       <p:sp>
         <p:nvSpPr>
+          <p:cNvPr id="7" name="Rectangle 6"/>
+          <p:cNvSpPr/>
+          <p:nvPr userDrawn="1"/>
+        </p:nvSpPr>
+        <p:spPr>
+          <a:xfrm>
+            <a:off x="0" y="0"/>
+            <a:ext cx="12192000" cy="3805083"/>
+          </a:xfrm>
+          <a:prstGeom prst="rect">
+            <a:avLst/>
+          </a:prstGeom>
+          <a:solidFill>
+            <a:schemeClr val="accent6"/>
+          </a:solidFill>
+          <a:ln>
+            <a:noFill/>
+          </a:ln>
+        </p:spPr>
+        <p:style>
+          <a:lnRef idx="2">
+            <a:schemeClr val="accent1">
+              <a:shade val="50000"/>
+            </a:schemeClr>
+          </a:lnRef>
+          <a:fillRef idx="1">
+            <a:schemeClr val="accent1"/>
+          </a:fillRef>
+          <a:effectRef idx="0">
+            <a:schemeClr val="accent1"/>
+          </a:effectRef>
+          <a:fontRef idx="minor">
+            <a:schemeClr val="lt1"/>
+          </a:fontRef>
+        </p:style>
+        <p:txBody>
+          <a:bodyPr rtlCol="0" anchor="ctr"/>
+          <a:lstStyle/>
+          <a:p>
+            <a:pPr algn="ctr"/>
+            <a:endParaRPr lang="en-US"/>
+          </a:p>
+        </p:txBody>
+      </p:sp>
+      <p:sp>
+        <p:nvSpPr>
           <p:cNvPr id="2" name="Title 1"/>
           <p:cNvSpPr>
             <a:spLocks noGrp="1"/>
@@ -1687,7 +1919,11 @@
           <a:bodyPr anchor="b"/>
           <a:lstStyle>
             <a:lvl1pPr algn="ctr">
-              <a:defRPr sz="6000"/>
+              <a:defRPr sz="6000">
+                <a:solidFill>
+                  <a:schemeClr val="bg1"/>
+                </a:solidFill>
+              </a:defRPr>
             </a:lvl1pPr>
           </a:lstStyle>
           <a:p>
@@ -1711,7 +1947,7 @@
         </p:nvSpPr>
         <p:spPr>
           <a:xfrm>
-            <a:off x="1524000" y="3602038"/>
+            <a:off x="1524000" y="4114313"/>
             <a:ext cx="9144000" cy="1655762"/>
           </a:xfrm>
         </p:spPr>
@@ -1757,7 +1993,7 @@
           </a:lstStyle>
           <a:p>
             <a:r>
-              <a:rPr lang="en-US" smtClean="0"/>
+              <a:rPr lang="en-US" dirty="0" smtClean="0"/>
               <a:t>Click to edit Master subtitle style</a:t>
             </a:r>
             <a:endParaRPr lang="en-US" dirty="0"/>
@@ -1779,10 +2015,10 @@
           <a:bodyPr/>
           <a:lstStyle/>
           <a:p>
-            <a:fld id="{EDD597C0-6942-4F57-B81E-534E4EC01CB4}" type="datetime1">
-              <a:rPr lang="sl-SI" smtClean="0"/>
-              <a:t>30. 08. 2018</a:t>
-            </a:fld>
+            <a:r>
+              <a:rPr lang="en-US" smtClean="0"/>
+              <a:t>Ljubljana, 2018</a:t>
+            </a:r>
             <a:endParaRPr lang="en-US"/>
           </a:p>
         </p:txBody>
@@ -1837,378 +2073,6 @@
     <p:extLst>
       <p:ext uri="{BB962C8B-B14F-4D97-AF65-F5344CB8AC3E}">
         <p14:creationId xmlns:p14="http://schemas.microsoft.com/office/powerpoint/2010/main" val="251748363"/>
-      </p:ext>
-    </p:extLst>
-  </p:cSld>
-  <p:clrMapOvr>
-    <a:masterClrMapping/>
-  </p:clrMapOvr>
-  <p:timing>
-    <p:tnLst>
-      <p:par>
-        <p:cTn id="1" dur="indefinite" restart="never" nodeType="tmRoot"/>
-      </p:par>
-    </p:tnLst>
-  </p:timing>
-</p:sldLayout>
-</file>
-
-<file path=ppt/slideLayouts/slideLayout10.xml><?xml version="1.0" encoding="utf-8"?>
-<p:sldLayout xmlns:a="http://schemas.openxmlformats.org/drawingml/2006/main" xmlns:r="http://schemas.openxmlformats.org/officeDocument/2006/relationships" xmlns:p="http://schemas.openxmlformats.org/presentationml/2006/main" type="vertTx" preserve="1">
-  <p:cSld name="Title and Vertical Text">
-    <p:spTree>
-      <p:nvGrpSpPr>
-        <p:cNvPr id="1" name=""/>
-        <p:cNvGrpSpPr/>
-        <p:nvPr/>
-      </p:nvGrpSpPr>
-      <p:grpSpPr>
-        <a:xfrm>
-          <a:off x="0" y="0"/>
-          <a:ext cx="0" cy="0"/>
-          <a:chOff x="0" y="0"/>
-          <a:chExt cx="0" cy="0"/>
-        </a:xfrm>
-      </p:grpSpPr>
-      <p:sp>
-        <p:nvSpPr>
-          <p:cNvPr id="2" name="Title 1"/>
-          <p:cNvSpPr>
-            <a:spLocks noGrp="1"/>
-          </p:cNvSpPr>
-          <p:nvPr>
-            <p:ph type="title"/>
-          </p:nvPr>
-        </p:nvSpPr>
-        <p:spPr/>
-        <p:txBody>
-          <a:bodyPr/>
-          <a:lstStyle/>
-          <a:p>
-            <a:r>
-              <a:rPr lang="en-US" smtClean="0"/>
-              <a:t>Click to edit Master title style</a:t>
-            </a:r>
-            <a:endParaRPr lang="en-US" dirty="0"/>
-          </a:p>
-        </p:txBody>
-      </p:sp>
-      <p:sp>
-        <p:nvSpPr>
-          <p:cNvPr id="3" name="Vertical Text Placeholder 2"/>
-          <p:cNvSpPr>
-            <a:spLocks noGrp="1"/>
-          </p:cNvSpPr>
-          <p:nvPr>
-            <p:ph type="body" orient="vert" idx="1"/>
-          </p:nvPr>
-        </p:nvSpPr>
-        <p:spPr/>
-        <p:txBody>
-          <a:bodyPr vert="eaVert"/>
-          <a:lstStyle/>
-          <a:p>
-            <a:pPr lvl="0"/>
-            <a:r>
-              <a:rPr lang="en-US" smtClean="0"/>
-              <a:t>Edit Master text styles</a:t>
-            </a:r>
-          </a:p>
-          <a:p>
-            <a:pPr lvl="1"/>
-            <a:r>
-              <a:rPr lang="en-US" smtClean="0"/>
-              <a:t>Second level</a:t>
-            </a:r>
-          </a:p>
-          <a:p>
-            <a:pPr lvl="2"/>
-            <a:r>
-              <a:rPr lang="en-US" smtClean="0"/>
-              <a:t>Third level</a:t>
-            </a:r>
-          </a:p>
-          <a:p>
-            <a:pPr lvl="3"/>
-            <a:r>
-              <a:rPr lang="en-US" smtClean="0"/>
-              <a:t>Fourth level</a:t>
-            </a:r>
-          </a:p>
-          <a:p>
-            <a:pPr lvl="4"/>
-            <a:r>
-              <a:rPr lang="en-US" smtClean="0"/>
-              <a:t>Fifth level</a:t>
-            </a:r>
-            <a:endParaRPr lang="en-US" dirty="0"/>
-          </a:p>
-        </p:txBody>
-      </p:sp>
-      <p:sp>
-        <p:nvSpPr>
-          <p:cNvPr id="4" name="Date Placeholder 3"/>
-          <p:cNvSpPr>
-            <a:spLocks noGrp="1"/>
-          </p:cNvSpPr>
-          <p:nvPr>
-            <p:ph type="dt" sz="half" idx="10"/>
-          </p:nvPr>
-        </p:nvSpPr>
-        <p:spPr/>
-        <p:txBody>
-          <a:bodyPr/>
-          <a:lstStyle/>
-          <a:p>
-            <a:fld id="{C9ECDC08-D79D-4F43-BDEF-60BB6F595DFC}" type="datetime1">
-              <a:rPr lang="sl-SI" smtClean="0"/>
-              <a:t>30. 08. 2018</a:t>
-            </a:fld>
-            <a:endParaRPr lang="en-US"/>
-          </a:p>
-        </p:txBody>
-      </p:sp>
-      <p:sp>
-        <p:nvSpPr>
-          <p:cNvPr id="5" name="Footer Placeholder 4"/>
-          <p:cNvSpPr>
-            <a:spLocks noGrp="1"/>
-          </p:cNvSpPr>
-          <p:nvPr>
-            <p:ph type="ftr" sz="quarter" idx="11"/>
-          </p:nvPr>
-        </p:nvSpPr>
-        <p:spPr/>
-        <p:txBody>
-          <a:bodyPr/>
-          <a:lstStyle/>
-          <a:p>
-            <a:r>
-              <a:rPr lang="en-US" smtClean="0"/>
-              <a:t>Visoko skalabilen NewSQL sistem za upravljanje s podatkovnimi bazami CockroachDB</a:t>
-            </a:r>
-            <a:endParaRPr lang="en-US"/>
-          </a:p>
-        </p:txBody>
-      </p:sp>
-      <p:sp>
-        <p:nvSpPr>
-          <p:cNvPr id="6" name="Slide Number Placeholder 5"/>
-          <p:cNvSpPr>
-            <a:spLocks noGrp="1"/>
-          </p:cNvSpPr>
-          <p:nvPr>
-            <p:ph type="sldNum" sz="quarter" idx="12"/>
-          </p:nvPr>
-        </p:nvSpPr>
-        <p:spPr/>
-        <p:txBody>
-          <a:bodyPr/>
-          <a:lstStyle/>
-          <a:p>
-            <a:fld id="{63C2F5EF-8BAA-4E52-921D-439986BE5530}" type="slidenum">
-              <a:rPr lang="en-US" smtClean="0"/>
-              <a:t>‹#›</a:t>
-            </a:fld>
-            <a:endParaRPr lang="en-US"/>
-          </a:p>
-        </p:txBody>
-      </p:sp>
-    </p:spTree>
-    <p:extLst>
-      <p:ext uri="{BB962C8B-B14F-4D97-AF65-F5344CB8AC3E}">
-        <p14:creationId xmlns:p14="http://schemas.microsoft.com/office/powerpoint/2010/main" val="2715149695"/>
-      </p:ext>
-    </p:extLst>
-  </p:cSld>
-  <p:clrMapOvr>
-    <a:masterClrMapping/>
-  </p:clrMapOvr>
-  <p:timing>
-    <p:tnLst>
-      <p:par>
-        <p:cTn id="1" dur="indefinite" restart="never" nodeType="tmRoot"/>
-      </p:par>
-    </p:tnLst>
-  </p:timing>
-</p:sldLayout>
-</file>
-
-<file path=ppt/slideLayouts/slideLayout11.xml><?xml version="1.0" encoding="utf-8"?>
-<p:sldLayout xmlns:a="http://schemas.openxmlformats.org/drawingml/2006/main" xmlns:r="http://schemas.openxmlformats.org/officeDocument/2006/relationships" xmlns:p="http://schemas.openxmlformats.org/presentationml/2006/main" type="vertTitleAndTx" preserve="1">
-  <p:cSld name="Vertical Title and Text">
-    <p:spTree>
-      <p:nvGrpSpPr>
-        <p:cNvPr id="1" name=""/>
-        <p:cNvGrpSpPr/>
-        <p:nvPr/>
-      </p:nvGrpSpPr>
-      <p:grpSpPr>
-        <a:xfrm>
-          <a:off x="0" y="0"/>
-          <a:ext cx="0" cy="0"/>
-          <a:chOff x="0" y="0"/>
-          <a:chExt cx="0" cy="0"/>
-        </a:xfrm>
-      </p:grpSpPr>
-      <p:sp>
-        <p:nvSpPr>
-          <p:cNvPr id="2" name="Vertical Title 1"/>
-          <p:cNvSpPr>
-            <a:spLocks noGrp="1"/>
-          </p:cNvSpPr>
-          <p:nvPr>
-            <p:ph type="title" orient="vert"/>
-          </p:nvPr>
-        </p:nvSpPr>
-        <p:spPr>
-          <a:xfrm>
-            <a:off x="8724900" y="365125"/>
-            <a:ext cx="2628900" cy="5811838"/>
-          </a:xfrm>
-        </p:spPr>
-        <p:txBody>
-          <a:bodyPr vert="eaVert"/>
-          <a:lstStyle/>
-          <a:p>
-            <a:r>
-              <a:rPr lang="en-US" smtClean="0"/>
-              <a:t>Click to edit Master title style</a:t>
-            </a:r>
-            <a:endParaRPr lang="en-US" dirty="0"/>
-          </a:p>
-        </p:txBody>
-      </p:sp>
-      <p:sp>
-        <p:nvSpPr>
-          <p:cNvPr id="3" name="Vertical Text Placeholder 2"/>
-          <p:cNvSpPr>
-            <a:spLocks noGrp="1"/>
-          </p:cNvSpPr>
-          <p:nvPr>
-            <p:ph type="body" orient="vert" idx="1"/>
-          </p:nvPr>
-        </p:nvSpPr>
-        <p:spPr>
-          <a:xfrm>
-            <a:off x="838200" y="365125"/>
-            <a:ext cx="7734300" cy="5811838"/>
-          </a:xfrm>
-        </p:spPr>
-        <p:txBody>
-          <a:bodyPr vert="eaVert"/>
-          <a:lstStyle/>
-          <a:p>
-            <a:pPr lvl="0"/>
-            <a:r>
-              <a:rPr lang="en-US" smtClean="0"/>
-              <a:t>Edit Master text styles</a:t>
-            </a:r>
-          </a:p>
-          <a:p>
-            <a:pPr lvl="1"/>
-            <a:r>
-              <a:rPr lang="en-US" smtClean="0"/>
-              <a:t>Second level</a:t>
-            </a:r>
-          </a:p>
-          <a:p>
-            <a:pPr lvl="2"/>
-            <a:r>
-              <a:rPr lang="en-US" smtClean="0"/>
-              <a:t>Third level</a:t>
-            </a:r>
-          </a:p>
-          <a:p>
-            <a:pPr lvl="3"/>
-            <a:r>
-              <a:rPr lang="en-US" smtClean="0"/>
-              <a:t>Fourth level</a:t>
-            </a:r>
-          </a:p>
-          <a:p>
-            <a:pPr lvl="4"/>
-            <a:r>
-              <a:rPr lang="en-US" smtClean="0"/>
-              <a:t>Fifth level</a:t>
-            </a:r>
-            <a:endParaRPr lang="en-US" dirty="0"/>
-          </a:p>
-        </p:txBody>
-      </p:sp>
-      <p:sp>
-        <p:nvSpPr>
-          <p:cNvPr id="4" name="Date Placeholder 3"/>
-          <p:cNvSpPr>
-            <a:spLocks noGrp="1"/>
-          </p:cNvSpPr>
-          <p:nvPr>
-            <p:ph type="dt" sz="half" idx="10"/>
-          </p:nvPr>
-        </p:nvSpPr>
-        <p:spPr/>
-        <p:txBody>
-          <a:bodyPr/>
-          <a:lstStyle/>
-          <a:p>
-            <a:fld id="{1537456A-3E35-43C0-8A01-0739FC546403}" type="datetime1">
-              <a:rPr lang="sl-SI" smtClean="0"/>
-              <a:t>30. 08. 2018</a:t>
-            </a:fld>
-            <a:endParaRPr lang="en-US"/>
-          </a:p>
-        </p:txBody>
-      </p:sp>
-      <p:sp>
-        <p:nvSpPr>
-          <p:cNvPr id="5" name="Footer Placeholder 4"/>
-          <p:cNvSpPr>
-            <a:spLocks noGrp="1"/>
-          </p:cNvSpPr>
-          <p:nvPr>
-            <p:ph type="ftr" sz="quarter" idx="11"/>
-          </p:nvPr>
-        </p:nvSpPr>
-        <p:spPr/>
-        <p:txBody>
-          <a:bodyPr/>
-          <a:lstStyle/>
-          <a:p>
-            <a:r>
-              <a:rPr lang="en-US" smtClean="0"/>
-              <a:t>Visoko skalabilen NewSQL sistem za upravljanje s podatkovnimi bazami CockroachDB</a:t>
-            </a:r>
-            <a:endParaRPr lang="en-US"/>
-          </a:p>
-        </p:txBody>
-      </p:sp>
-      <p:sp>
-        <p:nvSpPr>
-          <p:cNvPr id="6" name="Slide Number Placeholder 5"/>
-          <p:cNvSpPr>
-            <a:spLocks noGrp="1"/>
-          </p:cNvSpPr>
-          <p:nvPr>
-            <p:ph type="sldNum" sz="quarter" idx="12"/>
-          </p:nvPr>
-        </p:nvSpPr>
-        <p:spPr/>
-        <p:txBody>
-          <a:bodyPr/>
-          <a:lstStyle/>
-          <a:p>
-            <a:fld id="{63C2F5EF-8BAA-4E52-921D-439986BE5530}" type="slidenum">
-              <a:rPr lang="en-US" smtClean="0"/>
-              <a:t>‹#›</a:t>
-            </a:fld>
-            <a:endParaRPr lang="en-US"/>
-          </a:p>
-        </p:txBody>
-      </p:sp>
-    </p:spTree>
-    <p:extLst>
-      <p:ext uri="{BB962C8B-B14F-4D97-AF65-F5344CB8AC3E}">
-        <p14:creationId xmlns:p14="http://schemas.microsoft.com/office/powerpoint/2010/main" val="2959014630"/>
       </p:ext>
     </p:extLst>
   </p:cSld>
@@ -2255,10 +2119,18 @@
         <p:spPr/>
         <p:txBody>
           <a:bodyPr/>
-          <a:lstStyle/>
-          <a:p>
-            <a:r>
-              <a:rPr lang="en-US" smtClean="0"/>
+          <a:lstStyle>
+            <a:lvl1pPr>
+              <a:defRPr>
+                <a:solidFill>
+                  <a:schemeClr val="bg1"/>
+                </a:solidFill>
+              </a:defRPr>
+            </a:lvl1pPr>
+          </a:lstStyle>
+          <a:p>
+            <a:r>
+              <a:rPr lang="en-US" dirty="0" smtClean="0"/>
               <a:t>Click to edit Master title style</a:t>
             </a:r>
             <a:endParaRPr lang="en-US" dirty="0"/>
@@ -2282,35 +2154,35 @@
           <a:p>
             <a:pPr lvl="0"/>
             <a:r>
-              <a:rPr lang="en-US" smtClean="0"/>
+              <a:rPr lang="en-US" dirty="0" smtClean="0"/>
               <a:t>Edit Master text styles</a:t>
             </a:r>
           </a:p>
           <a:p>
             <a:pPr lvl="1"/>
             <a:r>
-              <a:rPr lang="en-US" smtClean="0"/>
+              <a:rPr lang="en-US" dirty="0" smtClean="0"/>
               <a:t>Second level</a:t>
             </a:r>
           </a:p>
           <a:p>
             <a:pPr lvl="2"/>
             <a:r>
-              <a:rPr lang="en-US" smtClean="0"/>
+              <a:rPr lang="en-US" dirty="0" smtClean="0"/>
               <a:t>Third level</a:t>
             </a:r>
           </a:p>
           <a:p>
             <a:pPr lvl="3"/>
             <a:r>
-              <a:rPr lang="en-US" smtClean="0"/>
+              <a:rPr lang="en-US" dirty="0" smtClean="0"/>
               <a:t>Fourth level</a:t>
             </a:r>
           </a:p>
           <a:p>
             <a:pPr lvl="4"/>
             <a:r>
-              <a:rPr lang="en-US" smtClean="0"/>
+              <a:rPr lang="en-US" dirty="0" smtClean="0"/>
               <a:t>Fifth level</a:t>
             </a:r>
             <a:endParaRPr lang="en-US" dirty="0"/>
@@ -2332,10 +2204,10 @@
           <a:bodyPr/>
           <a:lstStyle/>
           <a:p>
-            <a:fld id="{30CDEFDC-E427-464D-9743-D63D8D8294B0}" type="datetime1">
-              <a:rPr lang="sl-SI" smtClean="0"/>
-              <a:t>30. 08. 2018</a:t>
-            </a:fld>
+            <a:r>
+              <a:rPr lang="en-US" smtClean="0"/>
+              <a:t>Ljubljana, 2018</a:t>
+            </a:r>
             <a:endParaRPr lang="en-US"/>
           </a:p>
         </p:txBody>
@@ -2407,263 +2279,6 @@
 </file>
 
 <file path=ppt/slideLayouts/slideLayout3.xml><?xml version="1.0" encoding="utf-8"?>
-<p:sldLayout xmlns:a="http://schemas.openxmlformats.org/drawingml/2006/main" xmlns:r="http://schemas.openxmlformats.org/officeDocument/2006/relationships" xmlns:p="http://schemas.openxmlformats.org/presentationml/2006/main" type="secHead" preserve="1">
-  <p:cSld name="Section Header">
-    <p:spTree>
-      <p:nvGrpSpPr>
-        <p:cNvPr id="1" name=""/>
-        <p:cNvGrpSpPr/>
-        <p:nvPr/>
-      </p:nvGrpSpPr>
-      <p:grpSpPr>
-        <a:xfrm>
-          <a:off x="0" y="0"/>
-          <a:ext cx="0" cy="0"/>
-          <a:chOff x="0" y="0"/>
-          <a:chExt cx="0" cy="0"/>
-        </a:xfrm>
-      </p:grpSpPr>
-      <p:sp>
-        <p:nvSpPr>
-          <p:cNvPr id="2" name="Title 1"/>
-          <p:cNvSpPr>
-            <a:spLocks noGrp="1"/>
-          </p:cNvSpPr>
-          <p:nvPr>
-            <p:ph type="title"/>
-          </p:nvPr>
-        </p:nvSpPr>
-        <p:spPr>
-          <a:xfrm>
-            <a:off x="831850" y="1709738"/>
-            <a:ext cx="10515600" cy="2852737"/>
-          </a:xfrm>
-        </p:spPr>
-        <p:txBody>
-          <a:bodyPr anchor="b"/>
-          <a:lstStyle>
-            <a:lvl1pPr>
-              <a:defRPr sz="6000"/>
-            </a:lvl1pPr>
-          </a:lstStyle>
-          <a:p>
-            <a:r>
-              <a:rPr lang="en-US" smtClean="0"/>
-              <a:t>Click to edit Master title style</a:t>
-            </a:r>
-            <a:endParaRPr lang="en-US" dirty="0"/>
-          </a:p>
-        </p:txBody>
-      </p:sp>
-      <p:sp>
-        <p:nvSpPr>
-          <p:cNvPr id="3" name="Text Placeholder 2"/>
-          <p:cNvSpPr>
-            <a:spLocks noGrp="1"/>
-          </p:cNvSpPr>
-          <p:nvPr>
-            <p:ph type="body" idx="1"/>
-          </p:nvPr>
-        </p:nvSpPr>
-        <p:spPr>
-          <a:xfrm>
-            <a:off x="831850" y="4589463"/>
-            <a:ext cx="10515600" cy="1500187"/>
-          </a:xfrm>
-        </p:spPr>
-        <p:txBody>
-          <a:bodyPr/>
-          <a:lstStyle>
-            <a:lvl1pPr marL="0" indent="0">
-              <a:buNone/>
-              <a:defRPr sz="2400">
-                <a:solidFill>
-                  <a:schemeClr val="tx1">
-                    <a:tint val="75000"/>
-                  </a:schemeClr>
-                </a:solidFill>
-              </a:defRPr>
-            </a:lvl1pPr>
-            <a:lvl2pPr marL="457200" indent="0">
-              <a:buNone/>
-              <a:defRPr sz="2000">
-                <a:solidFill>
-                  <a:schemeClr val="tx1">
-                    <a:tint val="75000"/>
-                  </a:schemeClr>
-                </a:solidFill>
-              </a:defRPr>
-            </a:lvl2pPr>
-            <a:lvl3pPr marL="914400" indent="0">
-              <a:buNone/>
-              <a:defRPr sz="1800">
-                <a:solidFill>
-                  <a:schemeClr val="tx1">
-                    <a:tint val="75000"/>
-                  </a:schemeClr>
-                </a:solidFill>
-              </a:defRPr>
-            </a:lvl3pPr>
-            <a:lvl4pPr marL="1371600" indent="0">
-              <a:buNone/>
-              <a:defRPr sz="1600">
-                <a:solidFill>
-                  <a:schemeClr val="tx1">
-                    <a:tint val="75000"/>
-                  </a:schemeClr>
-                </a:solidFill>
-              </a:defRPr>
-            </a:lvl4pPr>
-            <a:lvl5pPr marL="1828800" indent="0">
-              <a:buNone/>
-              <a:defRPr sz="1600">
-                <a:solidFill>
-                  <a:schemeClr val="tx1">
-                    <a:tint val="75000"/>
-                  </a:schemeClr>
-                </a:solidFill>
-              </a:defRPr>
-            </a:lvl5pPr>
-            <a:lvl6pPr marL="2286000" indent="0">
-              <a:buNone/>
-              <a:defRPr sz="1600">
-                <a:solidFill>
-                  <a:schemeClr val="tx1">
-                    <a:tint val="75000"/>
-                  </a:schemeClr>
-                </a:solidFill>
-              </a:defRPr>
-            </a:lvl6pPr>
-            <a:lvl7pPr marL="2743200" indent="0">
-              <a:buNone/>
-              <a:defRPr sz="1600">
-                <a:solidFill>
-                  <a:schemeClr val="tx1">
-                    <a:tint val="75000"/>
-                  </a:schemeClr>
-                </a:solidFill>
-              </a:defRPr>
-            </a:lvl7pPr>
-            <a:lvl8pPr marL="3200400" indent="0">
-              <a:buNone/>
-              <a:defRPr sz="1600">
-                <a:solidFill>
-                  <a:schemeClr val="tx1">
-                    <a:tint val="75000"/>
-                  </a:schemeClr>
-                </a:solidFill>
-              </a:defRPr>
-            </a:lvl8pPr>
-            <a:lvl9pPr marL="3657600" indent="0">
-              <a:buNone/>
-              <a:defRPr sz="1600">
-                <a:solidFill>
-                  <a:schemeClr val="tx1">
-                    <a:tint val="75000"/>
-                  </a:schemeClr>
-                </a:solidFill>
-              </a:defRPr>
-            </a:lvl9pPr>
-          </a:lstStyle>
-          <a:p>
-            <a:pPr lvl="0"/>
-            <a:r>
-              <a:rPr lang="en-US" smtClean="0"/>
-              <a:t>Edit Master text styles</a:t>
-            </a:r>
-          </a:p>
-        </p:txBody>
-      </p:sp>
-      <p:sp>
-        <p:nvSpPr>
-          <p:cNvPr id="4" name="Date Placeholder 3"/>
-          <p:cNvSpPr>
-            <a:spLocks noGrp="1"/>
-          </p:cNvSpPr>
-          <p:nvPr>
-            <p:ph type="dt" sz="half" idx="10"/>
-          </p:nvPr>
-        </p:nvSpPr>
-        <p:spPr/>
-        <p:txBody>
-          <a:bodyPr/>
-          <a:lstStyle/>
-          <a:p>
-            <a:fld id="{BBC98DF8-C309-4A0F-9951-E965B27C4BE5}" type="datetime1">
-              <a:rPr lang="sl-SI" smtClean="0"/>
-              <a:t>30. 08. 2018</a:t>
-            </a:fld>
-            <a:endParaRPr lang="en-US"/>
-          </a:p>
-        </p:txBody>
-      </p:sp>
-      <p:sp>
-        <p:nvSpPr>
-          <p:cNvPr id="5" name="Footer Placeholder 4"/>
-          <p:cNvSpPr>
-            <a:spLocks noGrp="1"/>
-          </p:cNvSpPr>
-          <p:nvPr>
-            <p:ph type="ftr" sz="quarter" idx="11"/>
-          </p:nvPr>
-        </p:nvSpPr>
-        <p:spPr/>
-        <p:txBody>
-          <a:bodyPr/>
-          <a:lstStyle/>
-          <a:p>
-            <a:r>
-              <a:rPr lang="en-US" smtClean="0"/>
-              <a:t>Visoko skalabilen NewSQL sistem za upravljanje s podatkovnimi bazami CockroachDB</a:t>
-            </a:r>
-            <a:endParaRPr lang="en-US"/>
-          </a:p>
-        </p:txBody>
-      </p:sp>
-      <p:sp>
-        <p:nvSpPr>
-          <p:cNvPr id="6" name="Slide Number Placeholder 5"/>
-          <p:cNvSpPr>
-            <a:spLocks noGrp="1"/>
-          </p:cNvSpPr>
-          <p:nvPr>
-            <p:ph type="sldNum" sz="quarter" idx="12"/>
-          </p:nvPr>
-        </p:nvSpPr>
-        <p:spPr/>
-        <p:txBody>
-          <a:bodyPr/>
-          <a:lstStyle/>
-          <a:p>
-            <a:fld id="{63C2F5EF-8BAA-4E52-921D-439986BE5530}" type="slidenum">
-              <a:rPr lang="en-US" smtClean="0"/>
-              <a:t>‹#›</a:t>
-            </a:fld>
-            <a:endParaRPr lang="en-US"/>
-          </a:p>
-        </p:txBody>
-      </p:sp>
-    </p:spTree>
-    <p:extLst>
-      <p:ext uri="{BB962C8B-B14F-4D97-AF65-F5344CB8AC3E}">
-        <p14:creationId xmlns:p14="http://schemas.microsoft.com/office/powerpoint/2010/main" val="3017030319"/>
-      </p:ext>
-    </p:extLst>
-  </p:cSld>
-  <p:clrMapOvr>
-    <a:masterClrMapping/>
-  </p:clrMapOvr>
-  <p:timing>
-    <p:tnLst>
-      <p:par>
-        <p:cTn id="1" dur="indefinite" restart="never" nodeType="tmRoot"/>
-      </p:par>
-    </p:tnLst>
-  </p:timing>
-</p:sldLayout>
-</file>
-
-<file path=ppt/slideLayouts/slideLayout4.xml><?xml version="1.0" encoding="utf-8"?>
 <p:sldLayout xmlns:a="http://schemas.openxmlformats.org/drawingml/2006/main" xmlns:r="http://schemas.openxmlformats.org/officeDocument/2006/relationships" xmlns:p="http://schemas.openxmlformats.org/presentationml/2006/main" type="twoObj" preserve="1">
   <p:cSld name="Two Content">
     <p:spTree>
@@ -2696,7 +2311,7 @@
           <a:lstStyle/>
           <a:p>
             <a:r>
-              <a:rPr lang="en-US" smtClean="0"/>
+              <a:rPr lang="en-US" dirty="0" smtClean="0"/>
               <a:t>Click to edit Master title style</a:t>
             </a:r>
             <a:endParaRPr lang="en-US" dirty="0"/>
@@ -2832,10 +2447,10 @@
           <a:bodyPr/>
           <a:lstStyle/>
           <a:p>
-            <a:fld id="{D91DC8C1-BC5C-4AA0-B4AB-17A26EB8F25F}" type="datetime1">
-              <a:rPr lang="sl-SI" smtClean="0"/>
-              <a:t>30. 08. 2018</a:t>
-            </a:fld>
+            <a:r>
+              <a:rPr lang="en-US" smtClean="0"/>
+              <a:t>Ljubljana, 2018</a:t>
+            </a:r>
             <a:endParaRPr lang="en-US"/>
           </a:p>
         </p:txBody>
@@ -2906,7 +2521,7 @@
 </p:sldLayout>
 </file>
 
-<file path=ppt/slideLayouts/slideLayout5.xml><?xml version="1.0" encoding="utf-8"?>
+<file path=ppt/slideLayouts/slideLayout4.xml><?xml version="1.0" encoding="utf-8"?>
 <p:sldLayout xmlns:a="http://schemas.openxmlformats.org/drawingml/2006/main" xmlns:r="http://schemas.openxmlformats.org/officeDocument/2006/relationships" xmlns:p="http://schemas.openxmlformats.org/presentationml/2006/main" type="twoTxTwoObj" preserve="1">
   <p:cSld name="Comparison">
     <p:spTree>
@@ -2944,7 +2559,7 @@
           <a:lstStyle/>
           <a:p>
             <a:r>
-              <a:rPr lang="en-US" smtClean="0"/>
+              <a:rPr lang="en-US" dirty="0" smtClean="0"/>
               <a:t>Click to edit Master title style</a:t>
             </a:r>
             <a:endParaRPr lang="en-US" dirty="0"/>
@@ -3210,10 +2825,10 @@
           <a:bodyPr/>
           <a:lstStyle/>
           <a:p>
-            <a:fld id="{ADA19B66-EBBA-441A-8FEB-334074B543E4}" type="datetime1">
-              <a:rPr lang="sl-SI" smtClean="0"/>
-              <a:t>30. 08. 2018</a:t>
-            </a:fld>
+            <a:r>
+              <a:rPr lang="en-US" smtClean="0"/>
+              <a:t>Ljubljana, 2018</a:t>
+            </a:r>
             <a:endParaRPr lang="en-US"/>
           </a:p>
         </p:txBody>
@@ -3284,7 +2899,7 @@
 </p:sldLayout>
 </file>
 
-<file path=ppt/slideLayouts/slideLayout6.xml><?xml version="1.0" encoding="utf-8"?>
+<file path=ppt/slideLayouts/slideLayout5.xml><?xml version="1.0" encoding="utf-8"?>
 <p:sldLayout xmlns:a="http://schemas.openxmlformats.org/drawingml/2006/main" xmlns:r="http://schemas.openxmlformats.org/officeDocument/2006/relationships" xmlns:p="http://schemas.openxmlformats.org/presentationml/2006/main" type="titleOnly" preserve="1">
   <p:cSld name="Title Only">
     <p:spTree>
@@ -3317,7 +2932,7 @@
           <a:lstStyle/>
           <a:p>
             <a:r>
-              <a:rPr lang="en-US" smtClean="0"/>
+              <a:rPr lang="en-US" dirty="0" smtClean="0"/>
               <a:t>Click to edit Master title style</a:t>
             </a:r>
             <a:endParaRPr lang="en-US" dirty="0"/>
@@ -3339,10 +2954,10 @@
           <a:bodyPr/>
           <a:lstStyle/>
           <a:p>
-            <a:fld id="{F4A41A22-2001-40DF-B96B-5F69EC310F4A}" type="datetime1">
-              <a:rPr lang="sl-SI" smtClean="0"/>
-              <a:t>30. 08. 2018</a:t>
-            </a:fld>
+            <a:r>
+              <a:rPr lang="en-US" smtClean="0"/>
+              <a:t>Ljubljana, 2018</a:t>
+            </a:r>
             <a:endParaRPr lang="en-US"/>
           </a:p>
         </p:txBody>
@@ -3413,8 +3028,8 @@
 </p:sldLayout>
 </file>
 
-<file path=ppt/slideLayouts/slideLayout7.xml><?xml version="1.0" encoding="utf-8"?>
-<p:sldLayout xmlns:a="http://schemas.openxmlformats.org/drawingml/2006/main" xmlns:r="http://schemas.openxmlformats.org/officeDocument/2006/relationships" xmlns:p="http://schemas.openxmlformats.org/presentationml/2006/main" type="blank" preserve="1">
+<file path=ppt/slideLayouts/slideLayout6.xml><?xml version="1.0" encoding="utf-8"?>
+<p:sldLayout xmlns:a="http://schemas.openxmlformats.org/drawingml/2006/main" xmlns:r="http://schemas.openxmlformats.org/officeDocument/2006/relationships" xmlns:p="http://schemas.openxmlformats.org/presentationml/2006/main" showMasterSp="0" preserve="1" userDrawn="1">
   <p:cSld name="Blank">
     <p:spTree>
       <p:nvGrpSpPr>
@@ -3430,628 +3045,10 @@
           <a:chExt cx="0" cy="0"/>
         </a:xfrm>
       </p:grpSpPr>
-      <p:sp>
-        <p:nvSpPr>
-          <p:cNvPr id="2" name="Date Placeholder 1"/>
-          <p:cNvSpPr>
-            <a:spLocks noGrp="1"/>
-          </p:cNvSpPr>
-          <p:nvPr>
-            <p:ph type="dt" sz="half" idx="10"/>
-          </p:nvPr>
-        </p:nvSpPr>
-        <p:spPr/>
-        <p:txBody>
-          <a:bodyPr/>
-          <a:lstStyle/>
-          <a:p>
-            <a:fld id="{C9BC64EA-EE1F-4E9E-A590-24E583B55064}" type="datetime1">
-              <a:rPr lang="sl-SI" smtClean="0"/>
-              <a:t>30. 08. 2018</a:t>
-            </a:fld>
-            <a:endParaRPr lang="en-US"/>
-          </a:p>
-        </p:txBody>
-      </p:sp>
-      <p:sp>
-        <p:nvSpPr>
-          <p:cNvPr id="3" name="Footer Placeholder 2"/>
-          <p:cNvSpPr>
-            <a:spLocks noGrp="1"/>
-          </p:cNvSpPr>
-          <p:nvPr>
-            <p:ph type="ftr" sz="quarter" idx="11"/>
-          </p:nvPr>
-        </p:nvSpPr>
-        <p:spPr/>
-        <p:txBody>
-          <a:bodyPr/>
-          <a:lstStyle/>
-          <a:p>
-            <a:r>
-              <a:rPr lang="en-US" smtClean="0"/>
-              <a:t>Visoko skalabilen NewSQL sistem za upravljanje s podatkovnimi bazami CockroachDB</a:t>
-            </a:r>
-            <a:endParaRPr lang="en-US"/>
-          </a:p>
-        </p:txBody>
-      </p:sp>
-      <p:sp>
-        <p:nvSpPr>
-          <p:cNvPr id="4" name="Slide Number Placeholder 3"/>
-          <p:cNvSpPr>
-            <a:spLocks noGrp="1"/>
-          </p:cNvSpPr>
-          <p:nvPr>
-            <p:ph type="sldNum" sz="quarter" idx="12"/>
-          </p:nvPr>
-        </p:nvSpPr>
-        <p:spPr/>
-        <p:txBody>
-          <a:bodyPr/>
-          <a:lstStyle/>
-          <a:p>
-            <a:fld id="{63C2F5EF-8BAA-4E52-921D-439986BE5530}" type="slidenum">
-              <a:rPr lang="en-US" smtClean="0"/>
-              <a:t>‹#›</a:t>
-            </a:fld>
-            <a:endParaRPr lang="en-US"/>
-          </a:p>
-        </p:txBody>
-      </p:sp>
     </p:spTree>
     <p:extLst>
       <p:ext uri="{BB962C8B-B14F-4D97-AF65-F5344CB8AC3E}">
         <p14:creationId xmlns:p14="http://schemas.microsoft.com/office/powerpoint/2010/main" val="1068301159"/>
-      </p:ext>
-    </p:extLst>
-  </p:cSld>
-  <p:clrMapOvr>
-    <a:masterClrMapping/>
-  </p:clrMapOvr>
-</p:sldLayout>
-</file>
-
-<file path=ppt/slideLayouts/slideLayout8.xml><?xml version="1.0" encoding="utf-8"?>
-<p:sldLayout xmlns:a="http://schemas.openxmlformats.org/drawingml/2006/main" xmlns:r="http://schemas.openxmlformats.org/officeDocument/2006/relationships" xmlns:p="http://schemas.openxmlformats.org/presentationml/2006/main" type="objTx" preserve="1">
-  <p:cSld name="Content with Caption">
-    <p:spTree>
-      <p:nvGrpSpPr>
-        <p:cNvPr id="1" name=""/>
-        <p:cNvGrpSpPr/>
-        <p:nvPr/>
-      </p:nvGrpSpPr>
-      <p:grpSpPr>
-        <a:xfrm>
-          <a:off x="0" y="0"/>
-          <a:ext cx="0" cy="0"/>
-          <a:chOff x="0" y="0"/>
-          <a:chExt cx="0" cy="0"/>
-        </a:xfrm>
-      </p:grpSpPr>
-      <p:sp>
-        <p:nvSpPr>
-          <p:cNvPr id="2" name="Title 1"/>
-          <p:cNvSpPr>
-            <a:spLocks noGrp="1"/>
-          </p:cNvSpPr>
-          <p:nvPr>
-            <p:ph type="title"/>
-          </p:nvPr>
-        </p:nvSpPr>
-        <p:spPr>
-          <a:xfrm>
-            <a:off x="839788" y="457200"/>
-            <a:ext cx="3932237" cy="1600200"/>
-          </a:xfrm>
-        </p:spPr>
-        <p:txBody>
-          <a:bodyPr anchor="b"/>
-          <a:lstStyle>
-            <a:lvl1pPr>
-              <a:defRPr sz="3200"/>
-            </a:lvl1pPr>
-          </a:lstStyle>
-          <a:p>
-            <a:r>
-              <a:rPr lang="en-US" smtClean="0"/>
-              <a:t>Click to edit Master title style</a:t>
-            </a:r>
-            <a:endParaRPr lang="en-US" dirty="0"/>
-          </a:p>
-        </p:txBody>
-      </p:sp>
-      <p:sp>
-        <p:nvSpPr>
-          <p:cNvPr id="3" name="Content Placeholder 2"/>
-          <p:cNvSpPr>
-            <a:spLocks noGrp="1"/>
-          </p:cNvSpPr>
-          <p:nvPr>
-            <p:ph idx="1"/>
-          </p:nvPr>
-        </p:nvSpPr>
-        <p:spPr>
-          <a:xfrm>
-            <a:off x="5183188" y="987425"/>
-            <a:ext cx="6172200" cy="4873625"/>
-          </a:xfrm>
-        </p:spPr>
-        <p:txBody>
-          <a:bodyPr/>
-          <a:lstStyle>
-            <a:lvl1pPr>
-              <a:defRPr sz="3200"/>
-            </a:lvl1pPr>
-            <a:lvl2pPr>
-              <a:defRPr sz="2800"/>
-            </a:lvl2pPr>
-            <a:lvl3pPr>
-              <a:defRPr sz="2400"/>
-            </a:lvl3pPr>
-            <a:lvl4pPr>
-              <a:defRPr sz="2000"/>
-            </a:lvl4pPr>
-            <a:lvl5pPr>
-              <a:defRPr sz="2000"/>
-            </a:lvl5pPr>
-            <a:lvl6pPr>
-              <a:defRPr sz="2000"/>
-            </a:lvl6pPr>
-            <a:lvl7pPr>
-              <a:defRPr sz="2000"/>
-            </a:lvl7pPr>
-            <a:lvl8pPr>
-              <a:defRPr sz="2000"/>
-            </a:lvl8pPr>
-            <a:lvl9pPr>
-              <a:defRPr sz="2000"/>
-            </a:lvl9pPr>
-          </a:lstStyle>
-          <a:p>
-            <a:pPr lvl="0"/>
-            <a:r>
-              <a:rPr lang="en-US" smtClean="0"/>
-              <a:t>Edit Master text styles</a:t>
-            </a:r>
-          </a:p>
-          <a:p>
-            <a:pPr lvl="1"/>
-            <a:r>
-              <a:rPr lang="en-US" smtClean="0"/>
-              <a:t>Second level</a:t>
-            </a:r>
-          </a:p>
-          <a:p>
-            <a:pPr lvl="2"/>
-            <a:r>
-              <a:rPr lang="en-US" smtClean="0"/>
-              <a:t>Third level</a:t>
-            </a:r>
-          </a:p>
-          <a:p>
-            <a:pPr lvl="3"/>
-            <a:r>
-              <a:rPr lang="en-US" smtClean="0"/>
-              <a:t>Fourth level</a:t>
-            </a:r>
-          </a:p>
-          <a:p>
-            <a:pPr lvl="4"/>
-            <a:r>
-              <a:rPr lang="en-US" smtClean="0"/>
-              <a:t>Fifth level</a:t>
-            </a:r>
-            <a:endParaRPr lang="en-US" dirty="0"/>
-          </a:p>
-        </p:txBody>
-      </p:sp>
-      <p:sp>
-        <p:nvSpPr>
-          <p:cNvPr id="4" name="Text Placeholder 3"/>
-          <p:cNvSpPr>
-            <a:spLocks noGrp="1"/>
-          </p:cNvSpPr>
-          <p:nvPr>
-            <p:ph type="body" sz="half" idx="2"/>
-          </p:nvPr>
-        </p:nvSpPr>
-        <p:spPr>
-          <a:xfrm>
-            <a:off x="839788" y="2057400"/>
-            <a:ext cx="3932237" cy="3811588"/>
-          </a:xfrm>
-        </p:spPr>
-        <p:txBody>
-          <a:bodyPr/>
-          <a:lstStyle>
-            <a:lvl1pPr marL="0" indent="0">
-              <a:buNone/>
-              <a:defRPr sz="1600"/>
-            </a:lvl1pPr>
-            <a:lvl2pPr marL="457200" indent="0">
-              <a:buNone/>
-              <a:defRPr sz="1400"/>
-            </a:lvl2pPr>
-            <a:lvl3pPr marL="914400" indent="0">
-              <a:buNone/>
-              <a:defRPr sz="1200"/>
-            </a:lvl3pPr>
-            <a:lvl4pPr marL="1371600" indent="0">
-              <a:buNone/>
-              <a:defRPr sz="1000"/>
-            </a:lvl4pPr>
-            <a:lvl5pPr marL="1828800" indent="0">
-              <a:buNone/>
-              <a:defRPr sz="1000"/>
-            </a:lvl5pPr>
-            <a:lvl6pPr marL="2286000" indent="0">
-              <a:buNone/>
-              <a:defRPr sz="1000"/>
-            </a:lvl6pPr>
-            <a:lvl7pPr marL="2743200" indent="0">
-              <a:buNone/>
-              <a:defRPr sz="1000"/>
-            </a:lvl7pPr>
-            <a:lvl8pPr marL="3200400" indent="0">
-              <a:buNone/>
-              <a:defRPr sz="1000"/>
-            </a:lvl8pPr>
-            <a:lvl9pPr marL="3657600" indent="0">
-              <a:buNone/>
-              <a:defRPr sz="1000"/>
-            </a:lvl9pPr>
-          </a:lstStyle>
-          <a:p>
-            <a:pPr lvl="0"/>
-            <a:r>
-              <a:rPr lang="en-US" smtClean="0"/>
-              <a:t>Edit Master text styles</a:t>
-            </a:r>
-          </a:p>
-        </p:txBody>
-      </p:sp>
-      <p:sp>
-        <p:nvSpPr>
-          <p:cNvPr id="5" name="Date Placeholder 4"/>
-          <p:cNvSpPr>
-            <a:spLocks noGrp="1"/>
-          </p:cNvSpPr>
-          <p:nvPr>
-            <p:ph type="dt" sz="half" idx="10"/>
-          </p:nvPr>
-        </p:nvSpPr>
-        <p:spPr/>
-        <p:txBody>
-          <a:bodyPr/>
-          <a:lstStyle/>
-          <a:p>
-            <a:fld id="{7768DD12-048E-42F1-A810-EDAB41383B17}" type="datetime1">
-              <a:rPr lang="sl-SI" smtClean="0"/>
-              <a:t>30. 08. 2018</a:t>
-            </a:fld>
-            <a:endParaRPr lang="en-US"/>
-          </a:p>
-        </p:txBody>
-      </p:sp>
-      <p:sp>
-        <p:nvSpPr>
-          <p:cNvPr id="6" name="Footer Placeholder 5"/>
-          <p:cNvSpPr>
-            <a:spLocks noGrp="1"/>
-          </p:cNvSpPr>
-          <p:nvPr>
-            <p:ph type="ftr" sz="quarter" idx="11"/>
-          </p:nvPr>
-        </p:nvSpPr>
-        <p:spPr/>
-        <p:txBody>
-          <a:bodyPr/>
-          <a:lstStyle/>
-          <a:p>
-            <a:r>
-              <a:rPr lang="en-US" smtClean="0"/>
-              <a:t>Visoko skalabilen NewSQL sistem za upravljanje s podatkovnimi bazami CockroachDB</a:t>
-            </a:r>
-            <a:endParaRPr lang="en-US"/>
-          </a:p>
-        </p:txBody>
-      </p:sp>
-      <p:sp>
-        <p:nvSpPr>
-          <p:cNvPr id="7" name="Slide Number Placeholder 6"/>
-          <p:cNvSpPr>
-            <a:spLocks noGrp="1"/>
-          </p:cNvSpPr>
-          <p:nvPr>
-            <p:ph type="sldNum" sz="quarter" idx="12"/>
-          </p:nvPr>
-        </p:nvSpPr>
-        <p:spPr/>
-        <p:txBody>
-          <a:bodyPr/>
-          <a:lstStyle/>
-          <a:p>
-            <a:fld id="{63C2F5EF-8BAA-4E52-921D-439986BE5530}" type="slidenum">
-              <a:rPr lang="en-US" smtClean="0"/>
-              <a:t>‹#›</a:t>
-            </a:fld>
-            <a:endParaRPr lang="en-US"/>
-          </a:p>
-        </p:txBody>
-      </p:sp>
-    </p:spTree>
-    <p:extLst>
-      <p:ext uri="{BB962C8B-B14F-4D97-AF65-F5344CB8AC3E}">
-        <p14:creationId xmlns:p14="http://schemas.microsoft.com/office/powerpoint/2010/main" val="1277818630"/>
-      </p:ext>
-    </p:extLst>
-  </p:cSld>
-  <p:clrMapOvr>
-    <a:masterClrMapping/>
-  </p:clrMapOvr>
-  <p:timing>
-    <p:tnLst>
-      <p:par>
-        <p:cTn id="1" dur="indefinite" restart="never" nodeType="tmRoot"/>
-      </p:par>
-    </p:tnLst>
-  </p:timing>
-</p:sldLayout>
-</file>
-
-<file path=ppt/slideLayouts/slideLayout9.xml><?xml version="1.0" encoding="utf-8"?>
-<p:sldLayout xmlns:a="http://schemas.openxmlformats.org/drawingml/2006/main" xmlns:r="http://schemas.openxmlformats.org/officeDocument/2006/relationships" xmlns:p="http://schemas.openxmlformats.org/presentationml/2006/main" type="picTx" preserve="1">
-  <p:cSld name="Picture with Caption">
-    <p:spTree>
-      <p:nvGrpSpPr>
-        <p:cNvPr id="1" name=""/>
-        <p:cNvGrpSpPr/>
-        <p:nvPr/>
-      </p:nvGrpSpPr>
-      <p:grpSpPr>
-        <a:xfrm>
-          <a:off x="0" y="0"/>
-          <a:ext cx="0" cy="0"/>
-          <a:chOff x="0" y="0"/>
-          <a:chExt cx="0" cy="0"/>
-        </a:xfrm>
-      </p:grpSpPr>
-      <p:sp>
-        <p:nvSpPr>
-          <p:cNvPr id="2" name="Title 1"/>
-          <p:cNvSpPr>
-            <a:spLocks noGrp="1"/>
-          </p:cNvSpPr>
-          <p:nvPr>
-            <p:ph type="title"/>
-          </p:nvPr>
-        </p:nvSpPr>
-        <p:spPr>
-          <a:xfrm>
-            <a:off x="839788" y="457200"/>
-            <a:ext cx="3932237" cy="1600200"/>
-          </a:xfrm>
-        </p:spPr>
-        <p:txBody>
-          <a:bodyPr anchor="b"/>
-          <a:lstStyle>
-            <a:lvl1pPr>
-              <a:defRPr sz="3200"/>
-            </a:lvl1pPr>
-          </a:lstStyle>
-          <a:p>
-            <a:r>
-              <a:rPr lang="en-US" smtClean="0"/>
-              <a:t>Click to edit Master title style</a:t>
-            </a:r>
-            <a:endParaRPr lang="en-US" dirty="0"/>
-          </a:p>
-        </p:txBody>
-      </p:sp>
-      <p:sp>
-        <p:nvSpPr>
-          <p:cNvPr id="3" name="Picture Placeholder 2"/>
-          <p:cNvSpPr>
-            <a:spLocks noGrp="1" noChangeAspect="1"/>
-          </p:cNvSpPr>
-          <p:nvPr>
-            <p:ph type="pic" idx="1"/>
-          </p:nvPr>
-        </p:nvSpPr>
-        <p:spPr>
-          <a:xfrm>
-            <a:off x="5183188" y="987425"/>
-            <a:ext cx="6172200" cy="4873625"/>
-          </a:xfrm>
-        </p:spPr>
-        <p:txBody>
-          <a:bodyPr anchor="t"/>
-          <a:lstStyle>
-            <a:lvl1pPr marL="0" indent="0">
-              <a:buNone/>
-              <a:defRPr sz="3200"/>
-            </a:lvl1pPr>
-            <a:lvl2pPr marL="457200" indent="0">
-              <a:buNone/>
-              <a:defRPr sz="2800"/>
-            </a:lvl2pPr>
-            <a:lvl3pPr marL="914400" indent="0">
-              <a:buNone/>
-              <a:defRPr sz="2400"/>
-            </a:lvl3pPr>
-            <a:lvl4pPr marL="1371600" indent="0">
-              <a:buNone/>
-              <a:defRPr sz="2000"/>
-            </a:lvl4pPr>
-            <a:lvl5pPr marL="1828800" indent="0">
-              <a:buNone/>
-              <a:defRPr sz="2000"/>
-            </a:lvl5pPr>
-            <a:lvl6pPr marL="2286000" indent="0">
-              <a:buNone/>
-              <a:defRPr sz="2000"/>
-            </a:lvl6pPr>
-            <a:lvl7pPr marL="2743200" indent="0">
-              <a:buNone/>
-              <a:defRPr sz="2000"/>
-            </a:lvl7pPr>
-            <a:lvl8pPr marL="3200400" indent="0">
-              <a:buNone/>
-              <a:defRPr sz="2000"/>
-            </a:lvl8pPr>
-            <a:lvl9pPr marL="3657600" indent="0">
-              <a:buNone/>
-              <a:defRPr sz="2000"/>
-            </a:lvl9pPr>
-          </a:lstStyle>
-          <a:p>
-            <a:r>
-              <a:rPr lang="en-US" smtClean="0"/>
-              <a:t>Click icon to add picture</a:t>
-            </a:r>
-            <a:endParaRPr lang="en-US" dirty="0"/>
-          </a:p>
-        </p:txBody>
-      </p:sp>
-      <p:sp>
-        <p:nvSpPr>
-          <p:cNvPr id="4" name="Text Placeholder 3"/>
-          <p:cNvSpPr>
-            <a:spLocks noGrp="1"/>
-          </p:cNvSpPr>
-          <p:nvPr>
-            <p:ph type="body" sz="half" idx="2"/>
-          </p:nvPr>
-        </p:nvSpPr>
-        <p:spPr>
-          <a:xfrm>
-            <a:off x="839788" y="2057400"/>
-            <a:ext cx="3932237" cy="3811588"/>
-          </a:xfrm>
-        </p:spPr>
-        <p:txBody>
-          <a:bodyPr/>
-          <a:lstStyle>
-            <a:lvl1pPr marL="0" indent="0">
-              <a:buNone/>
-              <a:defRPr sz="1600"/>
-            </a:lvl1pPr>
-            <a:lvl2pPr marL="457200" indent="0">
-              <a:buNone/>
-              <a:defRPr sz="1400"/>
-            </a:lvl2pPr>
-            <a:lvl3pPr marL="914400" indent="0">
-              <a:buNone/>
-              <a:defRPr sz="1200"/>
-            </a:lvl3pPr>
-            <a:lvl4pPr marL="1371600" indent="0">
-              <a:buNone/>
-              <a:defRPr sz="1000"/>
-            </a:lvl4pPr>
-            <a:lvl5pPr marL="1828800" indent="0">
-              <a:buNone/>
-              <a:defRPr sz="1000"/>
-            </a:lvl5pPr>
-            <a:lvl6pPr marL="2286000" indent="0">
-              <a:buNone/>
-              <a:defRPr sz="1000"/>
-            </a:lvl6pPr>
-            <a:lvl7pPr marL="2743200" indent="0">
-              <a:buNone/>
-              <a:defRPr sz="1000"/>
-            </a:lvl7pPr>
-            <a:lvl8pPr marL="3200400" indent="0">
-              <a:buNone/>
-              <a:defRPr sz="1000"/>
-            </a:lvl8pPr>
-            <a:lvl9pPr marL="3657600" indent="0">
-              <a:buNone/>
-              <a:defRPr sz="1000"/>
-            </a:lvl9pPr>
-          </a:lstStyle>
-          <a:p>
-            <a:pPr lvl="0"/>
-            <a:r>
-              <a:rPr lang="en-US" smtClean="0"/>
-              <a:t>Edit Master text styles</a:t>
-            </a:r>
-          </a:p>
-        </p:txBody>
-      </p:sp>
-      <p:sp>
-        <p:nvSpPr>
-          <p:cNvPr id="5" name="Date Placeholder 4"/>
-          <p:cNvSpPr>
-            <a:spLocks noGrp="1"/>
-          </p:cNvSpPr>
-          <p:nvPr>
-            <p:ph type="dt" sz="half" idx="10"/>
-          </p:nvPr>
-        </p:nvSpPr>
-        <p:spPr/>
-        <p:txBody>
-          <a:bodyPr/>
-          <a:lstStyle/>
-          <a:p>
-            <a:fld id="{2B9BDAE8-6237-4395-B090-833B047B7E73}" type="datetime1">
-              <a:rPr lang="sl-SI" smtClean="0"/>
-              <a:t>30. 08. 2018</a:t>
-            </a:fld>
-            <a:endParaRPr lang="en-US"/>
-          </a:p>
-        </p:txBody>
-      </p:sp>
-      <p:sp>
-        <p:nvSpPr>
-          <p:cNvPr id="6" name="Footer Placeholder 5"/>
-          <p:cNvSpPr>
-            <a:spLocks noGrp="1"/>
-          </p:cNvSpPr>
-          <p:nvPr>
-            <p:ph type="ftr" sz="quarter" idx="11"/>
-          </p:nvPr>
-        </p:nvSpPr>
-        <p:spPr/>
-        <p:txBody>
-          <a:bodyPr/>
-          <a:lstStyle/>
-          <a:p>
-            <a:r>
-              <a:rPr lang="en-US" smtClean="0"/>
-              <a:t>Visoko skalabilen NewSQL sistem za upravljanje s podatkovnimi bazami CockroachDB</a:t>
-            </a:r>
-            <a:endParaRPr lang="en-US"/>
-          </a:p>
-        </p:txBody>
-      </p:sp>
-      <p:sp>
-        <p:nvSpPr>
-          <p:cNvPr id="7" name="Slide Number Placeholder 6"/>
-          <p:cNvSpPr>
-            <a:spLocks noGrp="1"/>
-          </p:cNvSpPr>
-          <p:nvPr>
-            <p:ph type="sldNum" sz="quarter" idx="12"/>
-          </p:nvPr>
-        </p:nvSpPr>
-        <p:spPr/>
-        <p:txBody>
-          <a:bodyPr/>
-          <a:lstStyle/>
-          <a:p>
-            <a:fld id="{63C2F5EF-8BAA-4E52-921D-439986BE5530}" type="slidenum">
-              <a:rPr lang="en-US" smtClean="0"/>
-              <a:t>‹#›</a:t>
-            </a:fld>
-            <a:endParaRPr lang="en-US"/>
-          </a:p>
-        </p:txBody>
-      </p:sp>
-    </p:spTree>
-    <p:extLst>
-      <p:ext uri="{BB962C8B-B14F-4D97-AF65-F5344CB8AC3E}">
-        <p14:creationId xmlns:p14="http://schemas.microsoft.com/office/powerpoint/2010/main" val="1575313098"/>
       </p:ext>
     </p:extLst>
   </p:cSld>
@@ -4092,17 +3089,63 @@
       </p:grpSpPr>
       <p:sp>
         <p:nvSpPr>
-          <p:cNvPr id="2" name="Title Placeholder 1"/>
-          <p:cNvSpPr>
-            <a:spLocks noGrp="1"/>
-          </p:cNvSpPr>
-          <p:nvPr>
-            <p:ph type="title"/>
-          </p:nvPr>
+          <p:cNvPr id="8" name="Rectangle 7"/>
+          <p:cNvSpPr/>
+          <p:nvPr userDrawn="1"/>
         </p:nvSpPr>
         <p:spPr>
           <a:xfrm>
-            <a:off x="838200" y="365125"/>
+            <a:off x="0" y="0"/>
+            <a:ext cx="12192000" cy="1325563"/>
+          </a:xfrm>
+          <a:prstGeom prst="rect">
+            <a:avLst/>
+          </a:prstGeom>
+          <a:solidFill>
+            <a:schemeClr val="accent6"/>
+          </a:solidFill>
+          <a:ln>
+            <a:noFill/>
+          </a:ln>
+        </p:spPr>
+        <p:style>
+          <a:lnRef idx="2">
+            <a:schemeClr val="accent1">
+              <a:shade val="50000"/>
+            </a:schemeClr>
+          </a:lnRef>
+          <a:fillRef idx="1">
+            <a:schemeClr val="accent1"/>
+          </a:fillRef>
+          <a:effectRef idx="0">
+            <a:schemeClr val="accent1"/>
+          </a:effectRef>
+          <a:fontRef idx="minor">
+            <a:schemeClr val="lt1"/>
+          </a:fontRef>
+        </p:style>
+        <p:txBody>
+          <a:bodyPr rtlCol="0" anchor="ctr"/>
+          <a:lstStyle/>
+          <a:p>
+            <a:pPr algn="ctr"/>
+            <a:endParaRPr lang="en-US"/>
+          </a:p>
+        </p:txBody>
+      </p:sp>
+      <p:sp>
+        <p:nvSpPr>
+          <p:cNvPr id="2" name="Title Placeholder 1"/>
+          <p:cNvSpPr>
+            <a:spLocks noGrp="1"/>
+          </p:cNvSpPr>
+          <p:nvPr>
+            <p:ph type="title"/>
+          </p:nvPr>
+        </p:nvSpPr>
+        <p:spPr>
+          <a:xfrm>
+            <a:off x="838200" y="0"/>
             <a:ext cx="10515600" cy="1325563"/>
           </a:xfrm>
           <a:prstGeom prst="rect">
@@ -4135,8 +3178,8 @@
         </p:nvSpPr>
         <p:spPr>
           <a:xfrm>
-            <a:off x="838200" y="1825625"/>
-            <a:ext cx="10515600" cy="4351338"/>
+            <a:off x="838200" y="1504335"/>
+            <a:ext cx="10515600" cy="4672628"/>
           </a:xfrm>
           <a:prstGeom prst="rect">
             <a:avLst/>
@@ -4150,35 +3193,35 @@
           <a:p>
             <a:pPr lvl="0"/>
             <a:r>
-              <a:rPr lang="en-US" smtClean="0"/>
+              <a:rPr lang="en-US" dirty="0" smtClean="0"/>
               <a:t>Edit Master text styles</a:t>
             </a:r>
           </a:p>
           <a:p>
             <a:pPr lvl="1"/>
             <a:r>
-              <a:rPr lang="en-US" smtClean="0"/>
+              <a:rPr lang="en-US" dirty="0" smtClean="0"/>
               <a:t>Second level</a:t>
             </a:r>
           </a:p>
           <a:p>
             <a:pPr lvl="2"/>
             <a:r>
-              <a:rPr lang="en-US" smtClean="0"/>
+              <a:rPr lang="en-US" dirty="0" smtClean="0"/>
               <a:t>Third level</a:t>
             </a:r>
           </a:p>
           <a:p>
             <a:pPr lvl="3"/>
             <a:r>
-              <a:rPr lang="en-US" smtClean="0"/>
+              <a:rPr lang="en-US" dirty="0" smtClean="0"/>
               <a:t>Fourth level</a:t>
             </a:r>
           </a:p>
           <a:p>
             <a:pPr lvl="4"/>
             <a:r>
-              <a:rPr lang="en-US" smtClean="0"/>
+              <a:rPr lang="en-US" dirty="0" smtClean="0"/>
               <a:t>Fifth level</a:t>
             </a:r>
             <a:endParaRPr lang="en-US" dirty="0"/>
@@ -4218,10 +3261,10 @@
             </a:lvl1pPr>
           </a:lstStyle>
           <a:p>
-            <a:fld id="{68CF6F80-A389-4880-9824-CBBB4DF64A0F}" type="datetime1">
-              <a:rPr lang="sl-SI" smtClean="0"/>
-              <a:t>30. 08. 2018</a:t>
-            </a:fld>
+            <a:r>
+              <a:rPr lang="en-US" smtClean="0"/>
+              <a:t>Ljubljana, 2018</a:t>
+            </a:r>
             <a:endParaRPr lang="en-US"/>
           </a:p>
         </p:txBody>
@@ -4319,15 +3362,10 @@
   <p:sldLayoutIdLst>
     <p:sldLayoutId id="2147483661" r:id="rId1"/>
     <p:sldLayoutId id="2147483662" r:id="rId2"/>
-    <p:sldLayoutId id="2147483663" r:id="rId3"/>
-    <p:sldLayoutId id="2147483664" r:id="rId4"/>
-    <p:sldLayoutId id="2147483665" r:id="rId5"/>
-    <p:sldLayoutId id="2147483666" r:id="rId6"/>
-    <p:sldLayoutId id="2147483667" r:id="rId7"/>
-    <p:sldLayoutId id="2147483668" r:id="rId8"/>
-    <p:sldLayoutId id="2147483669" r:id="rId9"/>
-    <p:sldLayoutId id="2147483670" r:id="rId10"/>
-    <p:sldLayoutId id="2147483671" r:id="rId11"/>
+    <p:sldLayoutId id="2147483664" r:id="rId3"/>
+    <p:sldLayoutId id="2147483665" r:id="rId4"/>
+    <p:sldLayoutId id="2147483666" r:id="rId5"/>
+    <p:sldLayoutId id="2147483667" r:id="rId6"/>
   </p:sldLayoutIdLst>
   <p:timing>
     <p:tnLst>
@@ -4349,7 +3387,7 @@
         <a:buNone/>
         <a:defRPr sz="4400" kern="1200">
           <a:solidFill>
-            <a:schemeClr val="tx1"/>
+            <a:schemeClr val="bg1"/>
           </a:solidFill>
           <a:latin typeface="+mj-lt"/>
           <a:ea typeface="+mj-ea"/>
@@ -4369,7 +3407,10 @@
         <a:buChar char="•"/>
         <a:defRPr sz="2800" kern="1200">
           <a:solidFill>
-            <a:schemeClr val="tx1"/>
+            <a:schemeClr val="tx1">
+              <a:lumMod val="85000"/>
+              <a:lumOff val="15000"/>
+            </a:schemeClr>
           </a:solidFill>
           <a:latin typeface="+mn-lt"/>
           <a:ea typeface="+mn-ea"/>
@@ -4387,7 +3428,10 @@
         <a:buChar char="•"/>
         <a:defRPr sz="2400" kern="1200">
           <a:solidFill>
-            <a:schemeClr val="tx1"/>
+            <a:schemeClr val="tx1">
+              <a:lumMod val="85000"/>
+              <a:lumOff val="15000"/>
+            </a:schemeClr>
           </a:solidFill>
           <a:latin typeface="+mn-lt"/>
           <a:ea typeface="+mn-ea"/>
@@ -4405,7 +3449,10 @@
         <a:buChar char="•"/>
         <a:defRPr sz="2000" kern="1200">
           <a:solidFill>
-            <a:schemeClr val="tx1"/>
+            <a:schemeClr val="tx1">
+              <a:lumMod val="85000"/>
+              <a:lumOff val="15000"/>
+            </a:schemeClr>
           </a:solidFill>
           <a:latin typeface="+mn-lt"/>
           <a:ea typeface="+mn-ea"/>
@@ -4423,7 +3470,10 @@
         <a:buChar char="•"/>
         <a:defRPr sz="1800" kern="1200">
           <a:solidFill>
-            <a:schemeClr val="tx1"/>
+            <a:schemeClr val="tx1">
+              <a:lumMod val="85000"/>
+              <a:lumOff val="15000"/>
+            </a:schemeClr>
           </a:solidFill>
           <a:latin typeface="+mn-lt"/>
           <a:ea typeface="+mn-ea"/>
@@ -4441,7 +3491,10 @@
         <a:buChar char="•"/>
         <a:defRPr sz="1800" kern="1200">
           <a:solidFill>
-            <a:schemeClr val="tx1"/>
+            <a:schemeClr val="tx1">
+              <a:lumMod val="85000"/>
+              <a:lumOff val="15000"/>
+            </a:schemeClr>
           </a:solidFill>
           <a:latin typeface="+mn-lt"/>
           <a:ea typeface="+mn-ea"/>
@@ -4650,85 +3703,21 @@
         <p:spPr/>
         <p:txBody>
           <a:bodyPr>
-            <a:noAutofit/>
+            <a:normAutofit fontScale="90000"/>
           </a:bodyPr>
           <a:lstStyle/>
           <a:p>
             <a:r>
-              <a:rPr lang="en-US" sz="4800" dirty="0" err="1"/>
-              <a:t>Visoko</a:t>
-            </a:r>
-            <a:r>
-              <a:rPr lang="en-US" sz="4800" dirty="0"/>
-              <a:t> </a:t>
-            </a:r>
-            <a:r>
-              <a:rPr lang="en-US" sz="4800" dirty="0" err="1"/>
-              <a:t>skalabilen</a:t>
-            </a:r>
-            <a:r>
-              <a:rPr lang="en-US" sz="4800" dirty="0"/>
-              <a:t> </a:t>
-            </a:r>
-            <a:r>
-              <a:rPr lang="en-US" sz="4800" dirty="0" err="1"/>
-              <a:t>NewSQL</a:t>
-            </a:r>
-            <a:r>
-              <a:rPr lang="en-US" sz="4800" dirty="0"/>
-              <a:t> </a:t>
-            </a:r>
-            <a:r>
-              <a:rPr lang="en-US" sz="4800" dirty="0" err="1"/>
-              <a:t>sistem</a:t>
-            </a:r>
-            <a:r>
-              <a:rPr lang="en-US" sz="4800" dirty="0"/>
-              <a:t> </a:t>
-            </a:r>
-            <a:r>
-              <a:rPr lang="en-US" sz="4800" dirty="0" err="1"/>
-              <a:t>za</a:t>
-            </a:r>
-            <a:r>
-              <a:rPr lang="en-US" sz="4800" dirty="0"/>
-              <a:t> </a:t>
-            </a:r>
-            <a:r>
-              <a:rPr lang="en-US" sz="4800" dirty="0" err="1"/>
-              <a:t>upravljanje</a:t>
-            </a:r>
-            <a:r>
-              <a:rPr lang="en-US" sz="4800" dirty="0"/>
-              <a:t> s </a:t>
-            </a:r>
-            <a:r>
-              <a:rPr lang="en-US" sz="4800" dirty="0" err="1"/>
-              <a:t>podatkovnimi</a:t>
-            </a:r>
-            <a:r>
-              <a:rPr lang="en-US" sz="4800" dirty="0"/>
-              <a:t> </a:t>
-            </a:r>
-            <a:r>
-              <a:rPr lang="en-US" sz="4800" dirty="0" err="1"/>
-              <a:t>bazami</a:t>
-            </a:r>
-            <a:r>
-              <a:rPr lang="en-US" sz="4800" dirty="0"/>
-              <a:t> </a:t>
-            </a:r>
-            <a:r>
-              <a:rPr lang="en-US" sz="4800" dirty="0" err="1"/>
-              <a:t>CockroachDB</a:t>
-            </a:r>
-            <a:endParaRPr lang="en-US" sz="4800" dirty="0"/>
-          </a:p>
-        </p:txBody>
-      </p:sp>
-      <p:sp>
-        <p:nvSpPr>
-          <p:cNvPr id="3" name="Subtitle 2"/>
+              <a:rPr lang="en-US" smtClean="0"/>
+              <a:t>Visoko skalabilen NewSQL sistem za upravljanje s podatkovnimi bazami CockroachDB</a:t>
+            </a:r>
+            <a:endParaRPr lang="en-US" dirty="0"/>
+          </a:p>
+        </p:txBody>
+      </p:sp>
+      <p:sp>
+        <p:nvSpPr>
+          <p:cNvPr id="17" name="Subtitle 16"/>
           <p:cNvSpPr>
             <a:spLocks noGrp="1"/>
           </p:cNvSpPr>
@@ -4736,13 +3725,62 @@
             <p:ph type="subTitle" idx="1"/>
           </p:nvPr>
         </p:nvSpPr>
-        <p:spPr/>
-        <p:txBody>
-          <a:bodyPr>
-            <a:normAutofit/>
+        <p:spPr>
+          <a:xfrm>
+            <a:off x="1524000" y="4114312"/>
+            <a:ext cx="9144000" cy="2313381"/>
+          </a:xfrm>
+        </p:spPr>
+        <p:txBody>
+          <a:bodyPr anchor="b">
+            <a:normAutofit fontScale="92500" lnSpcReduction="20000"/>
           </a:bodyPr>
           <a:lstStyle/>
           <a:p>
+            <a:r>
+              <a:rPr lang="sl-SI" dirty="0" smtClean="0"/>
+              <a:t>Univerza </a:t>
+            </a:r>
+            <a:r>
+              <a:rPr lang="sl-SI" dirty="0"/>
+              <a:t>v Ljubljani, Fakulteta za računalništvo in </a:t>
+            </a:r>
+            <a:r>
+              <a:rPr lang="sl-SI" dirty="0" smtClean="0"/>
+              <a:t>informatiko</a:t>
+            </a:r>
+          </a:p>
+          <a:p>
+            <a:endParaRPr lang="sl-SI" dirty="0" smtClean="0"/>
+          </a:p>
+          <a:p>
+            <a:r>
+              <a:rPr lang="sl-SI" dirty="0" smtClean="0"/>
+              <a:t>Avtor: Matjaž Mav</a:t>
+            </a:r>
+          </a:p>
+          <a:p>
+            <a:r>
+              <a:rPr lang="sl-SI" dirty="0" smtClean="0"/>
+              <a:t>Mentor</a:t>
+            </a:r>
+            <a:r>
+              <a:rPr lang="sl-SI" dirty="0"/>
+              <a:t>: izr. prof. dr. Matjaž </a:t>
+            </a:r>
+            <a:r>
+              <a:rPr lang="sl-SI" dirty="0" smtClean="0"/>
+              <a:t>Kukar</a:t>
+            </a:r>
+          </a:p>
+          <a:p>
+            <a:endParaRPr lang="sl-SI" dirty="0"/>
+          </a:p>
+          <a:p>
+            <a:r>
+              <a:rPr lang="sl-SI" dirty="0" smtClean="0"/>
+              <a:t>Ljubljana, 2018</a:t>
+            </a:r>
             <a:endParaRPr lang="en-US" dirty="0"/>
           </a:p>
         </p:txBody>
@@ -4791,127 +3829,60 @@
             <a:spLocks noGrp="1"/>
           </p:cNvSpPr>
           <p:nvPr>
-            <p:ph type="title"/>
-          </p:nvPr>
-        </p:nvSpPr>
-        <p:spPr/>
+            <p:ph type="title" idx="4294967295"/>
+          </p:nvPr>
+        </p:nvSpPr>
+        <p:spPr>
+          <a:xfrm>
+            <a:off x="0" y="0"/>
+            <a:ext cx="10515600" cy="1325563"/>
+          </a:xfrm>
+        </p:spPr>
         <p:txBody>
           <a:bodyPr/>
           <a:lstStyle/>
           <a:p>
             <a:r>
               <a:rPr lang="sl-SI" dirty="0" smtClean="0"/>
-              <a:t>Izvedba analize stičnih operacij</a:t>
+              <a:t>Rezultati primerjalne analize zmogljivosti (2)</a:t>
             </a:r>
             <a:endParaRPr lang="en-US" dirty="0"/>
           </a:p>
         </p:txBody>
       </p:sp>
-      <p:sp>
-        <p:nvSpPr>
-          <p:cNvPr id="3" name="Content Placeholder 2"/>
-          <p:cNvSpPr>
-            <a:spLocks noGrp="1"/>
-          </p:cNvSpPr>
-          <p:nvPr>
-            <p:ph idx="1"/>
-          </p:nvPr>
-        </p:nvSpPr>
-        <p:spPr/>
-        <p:txBody>
-          <a:bodyPr/>
-          <a:lstStyle/>
-          <a:p>
-            <a:r>
-              <a:rPr lang="sl-SI" dirty="0"/>
-              <a:t>p</a:t>
-            </a:r>
-            <a:r>
-              <a:rPr lang="sl-SI" dirty="0" smtClean="0"/>
-              <a:t>riprava podatkov</a:t>
-            </a:r>
-          </a:p>
-          <a:p>
-            <a:endParaRPr lang="sl-SI" dirty="0" smtClean="0"/>
-          </a:p>
-          <a:p>
-            <a:endParaRPr lang="en-US" dirty="0"/>
-          </a:p>
-        </p:txBody>
-      </p:sp>
-      <p:sp>
-        <p:nvSpPr>
-          <p:cNvPr id="4" name="Date Placeholder 3"/>
-          <p:cNvSpPr>
-            <a:spLocks noGrp="1"/>
-          </p:cNvSpPr>
-          <p:nvPr>
-            <p:ph type="dt" sz="half" idx="10"/>
-          </p:nvPr>
-        </p:nvSpPr>
-        <p:spPr/>
-        <p:txBody>
-          <a:bodyPr/>
-          <a:lstStyle/>
-          <a:p>
-            <a:fld id="{651594FC-D0FF-4B68-A18A-A12B9B99322B}" type="datetime1">
-              <a:rPr lang="sl-SI" smtClean="0"/>
-              <a:t>30. 08. 2018</a:t>
-            </a:fld>
-            <a:endParaRPr lang="en-US"/>
-          </a:p>
-        </p:txBody>
-      </p:sp>
-      <p:sp>
-        <p:nvSpPr>
-          <p:cNvPr id="5" name="Footer Placeholder 4"/>
-          <p:cNvSpPr>
-            <a:spLocks noGrp="1"/>
-          </p:cNvSpPr>
-          <p:nvPr>
-            <p:ph type="ftr" sz="quarter" idx="11"/>
-          </p:nvPr>
-        </p:nvSpPr>
-        <p:spPr/>
-        <p:txBody>
-          <a:bodyPr/>
-          <a:lstStyle/>
-          <a:p>
-            <a:r>
-              <a:rPr lang="en-US" smtClean="0"/>
-              <a:t>Visoko skalabilen NewSQL sistem za upravljanje s podatkovnimi bazami CockroachDB</a:t>
-            </a:r>
-            <a:endParaRPr lang="en-US"/>
-          </a:p>
-        </p:txBody>
-      </p:sp>
-      <p:sp>
-        <p:nvSpPr>
-          <p:cNvPr id="6" name="Slide Number Placeholder 5"/>
-          <p:cNvSpPr>
-            <a:spLocks noGrp="1"/>
-          </p:cNvSpPr>
-          <p:nvPr>
-            <p:ph type="sldNum" sz="quarter" idx="12"/>
-          </p:nvPr>
-        </p:nvSpPr>
-        <p:spPr/>
-        <p:txBody>
-          <a:bodyPr/>
-          <a:lstStyle/>
-          <a:p>
-            <a:fld id="{63C2F5EF-8BAA-4E52-921D-439986BE5530}" type="slidenum">
-              <a:rPr lang="en-US" smtClean="0"/>
-              <a:t>10</a:t>
-            </a:fld>
-            <a:endParaRPr lang="en-US"/>
-          </a:p>
-        </p:txBody>
-      </p:sp>
+      <p:pic>
+        <p:nvPicPr>
+          <p:cNvPr id="8" name="Picture 7"/>
+          <p:cNvPicPr>
+            <a:picLocks noChangeAspect="1"/>
+          </p:cNvPicPr>
+          <p:nvPr/>
+        </p:nvPicPr>
+        <p:blipFill rotWithShape="1">
+          <a:blip r:embed="rId3">
+            <a:extLst>
+              <a:ext uri="{28A0092B-C50C-407E-A947-70E740481C1C}">
+                <a14:useLocalDpi xmlns:a14="http://schemas.microsoft.com/office/drawing/2010/main" val="0"/>
+              </a:ext>
+            </a:extLst>
+          </a:blip>
+          <a:srcRect l="1734" t="1569" r="1368" b="2157"/>
+          <a:stretch/>
+        </p:blipFill>
+        <p:spPr>
+          <a:xfrm>
+            <a:off x="1801021" y="0"/>
+            <a:ext cx="8589959" cy="6858000"/>
+          </a:xfrm>
+          <a:prstGeom prst="rect">
+            <a:avLst/>
+          </a:prstGeom>
+        </p:spPr>
+      </p:pic>
     </p:spTree>
     <p:extLst>
       <p:ext uri="{BB962C8B-B14F-4D97-AF65-F5344CB8AC3E}">
-        <p14:creationId xmlns:p14="http://schemas.microsoft.com/office/powerpoint/2010/main" val="883620298"/>
+        <p14:creationId xmlns:p14="http://schemas.microsoft.com/office/powerpoint/2010/main" val="16646556"/>
       </p:ext>
     </p:extLst>
   </p:cSld>
@@ -4945,6 +3916,423 @@
           <a:chExt cx="0" cy="0"/>
         </a:xfrm>
       </p:grpSpPr>
+      <p:pic>
+        <p:nvPicPr>
+          <p:cNvPr id="10" name="Picture 9"/>
+          <p:cNvPicPr>
+            <a:picLocks noChangeAspect="1"/>
+          </p:cNvPicPr>
+          <p:nvPr/>
+        </p:nvPicPr>
+        <p:blipFill rotWithShape="1">
+          <a:blip r:embed="rId3">
+            <a:extLst>
+              <a:ext uri="{28A0092B-C50C-407E-A947-70E740481C1C}">
+                <a14:useLocalDpi xmlns:a14="http://schemas.microsoft.com/office/drawing/2010/main" val="0"/>
+              </a:ext>
+            </a:extLst>
+          </a:blip>
+          <a:srcRect l="915" t="569" r="809" b="50648"/>
+          <a:stretch/>
+        </p:blipFill>
+        <p:spPr>
+          <a:xfrm>
+            <a:off x="284480" y="1740465"/>
+            <a:ext cx="5669280" cy="3377071"/>
+          </a:xfrm>
+          <a:prstGeom prst="rect">
+            <a:avLst/>
+          </a:prstGeom>
+        </p:spPr>
+      </p:pic>
+      <p:pic>
+        <p:nvPicPr>
+          <p:cNvPr id="11" name="Picture 10"/>
+          <p:cNvPicPr>
+            <a:picLocks noChangeAspect="1"/>
+          </p:cNvPicPr>
+          <p:nvPr/>
+        </p:nvPicPr>
+        <p:blipFill rotWithShape="1">
+          <a:blip r:embed="rId3">
+            <a:extLst>
+              <a:ext uri="{28A0092B-C50C-407E-A947-70E740481C1C}">
+                <a14:useLocalDpi xmlns:a14="http://schemas.microsoft.com/office/drawing/2010/main" val="0"/>
+              </a:ext>
+            </a:extLst>
+          </a:blip>
+          <a:srcRect l="988" t="50807" r="661" b="917"/>
+          <a:stretch/>
+        </p:blipFill>
+        <p:spPr>
+          <a:xfrm>
+            <a:off x="6238240" y="1759251"/>
+            <a:ext cx="5669280" cy="3339499"/>
+          </a:xfrm>
+          <a:prstGeom prst="rect">
+            <a:avLst/>
+          </a:prstGeom>
+        </p:spPr>
+      </p:pic>
+    </p:spTree>
+    <p:extLst>
+      <p:ext uri="{BB962C8B-B14F-4D97-AF65-F5344CB8AC3E}">
+        <p14:creationId xmlns:p14="http://schemas.microsoft.com/office/powerpoint/2010/main" val="878805493"/>
+      </p:ext>
+    </p:extLst>
+  </p:cSld>
+  <p:clrMapOvr>
+    <a:masterClrMapping/>
+  </p:clrMapOvr>
+  <p:timing>
+    <p:tnLst>
+      <p:par>
+        <p:cTn id="1" dur="indefinite" restart="never" nodeType="tmRoot"/>
+      </p:par>
+    </p:tnLst>
+  </p:timing>
+</p:sld>
+</file>
+
+<file path=ppt/slides/slide12.xml><?xml version="1.0" encoding="utf-8"?>
+<p:sld xmlns:a="http://schemas.openxmlformats.org/drawingml/2006/main" xmlns:r="http://schemas.openxmlformats.org/officeDocument/2006/relationships" xmlns:p="http://schemas.openxmlformats.org/presentationml/2006/main">
+  <p:cSld>
+    <p:spTree>
+      <p:nvGrpSpPr>
+        <p:cNvPr id="1" name=""/>
+        <p:cNvGrpSpPr/>
+        <p:nvPr/>
+      </p:nvGrpSpPr>
+      <p:grpSpPr>
+        <a:xfrm>
+          <a:off x="0" y="0"/>
+          <a:ext cx="0" cy="0"/>
+          <a:chOff x="0" y="0"/>
+          <a:chExt cx="0" cy="0"/>
+        </a:xfrm>
+      </p:grpSpPr>
+      <p:sp>
+        <p:nvSpPr>
+          <p:cNvPr id="2" name="Title 1"/>
+          <p:cNvSpPr>
+            <a:spLocks noGrp="1"/>
+          </p:cNvSpPr>
+          <p:nvPr>
+            <p:ph type="title"/>
+          </p:nvPr>
+        </p:nvSpPr>
+        <p:spPr/>
+        <p:txBody>
+          <a:bodyPr/>
+          <a:lstStyle/>
+          <a:p>
+            <a:r>
+              <a:rPr lang="sl-SI" dirty="0" smtClean="0"/>
+              <a:t>Izvedba analize stičnih operacij</a:t>
+            </a:r>
+            <a:endParaRPr lang="en-US" dirty="0"/>
+          </a:p>
+        </p:txBody>
+      </p:sp>
+      <p:sp>
+        <p:nvSpPr>
+          <p:cNvPr id="3" name="Content Placeholder 2"/>
+          <p:cNvSpPr>
+            <a:spLocks noGrp="1"/>
+          </p:cNvSpPr>
+          <p:nvPr>
+            <p:ph idx="1"/>
+          </p:nvPr>
+        </p:nvSpPr>
+        <p:spPr/>
+        <p:txBody>
+          <a:bodyPr/>
+          <a:lstStyle/>
+          <a:p>
+            <a:r>
+              <a:rPr lang="sl-SI" dirty="0"/>
+              <a:t>p</a:t>
+            </a:r>
+            <a:r>
+              <a:rPr lang="sl-SI" dirty="0" smtClean="0"/>
+              <a:t>riprava podatkov</a:t>
+            </a:r>
+          </a:p>
+          <a:p>
+            <a:endParaRPr lang="sl-SI" dirty="0" smtClean="0"/>
+          </a:p>
+          <a:p>
+            <a:endParaRPr lang="en-US" dirty="0"/>
+          </a:p>
+        </p:txBody>
+      </p:sp>
+      <p:sp>
+        <p:nvSpPr>
+          <p:cNvPr id="4" name="Date Placeholder 3"/>
+          <p:cNvSpPr>
+            <a:spLocks noGrp="1"/>
+          </p:cNvSpPr>
+          <p:nvPr>
+            <p:ph type="dt" sz="half" idx="10"/>
+          </p:nvPr>
+        </p:nvSpPr>
+        <p:spPr/>
+        <p:txBody>
+          <a:bodyPr/>
+          <a:lstStyle/>
+          <a:p>
+            <a:r>
+              <a:rPr lang="en-US" smtClean="0"/>
+              <a:t>Ljubljana, 2018</a:t>
+            </a:r>
+            <a:endParaRPr lang="en-US"/>
+          </a:p>
+        </p:txBody>
+      </p:sp>
+      <p:sp>
+        <p:nvSpPr>
+          <p:cNvPr id="5" name="Footer Placeholder 4"/>
+          <p:cNvSpPr>
+            <a:spLocks noGrp="1"/>
+          </p:cNvSpPr>
+          <p:nvPr>
+            <p:ph type="ftr" sz="quarter" idx="11"/>
+          </p:nvPr>
+        </p:nvSpPr>
+        <p:spPr/>
+        <p:txBody>
+          <a:bodyPr/>
+          <a:lstStyle/>
+          <a:p>
+            <a:r>
+              <a:rPr lang="en-US" smtClean="0"/>
+              <a:t>Visoko skalabilen NewSQL sistem za upravljanje s podatkovnimi bazami CockroachDB</a:t>
+            </a:r>
+            <a:endParaRPr lang="en-US"/>
+          </a:p>
+        </p:txBody>
+      </p:sp>
+      <p:sp>
+        <p:nvSpPr>
+          <p:cNvPr id="6" name="Slide Number Placeholder 5"/>
+          <p:cNvSpPr>
+            <a:spLocks noGrp="1"/>
+          </p:cNvSpPr>
+          <p:nvPr>
+            <p:ph type="sldNum" sz="quarter" idx="12"/>
+          </p:nvPr>
+        </p:nvSpPr>
+        <p:spPr/>
+        <p:txBody>
+          <a:bodyPr/>
+          <a:lstStyle/>
+          <a:p>
+            <a:fld id="{63C2F5EF-8BAA-4E52-921D-439986BE5530}" type="slidenum">
+              <a:rPr lang="en-US" smtClean="0"/>
+              <a:t>12</a:t>
+            </a:fld>
+            <a:endParaRPr lang="en-US"/>
+          </a:p>
+        </p:txBody>
+      </p:sp>
+    </p:spTree>
+    <p:extLst>
+      <p:ext uri="{BB962C8B-B14F-4D97-AF65-F5344CB8AC3E}">
+        <p14:creationId xmlns:p14="http://schemas.microsoft.com/office/powerpoint/2010/main" val="883620298"/>
+      </p:ext>
+    </p:extLst>
+  </p:cSld>
+  <p:clrMapOvr>
+    <a:masterClrMapping/>
+  </p:clrMapOvr>
+  <p:timing>
+    <p:tnLst>
+      <p:par>
+        <p:cTn id="1" dur="indefinite" restart="never" nodeType="tmRoot"/>
+      </p:par>
+    </p:tnLst>
+  </p:timing>
+</p:sld>
+</file>
+
+<file path=ppt/slides/slide13.xml><?xml version="1.0" encoding="utf-8"?>
+<p:sld xmlns:a="http://schemas.openxmlformats.org/drawingml/2006/main" xmlns:r="http://schemas.openxmlformats.org/officeDocument/2006/relationships" xmlns:p="http://schemas.openxmlformats.org/presentationml/2006/main">
+  <p:cSld>
+    <p:spTree>
+      <p:nvGrpSpPr>
+        <p:cNvPr id="1" name=""/>
+        <p:cNvGrpSpPr/>
+        <p:nvPr/>
+      </p:nvGrpSpPr>
+      <p:grpSpPr>
+        <a:xfrm>
+          <a:off x="0" y="0"/>
+          <a:ext cx="0" cy="0"/>
+          <a:chOff x="0" y="0"/>
+          <a:chExt cx="0" cy="0"/>
+        </a:xfrm>
+      </p:grpSpPr>
+      <p:sp>
+        <p:nvSpPr>
+          <p:cNvPr id="2" name="Title 1"/>
+          <p:cNvSpPr>
+            <a:spLocks noGrp="1"/>
+          </p:cNvSpPr>
+          <p:nvPr>
+            <p:ph type="title"/>
+          </p:nvPr>
+        </p:nvSpPr>
+        <p:spPr/>
+        <p:txBody>
+          <a:bodyPr/>
+          <a:lstStyle/>
+          <a:p>
+            <a:r>
+              <a:rPr lang="sl-SI" dirty="0" smtClean="0"/>
+              <a:t>Optimizacija stičnih operacij</a:t>
+            </a:r>
+            <a:endParaRPr lang="en-US" dirty="0"/>
+          </a:p>
+        </p:txBody>
+      </p:sp>
+      <p:sp>
+        <p:nvSpPr>
+          <p:cNvPr id="3" name="Content Placeholder 2"/>
+          <p:cNvSpPr>
+            <a:spLocks noGrp="1"/>
+          </p:cNvSpPr>
+          <p:nvPr>
+            <p:ph idx="1"/>
+          </p:nvPr>
+        </p:nvSpPr>
+        <p:spPr/>
+        <p:txBody>
+          <a:bodyPr/>
+          <a:lstStyle/>
+          <a:p>
+            <a:r>
+              <a:rPr lang="sl-SI" dirty="0"/>
+              <a:t>p</a:t>
+            </a:r>
+            <a:r>
+              <a:rPr lang="sl-SI" dirty="0" smtClean="0"/>
+              <a:t>riprava podatkov</a:t>
+            </a:r>
+          </a:p>
+          <a:p>
+            <a:endParaRPr lang="sl-SI" dirty="0" smtClean="0"/>
+          </a:p>
+          <a:p>
+            <a:endParaRPr lang="en-US" dirty="0"/>
+          </a:p>
+        </p:txBody>
+      </p:sp>
+      <p:sp>
+        <p:nvSpPr>
+          <p:cNvPr id="4" name="Date Placeholder 3"/>
+          <p:cNvSpPr>
+            <a:spLocks noGrp="1"/>
+          </p:cNvSpPr>
+          <p:nvPr>
+            <p:ph type="dt" sz="half" idx="10"/>
+          </p:nvPr>
+        </p:nvSpPr>
+        <p:spPr/>
+        <p:txBody>
+          <a:bodyPr/>
+          <a:lstStyle/>
+          <a:p>
+            <a:r>
+              <a:rPr lang="en-US" smtClean="0"/>
+              <a:t>Ljubljana, 2018</a:t>
+            </a:r>
+            <a:endParaRPr lang="en-US"/>
+          </a:p>
+        </p:txBody>
+      </p:sp>
+      <p:sp>
+        <p:nvSpPr>
+          <p:cNvPr id="5" name="Footer Placeholder 4"/>
+          <p:cNvSpPr>
+            <a:spLocks noGrp="1"/>
+          </p:cNvSpPr>
+          <p:nvPr>
+            <p:ph type="ftr" sz="quarter" idx="11"/>
+          </p:nvPr>
+        </p:nvSpPr>
+        <p:spPr/>
+        <p:txBody>
+          <a:bodyPr/>
+          <a:lstStyle/>
+          <a:p>
+            <a:r>
+              <a:rPr lang="en-US" smtClean="0"/>
+              <a:t>Visoko skalabilen NewSQL sistem za upravljanje s podatkovnimi bazami CockroachDB</a:t>
+            </a:r>
+            <a:endParaRPr lang="en-US"/>
+          </a:p>
+        </p:txBody>
+      </p:sp>
+      <p:sp>
+        <p:nvSpPr>
+          <p:cNvPr id="6" name="Slide Number Placeholder 5"/>
+          <p:cNvSpPr>
+            <a:spLocks noGrp="1"/>
+          </p:cNvSpPr>
+          <p:nvPr>
+            <p:ph type="sldNum" sz="quarter" idx="12"/>
+          </p:nvPr>
+        </p:nvSpPr>
+        <p:spPr/>
+        <p:txBody>
+          <a:bodyPr/>
+          <a:lstStyle/>
+          <a:p>
+            <a:fld id="{63C2F5EF-8BAA-4E52-921D-439986BE5530}" type="slidenum">
+              <a:rPr lang="en-US" smtClean="0"/>
+              <a:t>13</a:t>
+            </a:fld>
+            <a:endParaRPr lang="en-US"/>
+          </a:p>
+        </p:txBody>
+      </p:sp>
+    </p:spTree>
+    <p:extLst>
+      <p:ext uri="{BB962C8B-B14F-4D97-AF65-F5344CB8AC3E}">
+        <p14:creationId xmlns:p14="http://schemas.microsoft.com/office/powerpoint/2010/main" val="3735654123"/>
+      </p:ext>
+    </p:extLst>
+  </p:cSld>
+  <p:clrMapOvr>
+    <a:masterClrMapping/>
+  </p:clrMapOvr>
+  <p:timing>
+    <p:tnLst>
+      <p:par>
+        <p:cTn id="1" dur="indefinite" restart="never" nodeType="tmRoot"/>
+      </p:par>
+    </p:tnLst>
+  </p:timing>
+</p:sld>
+</file>
+
+<file path=ppt/slides/slide14.xml><?xml version="1.0" encoding="utf-8"?>
+<p:sld xmlns:a="http://schemas.openxmlformats.org/drawingml/2006/main" xmlns:r="http://schemas.openxmlformats.org/officeDocument/2006/relationships" xmlns:p="http://schemas.openxmlformats.org/presentationml/2006/main">
+  <p:cSld>
+    <p:spTree>
+      <p:nvGrpSpPr>
+        <p:cNvPr id="1" name=""/>
+        <p:cNvGrpSpPr/>
+        <p:nvPr/>
+      </p:nvGrpSpPr>
+      <p:grpSpPr>
+        <a:xfrm>
+          <a:off x="0" y="0"/>
+          <a:ext cx="0" cy="0"/>
+          <a:chOff x="0" y="0"/>
+          <a:chExt cx="0" cy="0"/>
+        </a:xfrm>
+      </p:grpSpPr>
       <p:sp>
         <p:nvSpPr>
           <p:cNvPr id="2" name="Title 1"/>
@@ -5012,10 +4400,10 @@
           <a:bodyPr/>
           <a:lstStyle/>
           <a:p>
-            <a:fld id="{6685FC13-DA23-4C01-9A85-09118A634212}" type="datetime1">
-              <a:rPr lang="sl-SI" smtClean="0"/>
-              <a:t>30. 08. 2018</a:t>
-            </a:fld>
+            <a:r>
+              <a:rPr lang="en-US" smtClean="0"/>
+              <a:t>Ljubljana, 2018</a:t>
+            </a:r>
             <a:endParaRPr lang="en-US"/>
           </a:p>
         </p:txBody>
@@ -5060,7 +4448,7 @@
           <a:p>
             <a:fld id="{63C2F5EF-8BAA-4E52-921D-439986BE5530}" type="slidenum">
               <a:rPr lang="en-US" smtClean="0"/>
-              <a:t>11</a:t>
+              <a:t>14</a:t>
             </a:fld>
             <a:endParaRPr lang="en-US"/>
           </a:p>
@@ -5086,7 +4474,7 @@
 </p:sld>
 </file>
 
-<file path=ppt/slides/slide12.xml><?xml version="1.0" encoding="utf-8"?>
+<file path=ppt/slides/slide15.xml><?xml version="1.0" encoding="utf-8"?>
 <p:sld xmlns:a="http://schemas.openxmlformats.org/drawingml/2006/main" xmlns:r="http://schemas.openxmlformats.org/officeDocument/2006/relationships" xmlns:p="http://schemas.openxmlformats.org/presentationml/2006/main" show="0">
   <p:cSld>
     <p:spTree>
@@ -5105,28 +4493,27 @@
       </p:grpSpPr>
       <p:sp>
         <p:nvSpPr>
-          <p:cNvPr id="2" name="Title 1"/>
-          <p:cNvSpPr>
-            <a:spLocks noGrp="1"/>
-          </p:cNvSpPr>
-          <p:nvPr>
-            <p:ph type="title"/>
+          <p:cNvPr id="3" name="Date Placeholder 2"/>
+          <p:cNvSpPr>
+            <a:spLocks noGrp="1"/>
+          </p:cNvSpPr>
+          <p:nvPr>
+            <p:ph type="dt" sz="half" idx="4294967295"/>
           </p:nvPr>
         </p:nvSpPr>
         <p:spPr>
           <a:xfrm>
-            <a:off x="838200" y="2766218"/>
-            <a:ext cx="10515600" cy="1325563"/>
+            <a:off x="838200" y="6356350"/>
+            <a:ext cx="2743200" cy="365125"/>
           </a:xfrm>
         </p:spPr>
         <p:txBody>
           <a:bodyPr/>
           <a:lstStyle/>
           <a:p>
-            <a:pPr algn="ctr"/>
-            <a:r>
-              <a:rPr lang="sl-SI" dirty="0" smtClean="0"/>
-              <a:t>Hvala za pozornost!</a:t>
+            <a:r>
+              <a:rPr lang="en-US" dirty="0" smtClean="0"/>
+              <a:t>Ljubljana, 2018</a:t>
             </a:r>
             <a:endParaRPr lang="en-US" dirty="0"/>
           </a:p>
@@ -5134,22 +4521,56 @@
       </p:sp>
       <p:sp>
         <p:nvSpPr>
-          <p:cNvPr id="3" name="Date Placeholder 2"/>
-          <p:cNvSpPr>
-            <a:spLocks noGrp="1"/>
-          </p:cNvSpPr>
-          <p:nvPr>
-            <p:ph type="dt" sz="half" idx="10"/>
-          </p:nvPr>
-        </p:nvSpPr>
-        <p:spPr/>
-        <p:txBody>
-          <a:bodyPr/>
-          <a:lstStyle/>
-          <a:p>
-            <a:fld id="{1B717E85-3F73-480F-80A8-84A4293D2601}" type="datetime1">
-              <a:rPr lang="sl-SI" smtClean="0"/>
-              <a:t>30. 08. 2018</a:t>
+          <p:cNvPr id="4" name="Footer Placeholder 3"/>
+          <p:cNvSpPr>
+            <a:spLocks noGrp="1"/>
+          </p:cNvSpPr>
+          <p:nvPr>
+            <p:ph type="ftr" sz="quarter" idx="4294967295"/>
+          </p:nvPr>
+        </p:nvSpPr>
+        <p:spPr>
+          <a:xfrm>
+            <a:off x="4038600" y="6356350"/>
+            <a:ext cx="4114800" cy="365125"/>
+          </a:xfrm>
+        </p:spPr>
+        <p:txBody>
+          <a:bodyPr/>
+          <a:lstStyle/>
+          <a:p>
+            <a:r>
+              <a:rPr lang="en-US" smtClean="0"/>
+              <a:t>Visoko skalabilen NewSQL sistem za upravljanje s podatkovnimi bazami CockroachDB</a:t>
+            </a:r>
+            <a:endParaRPr lang="en-US"/>
+          </a:p>
+        </p:txBody>
+      </p:sp>
+      <p:sp>
+        <p:nvSpPr>
+          <p:cNvPr id="5" name="Slide Number Placeholder 4"/>
+          <p:cNvSpPr>
+            <a:spLocks noGrp="1"/>
+          </p:cNvSpPr>
+          <p:nvPr>
+            <p:ph type="sldNum" sz="quarter" idx="4294967295"/>
+          </p:nvPr>
+        </p:nvSpPr>
+        <p:spPr>
+          <a:xfrm>
+            <a:off x="8610600" y="6356350"/>
+            <a:ext cx="2743200" cy="365125"/>
+          </a:xfrm>
+        </p:spPr>
+        <p:txBody>
+          <a:bodyPr/>
+          <a:lstStyle/>
+          <a:p>
+            <a:fld id="{63C2F5EF-8BAA-4E52-921D-439986BE5530}" type="slidenum">
+              <a:rPr lang="en-US" smtClean="0"/>
+              <a:pPr/>
+              <a:t>15</a:t>
             </a:fld>
             <a:endParaRPr lang="en-US"/>
           </a:p>
@@ -5157,47 +4578,44 @@
       </p:sp>
       <p:sp>
         <p:nvSpPr>
-          <p:cNvPr id="4" name="Footer Placeholder 3"/>
-          <p:cNvSpPr>
-            <a:spLocks noGrp="1"/>
-          </p:cNvSpPr>
-          <p:nvPr>
-            <p:ph type="ftr" sz="quarter" idx="11"/>
-          </p:nvPr>
-        </p:nvSpPr>
-        <p:spPr/>
-        <p:txBody>
-          <a:bodyPr/>
-          <a:lstStyle/>
-          <a:p>
-            <a:r>
-              <a:rPr lang="en-US" smtClean="0"/>
-              <a:t>Visoko skalabilen NewSQL sistem za upravljanje s podatkovnimi bazami CockroachDB</a:t>
-            </a:r>
-            <a:endParaRPr lang="en-US"/>
-          </a:p>
-        </p:txBody>
-      </p:sp>
-      <p:sp>
-        <p:nvSpPr>
-          <p:cNvPr id="5" name="Slide Number Placeholder 4"/>
-          <p:cNvSpPr>
-            <a:spLocks noGrp="1"/>
-          </p:cNvSpPr>
-          <p:nvPr>
-            <p:ph type="sldNum" sz="quarter" idx="12"/>
-          </p:nvPr>
-        </p:nvSpPr>
-        <p:spPr/>
-        <p:txBody>
-          <a:bodyPr/>
-          <a:lstStyle/>
-          <a:p>
-            <a:fld id="{63C2F5EF-8BAA-4E52-921D-439986BE5530}" type="slidenum">
-              <a:rPr lang="en-US" smtClean="0"/>
-              <a:t>12</a:t>
-            </a:fld>
-            <a:endParaRPr lang="en-US"/>
+          <p:cNvPr id="2" name="Title 1"/>
+          <p:cNvSpPr>
+            <a:spLocks noGrp="1"/>
+          </p:cNvSpPr>
+          <p:nvPr>
+            <p:ph type="title" idx="4294967295"/>
+          </p:nvPr>
+        </p:nvSpPr>
+        <p:spPr>
+          <a:xfrm>
+            <a:off x="0" y="2803525"/>
+            <a:ext cx="12192000" cy="1325563"/>
+          </a:xfrm>
+        </p:spPr>
+        <p:txBody>
+          <a:bodyPr/>
+          <a:lstStyle/>
+          <a:p>
+            <a:pPr algn="ctr"/>
+            <a:r>
+              <a:rPr lang="sl-SI" dirty="0" smtClean="0">
+                <a:solidFill>
+                  <a:schemeClr val="tx1">
+                    <a:lumMod val="85000"/>
+                    <a:lumOff val="15000"/>
+                  </a:schemeClr>
+                </a:solidFill>
+              </a:rPr>
+              <a:t>Hvala za pozornost!</a:t>
+            </a:r>
+            <a:endParaRPr lang="en-US" dirty="0">
+              <a:solidFill>
+                <a:schemeClr val="tx1">
+                  <a:lumMod val="85000"/>
+                  <a:lumOff val="15000"/>
+                </a:schemeClr>
+              </a:solidFill>
+            </a:endParaRPr>
           </a:p>
         </p:txBody>
       </p:sp>
@@ -5216,15 +4634,6 @@
         <p:blipFill rotWithShape="1">
           <a:blip r:embed="rId9">
             <a:extLst>
-              <a:ext uri="{BEBA8EAE-BF5A-486C-A8C5-ECC9F3942E4B}">
-                <a14:imgProps xmlns:a14="http://schemas.microsoft.com/office/drawing/2010/main">
-                  <a14:imgLayer r:embed="rId10">
-                    <a14:imgEffect>
-                      <a14:backgroundRemoval t="21500" b="83500" l="18750" r="81000"/>
-                    </a14:imgEffect>
-                  </a14:imgLayer>
-                </a14:imgProps>
-              </a:ext>
               <a:ext uri="{28A0092B-C50C-407E-A947-70E740481C1C}">
                 <a14:useLocalDpi xmlns:a14="http://schemas.microsoft.com/office/drawing/2010/main" val="0"/>
               </a:ext>
@@ -5258,15 +4667,6 @@
         <p:blipFill rotWithShape="1">
           <a:blip r:embed="rId9">
             <a:extLst>
-              <a:ext uri="{BEBA8EAE-BF5A-486C-A8C5-ECC9F3942E4B}">
-                <a14:imgProps xmlns:a14="http://schemas.microsoft.com/office/drawing/2010/main">
-                  <a14:imgLayer r:embed="rId10">
-                    <a14:imgEffect>
-                      <a14:backgroundRemoval t="21500" b="83500" l="18750" r="81000"/>
-                    </a14:imgEffect>
-                  </a14:imgLayer>
-                </a14:imgProps>
-              </a:ext>
               <a:ext uri="{28A0092B-C50C-407E-A947-70E740481C1C}">
                 <a14:useLocalDpi xmlns:a14="http://schemas.microsoft.com/office/drawing/2010/main" val="0"/>
               </a:ext>
@@ -5300,15 +4700,6 @@
         <p:blipFill rotWithShape="1">
           <a:blip r:embed="rId9">
             <a:extLst>
-              <a:ext uri="{BEBA8EAE-BF5A-486C-A8C5-ECC9F3942E4B}">
-                <a14:imgProps xmlns:a14="http://schemas.microsoft.com/office/drawing/2010/main">
-                  <a14:imgLayer r:embed="rId10">
-                    <a14:imgEffect>
-                      <a14:backgroundRemoval t="21500" b="83500" l="18750" r="81000"/>
-                    </a14:imgEffect>
-                  </a14:imgLayer>
-                </a14:imgProps>
-              </a:ext>
               <a:ext uri="{28A0092B-C50C-407E-A947-70E740481C1C}">
                 <a14:useLocalDpi xmlns:a14="http://schemas.microsoft.com/office/drawing/2010/main" val="0"/>
               </a:ext>
@@ -5342,15 +4733,6 @@
         <p:blipFill rotWithShape="1">
           <a:blip r:embed="rId9" cstate="print">
             <a:extLst>
-              <a:ext uri="{BEBA8EAE-BF5A-486C-A8C5-ECC9F3942E4B}">
-                <a14:imgProps xmlns:a14="http://schemas.microsoft.com/office/drawing/2010/main">
-                  <a14:imgLayer r:embed="rId10">
-                    <a14:imgEffect>
-                      <a14:backgroundRemoval t="21500" b="83500" l="18750" r="81000"/>
-                    </a14:imgEffect>
-                  </a14:imgLayer>
-                </a14:imgProps>
-              </a:ext>
               <a:ext uri="{28A0092B-C50C-407E-A947-70E740481C1C}">
                 <a14:useLocalDpi xmlns:a14="http://schemas.microsoft.com/office/drawing/2010/main" val="0"/>
               </a:ext>
@@ -5384,15 +4766,6 @@
         <p:blipFill rotWithShape="1">
           <a:blip r:embed="rId9">
             <a:extLst>
-              <a:ext uri="{BEBA8EAE-BF5A-486C-A8C5-ECC9F3942E4B}">
-                <a14:imgProps xmlns:a14="http://schemas.microsoft.com/office/drawing/2010/main">
-                  <a14:imgLayer r:embed="rId10">
-                    <a14:imgEffect>
-                      <a14:backgroundRemoval t="21500" b="83500" l="18750" r="81000"/>
-                    </a14:imgEffect>
-                  </a14:imgLayer>
-                </a14:imgProps>
-              </a:ext>
               <a:ext uri="{28A0092B-C50C-407E-A947-70E740481C1C}">
                 <a14:useLocalDpi xmlns:a14="http://schemas.microsoft.com/office/drawing/2010/main" val="0"/>
               </a:ext>
@@ -5426,15 +4799,6 @@
         <p:blipFill rotWithShape="1">
           <a:blip r:embed="rId9">
             <a:extLst>
-              <a:ext uri="{BEBA8EAE-BF5A-486C-A8C5-ECC9F3942E4B}">
-                <a14:imgProps xmlns:a14="http://schemas.microsoft.com/office/drawing/2010/main">
-                  <a14:imgLayer r:embed="rId10">
-                    <a14:imgEffect>
-                      <a14:backgroundRemoval t="21500" b="83500" l="18750" r="81000"/>
-                    </a14:imgEffect>
-                  </a14:imgLayer>
-                </a14:imgProps>
-              </a:ext>
               <a:ext uri="{28A0092B-C50C-407E-A947-70E740481C1C}">
                 <a14:useLocalDpi xmlns:a14="http://schemas.microsoft.com/office/drawing/2010/main" val="0"/>
               </a:ext>
@@ -5690,7 +5054,7 @@
           <a:lstStyle/>
           <a:p>
             <a:r>
-              <a:rPr lang="sl-SI" dirty="0" smtClean="0"/>
+              <a:rPr lang="sl-SI" smtClean="0"/>
               <a:t>Vsebina</a:t>
             </a:r>
             <a:endParaRPr lang="en-US" dirty="0"/>
@@ -5713,27 +5077,28 @@
           <a:lstStyle/>
           <a:p>
             <a:r>
-              <a:rPr lang="sl-SI" dirty="0" smtClean="0"/>
+              <a:rPr lang="sl-SI" smtClean="0"/>
               <a:t>Kaj je NewSQL</a:t>
             </a:r>
           </a:p>
           <a:p>
             <a:r>
-              <a:rPr lang="sl-SI" dirty="0" smtClean="0"/>
+              <a:rPr lang="sl-SI" smtClean="0"/>
               <a:t>Podatkovna baza CockroachDB</a:t>
             </a:r>
           </a:p>
           <a:p>
             <a:r>
-              <a:rPr lang="sl-SI" dirty="0" smtClean="0"/>
+              <a:rPr lang="sl-SI" smtClean="0"/>
               <a:t>Izvedba primerjalne analize</a:t>
             </a:r>
           </a:p>
           <a:p>
             <a:r>
-              <a:rPr lang="sl-SI" dirty="0" smtClean="0"/>
+              <a:rPr lang="sl-SI" smtClean="0"/>
               <a:t>Rezultati in ugotovitve</a:t>
             </a:r>
+            <a:endParaRPr lang="sl-SI" dirty="0" smtClean="0"/>
           </a:p>
         </p:txBody>
       </p:sp>
@@ -5752,10 +5117,10 @@
           <a:bodyPr/>
           <a:lstStyle/>
           <a:p>
-            <a:fld id="{5F266D8D-56BE-448C-A72E-F2DD44D1DB5B}" type="datetime1">
-              <a:rPr lang="sl-SI" smtClean="0"/>
-              <a:t>30. 08. 2018</a:t>
-            </a:fld>
+            <a:r>
+              <a:rPr lang="en-US" smtClean="0"/>
+              <a:t>Ljubljana, 2018</a:t>
+            </a:r>
             <a:endParaRPr lang="en-US"/>
           </a:p>
         </p:txBody>
@@ -5800,6 +5165,7 @@
           <a:p>
             <a:fld id="{63C2F5EF-8BAA-4E52-921D-439986BE5530}" type="slidenum">
               <a:rPr lang="en-US" smtClean="0"/>
+              <a:pPr/>
               <a:t>2</a:t>
             </a:fld>
             <a:endParaRPr lang="en-US"/>
@@ -5859,7 +5225,7 @@
           <a:lstStyle/>
           <a:p>
             <a:r>
-              <a:rPr lang="sl-SI" dirty="0" smtClean="0"/>
+              <a:rPr lang="sl-SI" smtClean="0"/>
               <a:t>Kaj je NewSQL?</a:t>
             </a:r>
             <a:endParaRPr lang="en-US" dirty="0"/>
@@ -5882,45 +5248,34 @@
           <a:lstStyle/>
           <a:p>
             <a:r>
-              <a:rPr lang="sl-SI" dirty="0" smtClean="0"/>
+              <a:rPr lang="sl-SI" smtClean="0"/>
               <a:t>SQL</a:t>
             </a:r>
           </a:p>
           <a:p>
             <a:r>
-              <a:rPr lang="sl-SI" dirty="0" smtClean="0"/>
+              <a:rPr lang="sl-SI" smtClean="0"/>
               <a:t>ACID tranakcije</a:t>
             </a:r>
           </a:p>
           <a:p>
             <a:r>
-              <a:rPr lang="sl-SI" dirty="0"/>
-              <a:t>s</a:t>
-            </a:r>
-            <a:r>
-              <a:rPr lang="sl-SI" dirty="0" smtClean="0"/>
-              <a:t>kalabilnost</a:t>
-            </a:r>
-          </a:p>
-          <a:p>
-            <a:r>
-              <a:rPr lang="sl-SI" dirty="0"/>
-              <a:t>v</a:t>
-            </a:r>
-            <a:r>
-              <a:rPr lang="sl-SI" dirty="0" smtClean="0"/>
-              <a:t>isoka razpoložljivost</a:t>
-            </a:r>
-          </a:p>
-          <a:p>
-            <a:r>
-              <a:rPr lang="sl-SI" dirty="0"/>
-              <a:t>p</a:t>
-            </a:r>
-            <a:r>
-              <a:rPr lang="sl-SI" dirty="0" smtClean="0"/>
-              <a:t>orazdeljena okolja</a:t>
-            </a:r>
+              <a:rPr lang="sl-SI" smtClean="0"/>
+              <a:t>skalabilnost</a:t>
+            </a:r>
+          </a:p>
+          <a:p>
+            <a:r>
+              <a:rPr lang="sl-SI" smtClean="0"/>
+              <a:t>visoka razpoložljivost</a:t>
+            </a:r>
+          </a:p>
+          <a:p>
+            <a:r>
+              <a:rPr lang="sl-SI" smtClean="0"/>
+              <a:t>porazdeljena okolja</a:t>
+            </a:r>
+            <a:endParaRPr lang="sl-SI" dirty="0" smtClean="0"/>
           </a:p>
         </p:txBody>
       </p:sp>
@@ -5939,10 +5294,10 @@
           <a:bodyPr/>
           <a:lstStyle/>
           <a:p>
-            <a:fld id="{37C2868D-823F-4B33-BDFE-50C5EC571182}" type="datetime1">
-              <a:rPr lang="sl-SI" smtClean="0"/>
-              <a:t>30. 08. 2018</a:t>
-            </a:fld>
+            <a:r>
+              <a:rPr lang="en-US" smtClean="0"/>
+              <a:t>Ljubljana, 2018</a:t>
+            </a:r>
             <a:endParaRPr lang="en-US"/>
           </a:p>
         </p:txBody>
@@ -5987,6 +5342,7 @@
           <a:p>
             <a:fld id="{63C2F5EF-8BAA-4E52-921D-439986BE5530}" type="slidenum">
               <a:rPr lang="en-US" smtClean="0"/>
+              <a:pPr/>
               <a:t>3</a:t>
             </a:fld>
             <a:endParaRPr lang="en-US"/>
@@ -6046,37 +5402,31 @@
           <a:lstStyle/>
           <a:p>
             <a:r>
+              <a:rPr lang="sl-SI" smtClean="0"/>
+              <a:t>Podatkovna baza CockroachDB</a:t>
+            </a:r>
+            <a:endParaRPr lang="en-US" dirty="0"/>
+          </a:p>
+        </p:txBody>
+      </p:sp>
+      <p:sp>
+        <p:nvSpPr>
+          <p:cNvPr id="3" name="Content Placeholder 2"/>
+          <p:cNvSpPr>
+            <a:spLocks noGrp="1"/>
+          </p:cNvSpPr>
+          <p:nvPr>
+            <p:ph idx="1"/>
+          </p:nvPr>
+        </p:nvSpPr>
+        <p:spPr/>
+        <p:txBody>
+          <a:bodyPr/>
+          <a:lstStyle/>
+          <a:p>
+            <a:r>
               <a:rPr lang="sl-SI" dirty="0" smtClean="0"/>
-              <a:t>Podatkovna baza CockroachDB</a:t>
-            </a:r>
-            <a:endParaRPr lang="en-US" dirty="0"/>
-          </a:p>
-        </p:txBody>
-      </p:sp>
-      <p:sp>
-        <p:nvSpPr>
-          <p:cNvPr id="3" name="Content Placeholder 2"/>
-          <p:cNvSpPr>
-            <a:spLocks noGrp="1"/>
-          </p:cNvSpPr>
-          <p:nvPr>
-            <p:ph idx="1"/>
-          </p:nvPr>
-        </p:nvSpPr>
-        <p:spPr/>
-        <p:txBody>
-          <a:bodyPr>
-            <a:normAutofit/>
-          </a:bodyPr>
-          <a:lstStyle/>
-          <a:p>
-            <a:r>
-              <a:rPr lang="sl-SI" dirty="0"/>
-              <a:t>d</a:t>
-            </a:r>
-            <a:r>
-              <a:rPr lang="sl-SI" dirty="0" smtClean="0"/>
-              <a:t>ostopna komurkoli </a:t>
+              <a:t>dostopna komurkoli </a:t>
             </a:r>
           </a:p>
           <a:p>
@@ -6108,10 +5458,10 @@
           <a:bodyPr/>
           <a:lstStyle/>
           <a:p>
-            <a:fld id="{94E42CE7-3896-4702-9533-7697A8D1B4F0}" type="datetime1">
-              <a:rPr lang="sl-SI" smtClean="0"/>
-              <a:t>30. 08. 2018</a:t>
-            </a:fld>
+            <a:r>
+              <a:rPr lang="en-US" smtClean="0"/>
+              <a:t>Ljubljana, 2018</a:t>
+            </a:r>
             <a:endParaRPr lang="en-US"/>
           </a:p>
         </p:txBody>
@@ -6156,9 +5506,100 @@
           <a:p>
             <a:fld id="{63C2F5EF-8BAA-4E52-921D-439986BE5530}" type="slidenum">
               <a:rPr lang="en-US" smtClean="0"/>
+              <a:pPr/>
               <a:t>4</a:t>
             </a:fld>
             <a:endParaRPr lang="en-US"/>
+          </a:p>
+        </p:txBody>
+      </p:sp>
+      <p:pic>
+        <p:nvPicPr>
+          <p:cNvPr id="10" name="Picture 9"/>
+          <p:cNvPicPr>
+            <a:picLocks noChangeAspect="1"/>
+          </p:cNvPicPr>
+          <p:nvPr/>
+        </p:nvPicPr>
+        <p:blipFill>
+          <a:blip r:embed="rId3">
+            <a:extLst>
+              <a:ext uri="{28A0092B-C50C-407E-A947-70E740481C1C}">
+                <a14:useLocalDpi xmlns:a14="http://schemas.microsoft.com/office/drawing/2010/main" val="0"/>
+              </a:ext>
+            </a:extLst>
+          </a:blip>
+          <a:stretch>
+            <a:fillRect/>
+          </a:stretch>
+        </p:blipFill>
+        <p:spPr>
+          <a:xfrm>
+            <a:off x="7369752" y="1825625"/>
+            <a:ext cx="3609975" cy="571500"/>
+          </a:xfrm>
+          <a:prstGeom prst="rect">
+            <a:avLst/>
+          </a:prstGeom>
+        </p:spPr>
+      </p:pic>
+      <p:sp>
+        <p:nvSpPr>
+          <p:cNvPr id="11" name="TextBox 10"/>
+          <p:cNvSpPr txBox="1"/>
+          <p:nvPr/>
+        </p:nvSpPr>
+        <p:spPr>
+          <a:xfrm>
+            <a:off x="6096000" y="2532062"/>
+            <a:ext cx="6096000" cy="523220"/>
+          </a:xfrm>
+          <a:prstGeom prst="rect">
+            <a:avLst/>
+          </a:prstGeom>
+          <a:noFill/>
+        </p:spPr>
+        <p:txBody>
+          <a:bodyPr wrap="square" rtlCol="0">
+            <a:spAutoFit/>
+          </a:bodyPr>
+          <a:lstStyle/>
+          <a:p>
+            <a:pPr algn="ctr"/>
+            <a:r>
+              <a:rPr lang="sl-SI" sz="1400" dirty="0" smtClean="0"/>
+              <a:t>Slika 1: Celostna grafična podoba podatkovne baze CockroachDB</a:t>
+            </a:r>
+          </a:p>
+          <a:p>
+            <a:pPr algn="ctr"/>
+            <a:r>
+              <a:rPr lang="sl-SI" sz="1400" dirty="0" smtClean="0"/>
+              <a:t>(vir: </a:t>
+            </a:r>
+            <a:r>
+              <a:rPr lang="en-US" sz="1400" dirty="0" smtClean="0">
+                <a:hlinkClick r:id="rId4"/>
+              </a:rPr>
+              <a:t>https</a:t>
+            </a:r>
+            <a:r>
+              <a:rPr lang="en-US" sz="1400" dirty="0">
+                <a:hlinkClick r:id="rId4"/>
+              </a:rPr>
+              <a:t>://</a:t>
+            </a:r>
+            <a:r>
+              <a:rPr lang="en-US" sz="1400" dirty="0" smtClean="0">
+                <a:hlinkClick r:id="rId4"/>
+              </a:rPr>
+              <a:t>github.com/cockroachdb/cockroach</a:t>
+            </a:r>
+            <a:r>
+              <a:rPr lang="sl-SI" sz="1400" dirty="0" smtClean="0"/>
+              <a:t>)</a:t>
+            </a:r>
+            <a:endParaRPr lang="en-US" sz="1400" dirty="0"/>
           </a:p>
         </p:txBody>
       </p:sp>
@@ -6215,7 +5656,7 @@
           <a:lstStyle/>
           <a:p>
             <a:r>
-              <a:rPr lang="sl-SI" dirty="0" smtClean="0"/>
+              <a:rPr lang="sl-SI" smtClean="0"/>
               <a:t>Arhitektura podatkovne baze CockroachDB</a:t>
             </a:r>
             <a:endParaRPr lang="en-US" dirty="0"/>
@@ -6284,10 +5725,10 @@
           <a:bodyPr/>
           <a:lstStyle/>
           <a:p>
-            <a:fld id="{C3E7F1D5-0F42-4571-ABC8-ABC7ACE2A051}" type="datetime1">
-              <a:rPr lang="sl-SI" smtClean="0"/>
-              <a:t>30. 08. 2018</a:t>
-            </a:fld>
+            <a:r>
+              <a:rPr lang="en-US" smtClean="0"/>
+              <a:t>Ljubljana, 2018</a:t>
+            </a:r>
             <a:endParaRPr lang="en-US"/>
           </a:p>
         </p:txBody>
@@ -6332,9 +5773,91 @@
           <a:p>
             <a:fld id="{63C2F5EF-8BAA-4E52-921D-439986BE5530}" type="slidenum">
               <a:rPr lang="en-US" smtClean="0"/>
+              <a:pPr/>
               <a:t>5</a:t>
             </a:fld>
             <a:endParaRPr lang="en-US"/>
+          </a:p>
+        </p:txBody>
+      </p:sp>
+      <p:pic>
+        <p:nvPicPr>
+          <p:cNvPr id="7" name="Picture 6"/>
+          <p:cNvPicPr>
+            <a:picLocks noChangeAspect="1"/>
+          </p:cNvPicPr>
+          <p:nvPr/>
+        </p:nvPicPr>
+        <p:blipFill rotWithShape="1">
+          <a:blip r:embed="rId3">
+            <a:extLst>
+              <a:ext uri="{28A0092B-C50C-407E-A947-70E740481C1C}">
+                <a14:useLocalDpi xmlns:a14="http://schemas.microsoft.com/office/drawing/2010/main" val="0"/>
+              </a:ext>
+            </a:extLst>
+          </a:blip>
+          <a:srcRect l="9420" t="6933" r="8283" b="3790"/>
+          <a:stretch/>
+        </p:blipFill>
+        <p:spPr>
+          <a:xfrm>
+            <a:off x="7335369" y="1662538"/>
+            <a:ext cx="3541059" cy="3728842"/>
+          </a:xfrm>
+          <a:prstGeom prst="rect">
+            <a:avLst/>
+          </a:prstGeom>
+        </p:spPr>
+      </p:pic>
+      <p:sp>
+        <p:nvSpPr>
+          <p:cNvPr id="13" name="TextBox 12"/>
+          <p:cNvSpPr txBox="1"/>
+          <p:nvPr/>
+        </p:nvSpPr>
+        <p:spPr>
+          <a:xfrm>
+            <a:off x="6096000" y="5549583"/>
+            <a:ext cx="6096000" cy="523220"/>
+          </a:xfrm>
+          <a:prstGeom prst="rect">
+            <a:avLst/>
+          </a:prstGeom>
+          <a:noFill/>
+        </p:spPr>
+        <p:txBody>
+          <a:bodyPr wrap="square" rtlCol="0">
+            <a:spAutoFit/>
+          </a:bodyPr>
+          <a:lstStyle/>
+          <a:p>
+            <a:pPr algn="ctr"/>
+            <a:r>
+              <a:rPr lang="sl-SI" sz="1400" dirty="0" smtClean="0"/>
+              <a:t>Slika 2: Arhitekturni pregled</a:t>
+            </a:r>
+          </a:p>
+          <a:p>
+            <a:pPr algn="ctr"/>
+            <a:r>
+              <a:rPr lang="sl-SI" sz="1400" dirty="0" smtClean="0"/>
+              <a:t>(</a:t>
+            </a:r>
+            <a:r>
+              <a:rPr lang="sl-SI" sz="1400" dirty="0"/>
+              <a:t>vir: </a:t>
+            </a:r>
+            <a:r>
+              <a:rPr lang="sl-SI" sz="1400" dirty="0">
+                <a:hlinkClick r:id="rId4"/>
+              </a:rPr>
+              <a:t>http://cs.ulb.ac.be/public/_media/teaching/cockroachdb_2017.pdf</a:t>
+            </a:r>
+            <a:r>
+              <a:rPr lang="sl-SI" sz="1400" dirty="0"/>
+              <a:t>)</a:t>
+            </a:r>
+            <a:endParaRPr lang="en-US" sz="1400" dirty="0"/>
           </a:p>
         </p:txBody>
       </p:sp>
@@ -6400,25 +5923,6 @@
       </p:sp>
       <p:sp>
         <p:nvSpPr>
-          <p:cNvPr id="3" name="Content Placeholder 2"/>
-          <p:cNvSpPr>
-            <a:spLocks noGrp="1"/>
-          </p:cNvSpPr>
-          <p:nvPr>
-            <p:ph idx="1"/>
-          </p:nvPr>
-        </p:nvSpPr>
-        <p:spPr/>
-        <p:txBody>
-          <a:bodyPr/>
-          <a:lstStyle/>
-          <a:p>
-            <a:endParaRPr lang="en-US"/>
-          </a:p>
-        </p:txBody>
-      </p:sp>
-      <p:sp>
-        <p:nvSpPr>
           <p:cNvPr id="4" name="Date Placeholder 3"/>
           <p:cNvSpPr>
             <a:spLocks noGrp="1"/>
@@ -6432,10 +5936,10 @@
           <a:bodyPr/>
           <a:lstStyle/>
           <a:p>
-            <a:fld id="{1426AB37-A32F-47C9-AFB3-F87C0FDE6D9B}" type="datetime1">
-              <a:rPr lang="sl-SI" smtClean="0"/>
-              <a:t>30. 08. 2018</a:t>
-            </a:fld>
+            <a:r>
+              <a:rPr lang="en-US" smtClean="0"/>
+              <a:t>Ljubljana, 2018</a:t>
+            </a:r>
             <a:endParaRPr lang="en-US"/>
           </a:p>
         </p:txBody>
@@ -6483,6 +5987,215 @@
               <a:t>6</a:t>
             </a:fld>
             <a:endParaRPr lang="en-US"/>
+          </a:p>
+        </p:txBody>
+      </p:sp>
+      <p:sp>
+        <p:nvSpPr>
+          <p:cNvPr id="11" name="Content Placeholder 10"/>
+          <p:cNvSpPr>
+            <a:spLocks noGrp="1"/>
+          </p:cNvSpPr>
+          <p:nvPr>
+            <p:ph idx="1"/>
+          </p:nvPr>
+        </p:nvSpPr>
+        <p:spPr>
+          <a:xfrm>
+            <a:off x="838200" y="1504335"/>
+            <a:ext cx="5257800" cy="4672628"/>
+          </a:xfrm>
+        </p:spPr>
+        <p:txBody>
+          <a:bodyPr/>
+          <a:lstStyle/>
+          <a:p>
+            <a:endParaRPr lang="en-US" dirty="0"/>
+          </a:p>
+        </p:txBody>
+      </p:sp>
+      <p:pic>
+        <p:nvPicPr>
+          <p:cNvPr id="12" name="Content Placeholder 6"/>
+          <p:cNvPicPr>
+            <a:picLocks noChangeAspect="1"/>
+          </p:cNvPicPr>
+          <p:nvPr/>
+        </p:nvPicPr>
+        <p:blipFill>
+          <a:blip r:embed="rId3">
+            <a:extLst>
+              <a:ext uri="{28A0092B-C50C-407E-A947-70E740481C1C}">
+                <a14:useLocalDpi xmlns:a14="http://schemas.microsoft.com/office/drawing/2010/main" val="0"/>
+              </a:ext>
+            </a:extLst>
+          </a:blip>
+          <a:stretch>
+            <a:fillRect/>
+          </a:stretch>
+        </p:blipFill>
+        <p:spPr>
+          <a:xfrm>
+            <a:off x="8531598" y="1504335"/>
+            <a:ext cx="1224803" cy="1224803"/>
+          </a:xfrm>
+          <a:prstGeom prst="rect">
+            <a:avLst/>
+          </a:prstGeom>
+        </p:spPr>
+      </p:pic>
+      <p:pic>
+        <p:nvPicPr>
+          <p:cNvPr id="13" name="Picture 12"/>
+          <p:cNvPicPr>
+            <a:picLocks noChangeAspect="1"/>
+          </p:cNvPicPr>
+          <p:nvPr/>
+        </p:nvPicPr>
+        <p:blipFill>
+          <a:blip r:embed="rId4">
+            <a:extLst>
+              <a:ext uri="{28A0092B-C50C-407E-A947-70E740481C1C}">
+                <a14:useLocalDpi xmlns:a14="http://schemas.microsoft.com/office/drawing/2010/main" val="0"/>
+              </a:ext>
+            </a:extLst>
+          </a:blip>
+          <a:stretch>
+            <a:fillRect/>
+          </a:stretch>
+        </p:blipFill>
+        <p:spPr>
+          <a:xfrm>
+            <a:off x="8153400" y="3449957"/>
+            <a:ext cx="2057400" cy="485775"/>
+          </a:xfrm>
+          <a:prstGeom prst="rect">
+            <a:avLst/>
+          </a:prstGeom>
+        </p:spPr>
+      </p:pic>
+      <p:sp>
+        <p:nvSpPr>
+          <p:cNvPr id="14" name="TextBox 13"/>
+          <p:cNvSpPr txBox="1"/>
+          <p:nvPr/>
+        </p:nvSpPr>
+        <p:spPr>
+          <a:xfrm>
+            <a:off x="8733865" y="2766382"/>
+            <a:ext cx="820270" cy="646331"/>
+          </a:xfrm>
+          <a:prstGeom prst="rect">
+            <a:avLst/>
+          </a:prstGeom>
+          <a:noFill/>
+        </p:spPr>
+        <p:txBody>
+          <a:bodyPr wrap="square" rtlCol="0">
+            <a:spAutoFit/>
+          </a:bodyPr>
+          <a:lstStyle/>
+          <a:p>
+            <a:pPr algn="ctr"/>
+            <a:r>
+              <a:rPr lang="sl-SI" sz="3600" dirty="0" smtClean="0"/>
+              <a:t>+</a:t>
+            </a:r>
+            <a:endParaRPr lang="en-US" sz="3600" dirty="0"/>
+          </a:p>
+        </p:txBody>
+      </p:sp>
+      <p:sp>
+        <p:nvSpPr>
+          <p:cNvPr id="15" name="TextBox 14"/>
+          <p:cNvSpPr txBox="1"/>
+          <p:nvPr/>
+        </p:nvSpPr>
+        <p:spPr>
+          <a:xfrm>
+            <a:off x="6096000" y="4071775"/>
+            <a:ext cx="6096000" cy="1169551"/>
+          </a:xfrm>
+          <a:prstGeom prst="rect">
+            <a:avLst/>
+          </a:prstGeom>
+          <a:noFill/>
+        </p:spPr>
+        <p:txBody>
+          <a:bodyPr wrap="square" rtlCol="0">
+            <a:spAutoFit/>
+          </a:bodyPr>
+          <a:lstStyle/>
+          <a:p>
+            <a:pPr algn="ctr"/>
+            <a:r>
+              <a:rPr lang="sl-SI" sz="1400" dirty="0" smtClean="0"/>
+              <a:t>Slika </a:t>
+            </a:r>
+            <a:r>
+              <a:rPr lang="sl-SI" sz="1400" dirty="0" smtClean="0"/>
+              <a:t>3: Logo podatkovne baze PostgreSQL</a:t>
+            </a:r>
+            <a:endParaRPr lang="sl-SI" sz="1400" dirty="0" smtClean="0"/>
+          </a:p>
+          <a:p>
+            <a:pPr algn="ctr"/>
+            <a:r>
+              <a:rPr lang="sl-SI" sz="1400" dirty="0" smtClean="0"/>
+              <a:t>(</a:t>
+            </a:r>
+            <a:r>
+              <a:rPr lang="sl-SI" sz="1400" dirty="0"/>
+              <a:t>vir</a:t>
+            </a:r>
+            <a:r>
+              <a:rPr lang="sl-SI" sz="1400" dirty="0"/>
+              <a:t>: </a:t>
+            </a:r>
+            <a:r>
+              <a:rPr lang="sl-SI" sz="1400" dirty="0">
+                <a:hlinkClick r:id="rId5"/>
+              </a:rPr>
+              <a:t>https://wiki.postgresql.org/wiki/Logo</a:t>
+            </a:r>
+            <a:r>
+              <a:rPr lang="sl-SI" sz="1400" dirty="0"/>
+              <a:t>)</a:t>
+            </a:r>
+            <a:endParaRPr lang="sl-SI" sz="1400" dirty="0" smtClean="0"/>
+          </a:p>
+          <a:p>
+            <a:pPr algn="ctr"/>
+            <a:endParaRPr lang="sl-SI" sz="1400" dirty="0"/>
+          </a:p>
+          <a:p>
+            <a:pPr algn="ctr"/>
+            <a:r>
+              <a:rPr lang="sl-SI" sz="1400" dirty="0" smtClean="0"/>
+              <a:t>Slika 4: Celostna grafična podoba podjetja Citus Data</a:t>
+            </a:r>
+          </a:p>
+          <a:p>
+            <a:pPr algn="ctr"/>
+            <a:r>
+              <a:rPr lang="sl-SI" sz="1400" dirty="0" smtClean="0"/>
+              <a:t>(vir</a:t>
+            </a:r>
+            <a:r>
+              <a:rPr lang="sl-SI" sz="1400" dirty="0"/>
+              <a:t>: </a:t>
+            </a:r>
+            <a:r>
+              <a:rPr lang="sl-SI" sz="1400" dirty="0">
+                <a:hlinkClick r:id="rId6"/>
+              </a:rPr>
+              <a:t>https://github.com/citusdata/citus</a:t>
+            </a:r>
+            <a:r>
+              <a:rPr lang="sl-SI" sz="1400" dirty="0"/>
+              <a:t>)</a:t>
+            </a:r>
+            <a:endParaRPr lang="en-US" sz="1400" dirty="0"/>
           </a:p>
         </p:txBody>
       </p:sp>
@@ -6539,112 +6252,112 @@
           <a:lstStyle/>
           <a:p>
             <a:r>
+              <a:rPr lang="sl-SI" smtClean="0"/>
+              <a:t>Postavitev testnega okolja</a:t>
+            </a:r>
+            <a:endParaRPr lang="en-US" dirty="0"/>
+          </a:p>
+        </p:txBody>
+      </p:sp>
+      <p:sp>
+        <p:nvSpPr>
+          <p:cNvPr id="3" name="Content Placeholder 2"/>
+          <p:cNvSpPr>
+            <a:spLocks noGrp="1"/>
+          </p:cNvSpPr>
+          <p:nvPr>
+            <p:ph sz="half" idx="1"/>
+          </p:nvPr>
+        </p:nvSpPr>
+        <p:spPr>
+          <a:xfrm>
+            <a:off x="838200" y="1504950"/>
+            <a:ext cx="5181600" cy="4672013"/>
+          </a:xfrm>
+        </p:spPr>
+        <p:txBody>
+          <a:bodyPr/>
+          <a:lstStyle/>
+          <a:p>
+            <a:r>
+              <a:rPr lang="sl-SI" smtClean="0"/>
+              <a:t>4 računalniki</a:t>
+            </a:r>
+          </a:p>
+          <a:p>
+            <a:r>
+              <a:rPr lang="sl-SI" smtClean="0"/>
+              <a:t>gigabitno omrežje</a:t>
+            </a:r>
+          </a:p>
+          <a:p>
+            <a:endParaRPr lang="sl-SI" dirty="0" smtClean="0"/>
+          </a:p>
+        </p:txBody>
+      </p:sp>
+      <p:sp>
+        <p:nvSpPr>
+          <p:cNvPr id="7" name="Content Placeholder 6"/>
+          <p:cNvSpPr>
+            <a:spLocks noGrp="1"/>
+          </p:cNvSpPr>
+          <p:nvPr>
+            <p:ph sz="half" idx="2"/>
+          </p:nvPr>
+        </p:nvSpPr>
+        <p:spPr>
+          <a:xfrm>
+            <a:off x="6172200" y="1504950"/>
+            <a:ext cx="5181600" cy="4672013"/>
+          </a:xfrm>
+        </p:spPr>
+        <p:txBody>
+          <a:bodyPr/>
+          <a:lstStyle/>
+          <a:p>
+            <a:r>
               <a:rPr lang="sl-SI" dirty="0" smtClean="0"/>
-              <a:t>Postavitev testnega okolja</a:t>
-            </a:r>
+              <a:t>Ubuntu Server 16.04 LTS</a:t>
+            </a:r>
+          </a:p>
+          <a:p>
+            <a:r>
+              <a:rPr lang="sl-SI" dirty="0" smtClean="0"/>
+              <a:t>Docker 18.03.0-ce</a:t>
+            </a:r>
+          </a:p>
+          <a:p>
+            <a:r>
+              <a:rPr lang="sl-SI" dirty="0" smtClean="0"/>
+              <a:t>CockroachDB 2.0.1</a:t>
+            </a:r>
+          </a:p>
+          <a:p>
+            <a:r>
+              <a:rPr lang="sl-SI" dirty="0" smtClean="0"/>
+              <a:t>PostgreSQL </a:t>
+            </a:r>
+            <a:r>
+              <a:rPr lang="en-US" dirty="0" smtClean="0"/>
+              <a:t>10.3</a:t>
+            </a:r>
+            <a:r>
+              <a:rPr lang="sl-SI" dirty="0" smtClean="0"/>
+              <a:t> + Citus </a:t>
+            </a:r>
+            <a:r>
+              <a:rPr lang="en-US" dirty="0" smtClean="0"/>
+              <a:t>7.3.0</a:t>
+            </a:r>
+            <a:endParaRPr lang="sl-SI" dirty="0" smtClean="0"/>
+          </a:p>
+          <a:p>
             <a:endParaRPr lang="en-US" dirty="0"/>
           </a:p>
         </p:txBody>
       </p:sp>
       <p:sp>
         <p:nvSpPr>
-          <p:cNvPr id="3" name="Content Placeholder 2"/>
-          <p:cNvSpPr>
-            <a:spLocks noGrp="1"/>
-          </p:cNvSpPr>
-          <p:nvPr>
-            <p:ph sz="half" idx="1"/>
-          </p:nvPr>
-        </p:nvSpPr>
-        <p:spPr/>
-        <p:txBody>
-          <a:bodyPr/>
-          <a:lstStyle/>
-          <a:p>
-            <a:r>
-              <a:rPr lang="sl-SI" dirty="0" smtClean="0"/>
-              <a:t>4 računalniki</a:t>
-            </a:r>
-          </a:p>
-          <a:p>
-            <a:r>
-              <a:rPr lang="sl-SI" dirty="0"/>
-              <a:t>g</a:t>
-            </a:r>
-            <a:r>
-              <a:rPr lang="sl-SI" dirty="0" smtClean="0"/>
-              <a:t>igabitno omrežje</a:t>
-            </a:r>
-            <a:endParaRPr lang="sl-SI" dirty="0"/>
-          </a:p>
-          <a:p>
-            <a:endParaRPr lang="sl-SI" dirty="0" smtClean="0"/>
-          </a:p>
-        </p:txBody>
-      </p:sp>
-      <p:sp>
-        <p:nvSpPr>
-          <p:cNvPr id="7" name="Content Placeholder 6"/>
-          <p:cNvSpPr>
-            <a:spLocks noGrp="1"/>
-          </p:cNvSpPr>
-          <p:nvPr>
-            <p:ph sz="half" idx="2"/>
-          </p:nvPr>
-        </p:nvSpPr>
-        <p:spPr/>
-        <p:txBody>
-          <a:bodyPr/>
-          <a:lstStyle/>
-          <a:p>
-            <a:r>
-              <a:rPr lang="sl-SI" dirty="0"/>
-              <a:t>Ubuntu Server 16.04 LTS</a:t>
-            </a:r>
-          </a:p>
-          <a:p>
-            <a:r>
-              <a:rPr lang="sl-SI" dirty="0"/>
-              <a:t>Docker </a:t>
-            </a:r>
-            <a:r>
-              <a:rPr lang="sl-SI" dirty="0" smtClean="0"/>
-              <a:t>18.03.0-ce</a:t>
-            </a:r>
-            <a:endParaRPr lang="sl-SI" dirty="0"/>
-          </a:p>
-          <a:p>
-            <a:r>
-              <a:rPr lang="sl-SI" dirty="0"/>
-              <a:t>CockroachDB 2.0.1</a:t>
-            </a:r>
-          </a:p>
-          <a:p>
-            <a:r>
-              <a:rPr lang="sl-SI" dirty="0"/>
-              <a:t>PostgreSQL </a:t>
-            </a:r>
-            <a:r>
-              <a:rPr lang="en-US" dirty="0"/>
-              <a:t>10.3</a:t>
-            </a:r>
-            <a:r>
-              <a:rPr lang="sl-SI" dirty="0"/>
-              <a:t> + Citus </a:t>
-            </a:r>
-            <a:r>
-              <a:rPr lang="en-US" dirty="0"/>
-              <a:t>7.3.0</a:t>
-            </a:r>
-            <a:endParaRPr lang="sl-SI" dirty="0"/>
-          </a:p>
-          <a:p>
-            <a:endParaRPr lang="en-US" dirty="0"/>
-          </a:p>
-        </p:txBody>
-      </p:sp>
-      <p:sp>
-        <p:nvSpPr>
           <p:cNvPr id="4" name="Date Placeholder 3"/>
           <p:cNvSpPr>
             <a:spLocks noGrp="1"/>
@@ -6658,10 +6371,10 @@
           <a:bodyPr/>
           <a:lstStyle/>
           <a:p>
-            <a:fld id="{70DA23D0-970E-425F-A25C-18443AD52B68}" type="datetime1">
-              <a:rPr lang="sl-SI" smtClean="0"/>
-              <a:t>30. 08. 2018</a:t>
-            </a:fld>
+            <a:r>
+              <a:rPr lang="en-US" smtClean="0"/>
+              <a:t>Ljubljana, 2018</a:t>
+            </a:r>
             <a:endParaRPr lang="en-US"/>
           </a:p>
         </p:txBody>
@@ -6706,6 +6419,7 @@
           <a:p>
             <a:fld id="{63C2F5EF-8BAA-4E52-921D-439986BE5530}" type="slidenum">
               <a:rPr lang="en-US" smtClean="0"/>
+              <a:pPr/>
               <a:t>7</a:t>
             </a:fld>
             <a:endParaRPr lang="en-US" dirty="0"/>
@@ -6849,10 +6563,10 @@
           <a:bodyPr/>
           <a:lstStyle/>
           <a:p>
-            <a:fld id="{7DE92977-D600-4884-8CBF-1137E8791BD5}" type="datetime1">
-              <a:rPr lang="sl-SI" smtClean="0"/>
-              <a:t>30. 08. 2018</a:t>
-            </a:fld>
+            <a:r>
+              <a:rPr lang="en-US" smtClean="0"/>
+              <a:t>Ljubljana, 2018</a:t>
+            </a:r>
             <a:endParaRPr lang="en-US"/>
           </a:p>
         </p:txBody>
@@ -6963,25 +6677,34 @@
           </a:p>
         </p:txBody>
       </p:sp>
-      <p:sp>
-        <p:nvSpPr>
-          <p:cNvPr id="3" name="Content Placeholder 2"/>
-          <p:cNvSpPr>
-            <a:spLocks noGrp="1"/>
-          </p:cNvSpPr>
+      <p:pic>
+        <p:nvPicPr>
+          <p:cNvPr id="9" name="Content Placeholder 8"/>
+          <p:cNvPicPr>
+            <a:picLocks noGrp="1" noChangeAspect="1"/>
+          </p:cNvPicPr>
           <p:nvPr>
             <p:ph idx="1"/>
           </p:nvPr>
-        </p:nvSpPr>
-        <p:spPr/>
-        <p:txBody>
-          <a:bodyPr/>
-          <a:lstStyle/>
-          <a:p>
-            <a:endParaRPr lang="en-US" dirty="0"/>
-          </a:p>
-        </p:txBody>
-      </p:sp>
+        </p:nvPicPr>
+        <p:blipFill rotWithShape="1">
+          <a:blip r:embed="rId3">
+            <a:extLst>
+              <a:ext uri="{28A0092B-C50C-407E-A947-70E740481C1C}">
+                <a14:useLocalDpi xmlns:a14="http://schemas.microsoft.com/office/drawing/2010/main" val="0"/>
+              </a:ext>
+            </a:extLst>
+          </a:blip>
+          <a:srcRect l="3182" t="2146" r="2179" b="52881"/>
+          <a:stretch/>
+        </p:blipFill>
+        <p:spPr>
+          <a:xfrm>
+            <a:off x="406400" y="1867952"/>
+            <a:ext cx="5486400" cy="3122097"/>
+          </a:xfrm>
+        </p:spPr>
+      </p:pic>
       <p:sp>
         <p:nvSpPr>
           <p:cNvPr id="4" name="Date Placeholder 3"/>
@@ -6997,10 +6720,10 @@
           <a:bodyPr/>
           <a:lstStyle/>
           <a:p>
-            <a:fld id="{388357A5-7A55-4980-8B15-AF9EA0F0661A}" type="datetime1">
-              <a:rPr lang="sl-SI" smtClean="0"/>
-              <a:t>30. 08. 2018</a:t>
-            </a:fld>
+            <a:r>
+              <a:rPr lang="en-US" smtClean="0"/>
+              <a:t>Ljubljana, 2018</a:t>
+            </a:r>
             <a:endParaRPr lang="en-US"/>
           </a:p>
         </p:txBody>
@@ -7051,6 +6774,35 @@
           </a:p>
         </p:txBody>
       </p:sp>
+      <p:pic>
+        <p:nvPicPr>
+          <p:cNvPr id="10" name="Picture 9"/>
+          <p:cNvPicPr>
+            <a:picLocks noChangeAspect="1"/>
+          </p:cNvPicPr>
+          <p:nvPr/>
+        </p:nvPicPr>
+        <p:blipFill rotWithShape="1">
+          <a:blip r:embed="rId3">
+            <a:extLst>
+              <a:ext uri="{28A0092B-C50C-407E-A947-70E740481C1C}">
+                <a14:useLocalDpi xmlns:a14="http://schemas.microsoft.com/office/drawing/2010/main" val="0"/>
+              </a:ext>
+            </a:extLst>
+          </a:blip>
+          <a:srcRect l="3240" t="52019" r="2643" b="2703"/>
+          <a:stretch/>
+        </p:blipFill>
+        <p:spPr>
+          <a:xfrm>
+            <a:off x="6299200" y="1848678"/>
+            <a:ext cx="5486400" cy="3160645"/>
+          </a:xfrm>
+          <a:prstGeom prst="rect">
+            <a:avLst/>
+          </a:prstGeom>
+        </p:spPr>
+      </p:pic>
     </p:spTree>
     <p:extLst>
       <p:ext uri="{BB962C8B-B14F-4D97-AF65-F5344CB8AC3E}">

</xml_diff>